<commit_message>
More half-baked slides about immutability
</commit_message>
<xml_diff>
--- a/doc/GetFuncY.pptx
+++ b/doc/GetFuncY.pptx
@@ -16,20 +16,22 @@
     <p:sldId id="310" r:id="rId10"/>
     <p:sldId id="311" r:id="rId11"/>
     <p:sldId id="312" r:id="rId12"/>
-    <p:sldId id="293" r:id="rId13"/>
-    <p:sldId id="301" r:id="rId14"/>
-    <p:sldId id="302" r:id="rId15"/>
-    <p:sldId id="296" r:id="rId16"/>
-    <p:sldId id="295" r:id="rId17"/>
-    <p:sldId id="292" r:id="rId18"/>
-    <p:sldId id="307" r:id="rId19"/>
-    <p:sldId id="303" r:id="rId20"/>
-    <p:sldId id="294" r:id="rId21"/>
-    <p:sldId id="304" r:id="rId22"/>
-    <p:sldId id="305" r:id="rId23"/>
-    <p:sldId id="306" r:id="rId24"/>
-    <p:sldId id="284" r:id="rId25"/>
-    <p:sldId id="285" r:id="rId26"/>
+    <p:sldId id="313" r:id="rId13"/>
+    <p:sldId id="293" r:id="rId14"/>
+    <p:sldId id="301" r:id="rId15"/>
+    <p:sldId id="302" r:id="rId16"/>
+    <p:sldId id="296" r:id="rId17"/>
+    <p:sldId id="314" r:id="rId18"/>
+    <p:sldId id="295" r:id="rId19"/>
+    <p:sldId id="292" r:id="rId20"/>
+    <p:sldId id="307" r:id="rId21"/>
+    <p:sldId id="303" r:id="rId22"/>
+    <p:sldId id="294" r:id="rId23"/>
+    <p:sldId id="304" r:id="rId24"/>
+    <p:sldId id="305" r:id="rId25"/>
+    <p:sldId id="306" r:id="rId26"/>
+    <p:sldId id="284" r:id="rId27"/>
+    <p:sldId id="285" r:id="rId28"/>
   </p:sldIdLst>
   <p:sldSz cx="12192000" cy="6858000"/>
   <p:notesSz cx="6858000" cy="9144000"/>
@@ -6847,11 +6849,131 @@
           <a:p>
             <a:r>
               <a:rPr lang="en-US" dirty="0"/>
-              <a:t>…</a:t>
-            </a:r>
-          </a:p>
-        </p:txBody>
-      </p:sp>
+              <a:t>Exceptions alter only control-flow, not state…</a:t>
+            </a:r>
+          </a:p>
+          <a:p>
+            <a:r>
+              <a:rPr lang="en-US" dirty="0"/>
+              <a:t>…unless you also consider “hidden” state (and you should)</a:t>
+            </a:r>
+          </a:p>
+        </p:txBody>
+      </p:sp>
+      <p:grpSp>
+        <p:nvGrpSpPr>
+          <p:cNvPr id="20" name="Group 19" descr="Diagram of top of call stack with two stack frames">
+            <a:extLst>
+              <a:ext uri="{FF2B5EF4-FFF2-40B4-BE49-F238E27FC236}">
+                <a16:creationId xmlns:a16="http://schemas.microsoft.com/office/drawing/2014/main" id="{FDF136A5-3FA2-E8FA-57C7-B7553EBA5487}"/>
+              </a:ext>
+            </a:extLst>
+          </p:cNvPr>
+          <p:cNvGrpSpPr>
+            <a:grpSpLocks noChangeAspect="1"/>
+          </p:cNvGrpSpPr>
+          <p:nvPr/>
+        </p:nvGrpSpPr>
+        <p:grpSpPr>
+          <a:xfrm>
+            <a:off x="1558947" y="3124954"/>
+            <a:ext cx="3966106" cy="3241515"/>
+            <a:chOff x="1558947" y="3124954"/>
+            <a:chExt cx="3257550" cy="2662409"/>
+          </a:xfrm>
+        </p:grpSpPr>
+        <p:pic>
+          <p:nvPicPr>
+            <p:cNvPr id="18" name="Graphic 17">
+              <a:extLst>
+                <a:ext uri="{FF2B5EF4-FFF2-40B4-BE49-F238E27FC236}">
+                  <a16:creationId xmlns:a16="http://schemas.microsoft.com/office/drawing/2014/main" id="{0EAD9087-5BFC-84B6-F0AA-DB5EE6C919DF}"/>
+                </a:ext>
+              </a:extLst>
+            </p:cNvPr>
+            <p:cNvPicPr>
+              <a:picLocks noChangeAspect="1"/>
+            </p:cNvPicPr>
+            <p:nvPr/>
+          </p:nvPicPr>
+          <p:blipFill>
+            <a:blip r:embed="rId2">
+              <a:extLst>
+                <a:ext uri="{28A0092B-C50C-407E-A947-70E740481C1C}">
+                  <a14:useLocalDpi xmlns:a14="http://schemas.microsoft.com/office/drawing/2010/main" val="0"/>
+                </a:ext>
+                <a:ext uri="{96DAC541-7B7A-43D3-8B79-37D633B846F1}">
+                  <asvg:svgBlip xmlns:asvg="http://schemas.microsoft.com/office/drawing/2016/SVG/main" r:embed="rId3"/>
+                </a:ext>
+              </a:extLst>
+            </a:blip>
+            <a:stretch>
+              <a:fillRect/>
+            </a:stretch>
+          </p:blipFill>
+          <p:spPr>
+            <a:xfrm>
+              <a:off x="1558947" y="3129888"/>
+              <a:ext cx="3257550" cy="2657475"/>
+            </a:xfrm>
+            <a:prstGeom prst="rect">
+              <a:avLst/>
+            </a:prstGeom>
+          </p:spPr>
+        </p:pic>
+        <p:sp>
+          <p:nvSpPr>
+            <p:cNvPr id="19" name="Rectangle 18">
+              <a:extLst>
+                <a:ext uri="{FF2B5EF4-FFF2-40B4-BE49-F238E27FC236}">
+                  <a16:creationId xmlns:a16="http://schemas.microsoft.com/office/drawing/2014/main" id="{48B6744D-50AE-57BE-ECAD-22078DB921CE}"/>
+                </a:ext>
+              </a:extLst>
+            </p:cNvPr>
+            <p:cNvSpPr/>
+            <p:nvPr/>
+          </p:nvSpPr>
+          <p:spPr>
+            <a:xfrm>
+              <a:off x="1558947" y="3124954"/>
+              <a:ext cx="3257550" cy="2657475"/>
+            </a:xfrm>
+            <a:prstGeom prst="rect">
+              <a:avLst/>
+            </a:prstGeom>
+            <a:noFill/>
+            <a:ln w="15875">
+              <a:solidFill>
+                <a:schemeClr val="accent1"/>
+              </a:solidFill>
+            </a:ln>
+          </p:spPr>
+          <p:style>
+            <a:lnRef idx="2">
+              <a:schemeClr val="accent1">
+                <a:shade val="50000"/>
+              </a:schemeClr>
+            </a:lnRef>
+            <a:fillRef idx="1">
+              <a:schemeClr val="accent1"/>
+            </a:fillRef>
+            <a:effectRef idx="0">
+              <a:schemeClr val="accent1"/>
+            </a:effectRef>
+            <a:fontRef idx="minor">
+              <a:schemeClr val="lt1"/>
+            </a:fontRef>
+          </p:style>
+          <p:txBody>
+            <a:bodyPr rtlCol="0" anchor="ctr"/>
+            <a:lstStyle/>
+            <a:p>
+              <a:pPr algn="ctr"/>
+              <a:endParaRPr lang="en-US"/>
+            </a:p>
+          </p:txBody>
+        </p:sp>
+      </p:grpSp>
     </p:spTree>
     <p:extLst>
       <p:ext uri="{BB962C8B-B14F-4D97-AF65-F5344CB8AC3E}">
@@ -6940,7 +7062,58 @@
           <a:p>
             <a:r>
               <a:rPr lang="en-US" dirty="0"/>
-              <a:t>…</a:t>
+              <a:t>Don‘t rely on immutability by convention</a:t>
+            </a:r>
+          </a:p>
+          <a:p>
+            <a:pPr lvl="1"/>
+            <a:r>
+              <a:rPr lang="en-US" dirty="0"/>
+              <a:t>Easy to violate accidentally</a:t>
+            </a:r>
+          </a:p>
+          <a:p>
+            <a:pPr lvl="2"/>
+            <a:r>
+              <a:rPr lang="en-US" dirty="0"/>
+              <a:t>Values captures in closures my be modified elsewhere</a:t>
+            </a:r>
+          </a:p>
+          <a:p>
+            <a:pPr lvl="2"/>
+            <a:r>
+              <a:rPr lang="en-US" dirty="0"/>
+              <a:t>Worse yet, modification may happen during execution of </a:t>
+            </a:r>
+            <a:r>
+              <a:rPr lang="en-US"/>
+              <a:t>pure function!</a:t>
+            </a:r>
+            <a:endParaRPr lang="en-US" dirty="0"/>
+          </a:p>
+          <a:p>
+            <a:pPr lvl="1"/>
+            <a:r>
+              <a:rPr lang="en-US" dirty="0"/>
+              <a:t>Easy to circumvent intentionally</a:t>
+            </a:r>
+          </a:p>
+          <a:p>
+            <a:r>
+              <a:rPr lang="en-US" dirty="0"/>
+              <a:t>Use immutable record types (C# 9 and later)…</a:t>
+            </a:r>
+          </a:p>
+          <a:p>
+            <a:r>
+              <a:rPr lang="en-US" dirty="0"/>
+              <a:t>…or hand-written immutable types (C# 8 and earlier)</a:t>
+            </a:r>
+          </a:p>
+          <a:p>
+            <a:r>
+              <a:rPr lang="en-US" dirty="0"/>
+              <a:t>Should return immutable object</a:t>
             </a:r>
           </a:p>
         </p:txBody>
@@ -6980,74 +7153,60 @@
           <p:cNvPr id="2" name="Title 1">
             <a:extLst>
               <a:ext uri="{FF2B5EF4-FFF2-40B4-BE49-F238E27FC236}">
-                <a16:creationId xmlns:a16="http://schemas.microsoft.com/office/drawing/2014/main" id="{7306C212-B3B4-8E92-B9B3-B626EF37EBA4}"/>
+                <a16:creationId xmlns:a16="http://schemas.microsoft.com/office/drawing/2014/main" id="{9F0A4C3A-80AE-E3A6-471D-A74E63C90618}"/>
               </a:ext>
             </a:extLst>
           </p:cNvPr>
-          <p:cNvSpPr txBox="1">
-            <a:spLocks noGrp="1"/>
-          </p:cNvSpPr>
-          <p:nvPr>
-            <p:ph type="title" idx="4294967295"/>
-          </p:nvPr>
-        </p:nvSpPr>
-        <p:spPr>
-          <a:xfrm>
-            <a:off x="1061794" y="2274838"/>
-            <a:ext cx="10068412" cy="2308324"/>
-          </a:xfrm>
-          <a:prstGeom prst="rect">
-            <a:avLst/>
-          </a:prstGeom>
-          <a:noFill/>
-          <a:ln>
-            <a:noFill/>
-            <a:prstDash/>
-          </a:ln>
-          <a:effectLst/>
-        </p:spPr>
-        <p:txBody>
-          <a:bodyPr rot="0" spcFirstLastPara="0" vertOverflow="overflow" horzOverflow="overflow" vert="horz" wrap="square" lIns="91440" tIns="45720" rIns="91440" bIns="45720" numCol="1" spcCol="0" rtlCol="0" fromWordArt="0" anchor="t" anchorCtr="0" forceAA="0" compatLnSpc="1">
-            <a:prstTxWarp prst="textNoShape">
-              <a:avLst/>
-            </a:prstTxWarp>
-            <a:spAutoFit/>
-          </a:bodyPr>
+          <p:cNvSpPr>
+            <a:spLocks noGrp="1"/>
+          </p:cNvSpPr>
+          <p:nvPr>
+            <p:ph type="title"/>
+          </p:nvPr>
+        </p:nvSpPr>
+        <p:spPr/>
+        <p:txBody>
+          <a:bodyPr/>
           <a:lstStyle/>
           <a:p>
-            <a:pPr marL="0" marR="0" lvl="0" indent="0" algn="ctr" defTabSz="457200" rtl="0" eaLnBrk="1" fontAlgn="auto" latinLnBrk="0" hangingPunct="1">
-              <a:lnSpc>
-                <a:spcPct val="100000"/>
-              </a:lnSpc>
-              <a:spcBef>
-                <a:spcPts val="0"/>
-              </a:spcBef>
-              <a:spcAft>
-                <a:spcPts val="0"/>
-              </a:spcAft>
-              <a:buClrTx/>
-              <a:buSzTx/>
-              <a:buFontTx/>
-              <a:buNone/>
-              <a:tabLst/>
-              <a:defRPr/>
-            </a:pPr>
-            <a:r>
-              <a:rPr kumimoji="0" lang="en-US" sz="7200" b="0" i="0" u="none" strike="noStrike" kern="1200" cap="none" spc="0" normalizeH="0" baseline="0" noProof="0" dirty="0">
-                <a:ln>
-                  <a:noFill/>
-                </a:ln>
-                <a:solidFill>
-                  <a:schemeClr val="tx1"/>
-                </a:solidFill>
-                <a:effectLst/>
-                <a:uLnTx/>
-                <a:uFillTx/>
-                <a:latin typeface="+mn-lt"/>
-                <a:ea typeface="+mn-ea"/>
-                <a:cs typeface="+mn-cs"/>
-              </a:rPr>
-              <a:t>Functional programming</a:t>
+            <a:r>
+              <a:rPr lang="en-US" dirty="0"/>
+              <a:t>Pure functions</a:t>
+            </a:r>
+            <a:br>
+              <a:rPr lang="en-US" dirty="0"/>
+            </a:br>
+            <a:r>
+              <a:rPr lang="en-US" dirty="0"/>
+              <a:t>Advantages</a:t>
+            </a:r>
+          </a:p>
+        </p:txBody>
+      </p:sp>
+      <p:sp>
+        <p:nvSpPr>
+          <p:cNvPr id="3" name="Content Placeholder 2">
+            <a:extLst>
+              <a:ext uri="{FF2B5EF4-FFF2-40B4-BE49-F238E27FC236}">
+                <a16:creationId xmlns:a16="http://schemas.microsoft.com/office/drawing/2014/main" id="{519D56E3-2B90-2A3B-E384-D45FBDF93A21}"/>
+              </a:ext>
+            </a:extLst>
+          </p:cNvPr>
+          <p:cNvSpPr>
+            <a:spLocks noGrp="1"/>
+          </p:cNvSpPr>
+          <p:nvPr>
+            <p:ph idx="1"/>
+          </p:nvPr>
+        </p:nvSpPr>
+        <p:spPr/>
+        <p:txBody>
+          <a:bodyPr/>
+          <a:lstStyle/>
+          <a:p>
+            <a:r>
+              <a:rPr lang="en-US" dirty="0"/>
+              <a:t>Don</a:t>
             </a:r>
           </a:p>
         </p:txBody>
@@ -7055,7 +7214,7 @@
     </p:spTree>
     <p:extLst>
       <p:ext uri="{BB962C8B-B14F-4D97-AF65-F5344CB8AC3E}">
-        <p14:creationId xmlns:p14="http://schemas.microsoft.com/office/powerpoint/2010/main" val="3310324046"/>
+        <p14:creationId xmlns:p14="http://schemas.microsoft.com/office/powerpoint/2010/main" val="1456719261"/>
       </p:ext>
     </p:extLst>
   </p:cSld>
@@ -7087,65 +7246,82 @@
           <p:cNvPr id="2" name="Title 1">
             <a:extLst>
               <a:ext uri="{FF2B5EF4-FFF2-40B4-BE49-F238E27FC236}">
-                <a16:creationId xmlns:a16="http://schemas.microsoft.com/office/drawing/2014/main" id="{9F0A4C3A-80AE-E3A6-471D-A74E63C90618}"/>
+                <a16:creationId xmlns:a16="http://schemas.microsoft.com/office/drawing/2014/main" id="{7306C212-B3B4-8E92-B9B3-B626EF37EBA4}"/>
               </a:ext>
             </a:extLst>
           </p:cNvPr>
-          <p:cNvSpPr>
-            <a:spLocks noGrp="1"/>
-          </p:cNvSpPr>
-          <p:nvPr>
-            <p:ph type="title"/>
-          </p:nvPr>
-        </p:nvSpPr>
-        <p:spPr/>
-        <p:txBody>
-          <a:bodyPr/>
+          <p:cNvSpPr txBox="1">
+            <a:spLocks noGrp="1"/>
+          </p:cNvSpPr>
+          <p:nvPr>
+            <p:ph type="title" idx="4294967295"/>
+          </p:nvPr>
+        </p:nvSpPr>
+        <p:spPr>
+          <a:xfrm>
+            <a:off x="1061794" y="2274838"/>
+            <a:ext cx="10068412" cy="2308324"/>
+          </a:xfrm>
+          <a:prstGeom prst="rect">
+            <a:avLst/>
+          </a:prstGeom>
+          <a:noFill/>
+          <a:ln>
+            <a:noFill/>
+            <a:prstDash/>
+          </a:ln>
+          <a:effectLst/>
+        </p:spPr>
+        <p:txBody>
+          <a:bodyPr rot="0" spcFirstLastPara="0" vertOverflow="overflow" horzOverflow="overflow" vert="horz" wrap="square" lIns="91440" tIns="45720" rIns="91440" bIns="45720" numCol="1" spcCol="0" rtlCol="0" fromWordArt="0" anchor="t" anchorCtr="0" forceAA="0" compatLnSpc="1">
+            <a:prstTxWarp prst="textNoShape">
+              <a:avLst/>
+            </a:prstTxWarp>
+            <a:spAutoFit/>
+          </a:bodyPr>
           <a:lstStyle/>
           <a:p>
-            <a:r>
-              <a:rPr lang="en-US" dirty="0"/>
-              <a:t>Functional programming (FP)</a:t>
-            </a:r>
-            <a:br>
-              <a:rPr lang="en-US" dirty="0"/>
-            </a:br>
-            <a:r>
-              <a:rPr lang="en-US" dirty="0"/>
-              <a:t>Definition</a:t>
-            </a:r>
-          </a:p>
-        </p:txBody>
-      </p:sp>
-      <p:sp>
-        <p:nvSpPr>
-          <p:cNvPr id="3" name="Content Placeholder 2">
-            <a:extLst>
-              <a:ext uri="{FF2B5EF4-FFF2-40B4-BE49-F238E27FC236}">
-                <a16:creationId xmlns:a16="http://schemas.microsoft.com/office/drawing/2014/main" id="{519D56E3-2B90-2A3B-E384-D45FBDF93A21}"/>
-              </a:ext>
-            </a:extLst>
-          </p:cNvPr>
-          <p:cNvSpPr>
-            <a:spLocks noGrp="1"/>
-          </p:cNvSpPr>
-          <p:nvPr>
-            <p:ph idx="1"/>
-          </p:nvPr>
-        </p:nvSpPr>
-        <p:spPr/>
-        <p:txBody>
-          <a:bodyPr/>
-          <a:lstStyle/>
-          <a:p>
-            <a:endParaRPr lang="en-US" dirty="0"/>
+            <a:pPr marL="0" marR="0" lvl="0" indent="0" algn="ctr" defTabSz="457200" rtl="0" eaLnBrk="1" fontAlgn="auto" latinLnBrk="0" hangingPunct="1">
+              <a:lnSpc>
+                <a:spcPct val="100000"/>
+              </a:lnSpc>
+              <a:spcBef>
+                <a:spcPts val="0"/>
+              </a:spcBef>
+              <a:spcAft>
+                <a:spcPts val="0"/>
+              </a:spcAft>
+              <a:buClrTx/>
+              <a:buSzTx/>
+              <a:buFontTx/>
+              <a:buNone/>
+              <a:tabLst/>
+              <a:defRPr/>
+            </a:pPr>
+            <a:r>
+              <a:rPr kumimoji="0" lang="en-US" sz="7200" b="0" i="0" u="none" strike="noStrike" kern="1200" cap="none" spc="0" normalizeH="0" baseline="0" noProof="0" dirty="0">
+                <a:ln>
+                  <a:noFill/>
+                </a:ln>
+                <a:solidFill>
+                  <a:schemeClr val="tx1"/>
+                </a:solidFill>
+                <a:effectLst/>
+                <a:uLnTx/>
+                <a:uFillTx/>
+                <a:latin typeface="+mn-lt"/>
+                <a:ea typeface="+mn-ea"/>
+                <a:cs typeface="+mn-cs"/>
+              </a:rPr>
+              <a:t>Functional programming</a:t>
+            </a:r>
           </a:p>
         </p:txBody>
       </p:sp>
     </p:spTree>
     <p:extLst>
       <p:ext uri="{BB962C8B-B14F-4D97-AF65-F5344CB8AC3E}">
-        <p14:creationId xmlns:p14="http://schemas.microsoft.com/office/powerpoint/2010/main" val="98042496"/>
+        <p14:creationId xmlns:p14="http://schemas.microsoft.com/office/powerpoint/2010/main" val="3310324046"/>
       </p:ext>
     </p:extLst>
   </p:cSld>
@@ -7202,7 +7378,7 @@
             </a:br>
             <a:r>
               <a:rPr lang="en-US" dirty="0"/>
-              <a:t>Pattern matching</a:t>
+              <a:t>Definition</a:t>
             </a:r>
           </a:p>
         </p:txBody>
@@ -7235,7 +7411,7 @@
     </p:spTree>
     <p:extLst>
       <p:ext uri="{BB962C8B-B14F-4D97-AF65-F5344CB8AC3E}">
-        <p14:creationId xmlns:p14="http://schemas.microsoft.com/office/powerpoint/2010/main" val="2815264430"/>
+        <p14:creationId xmlns:p14="http://schemas.microsoft.com/office/powerpoint/2010/main" val="98042496"/>
       </p:ext>
     </p:extLst>
   </p:cSld>
@@ -7267,82 +7443,65 @@
           <p:cNvPr id="2" name="Title 1">
             <a:extLst>
               <a:ext uri="{FF2B5EF4-FFF2-40B4-BE49-F238E27FC236}">
-                <a16:creationId xmlns:a16="http://schemas.microsoft.com/office/drawing/2014/main" id="{7306C212-B3B4-8E92-B9B3-B626EF37EBA4}"/>
+                <a16:creationId xmlns:a16="http://schemas.microsoft.com/office/drawing/2014/main" id="{9F0A4C3A-80AE-E3A6-471D-A74E63C90618}"/>
               </a:ext>
             </a:extLst>
           </p:cNvPr>
-          <p:cNvSpPr txBox="1">
-            <a:spLocks noGrp="1"/>
-          </p:cNvSpPr>
-          <p:nvPr>
-            <p:ph type="title" idx="4294967295"/>
-          </p:nvPr>
-        </p:nvSpPr>
-        <p:spPr>
-          <a:xfrm>
-            <a:off x="1061794" y="2828836"/>
-            <a:ext cx="10068412" cy="1200329"/>
-          </a:xfrm>
-          <a:prstGeom prst="rect">
-            <a:avLst/>
-          </a:prstGeom>
-          <a:noFill/>
-          <a:ln>
-            <a:noFill/>
-            <a:prstDash/>
-          </a:ln>
-          <a:effectLst/>
-        </p:spPr>
-        <p:txBody>
-          <a:bodyPr rot="0" spcFirstLastPara="0" vertOverflow="overflow" horzOverflow="overflow" vert="horz" wrap="square" lIns="91440" tIns="45720" rIns="91440" bIns="45720" numCol="1" spcCol="0" rtlCol="0" fromWordArt="0" anchor="t" anchorCtr="0" forceAA="0" compatLnSpc="1">
-            <a:prstTxWarp prst="textNoShape">
-              <a:avLst/>
-            </a:prstTxWarp>
-            <a:spAutoFit/>
-          </a:bodyPr>
+          <p:cNvSpPr>
+            <a:spLocks noGrp="1"/>
+          </p:cNvSpPr>
+          <p:nvPr>
+            <p:ph type="title"/>
+          </p:nvPr>
+        </p:nvSpPr>
+        <p:spPr/>
+        <p:txBody>
+          <a:bodyPr/>
           <a:lstStyle/>
           <a:p>
-            <a:pPr marL="0" marR="0" lvl="0" indent="0" algn="ctr" defTabSz="457200" rtl="0" eaLnBrk="1" fontAlgn="auto" latinLnBrk="0" hangingPunct="1">
-              <a:lnSpc>
-                <a:spcPct val="100000"/>
-              </a:lnSpc>
-              <a:spcBef>
-                <a:spcPts val="0"/>
-              </a:spcBef>
-              <a:spcAft>
-                <a:spcPts val="0"/>
-              </a:spcAft>
-              <a:buClrTx/>
-              <a:buSzTx/>
-              <a:buFontTx/>
-              <a:buNone/>
-              <a:tabLst/>
-              <a:defRPr/>
-            </a:pPr>
-            <a:r>
-              <a:rPr kumimoji="0" lang="en-US" sz="7200" b="0" i="0" u="none" strike="noStrike" kern="1200" cap="none" spc="0" normalizeH="0" baseline="0" noProof="0" dirty="0">
-                <a:ln>
-                  <a:noFill/>
-                </a:ln>
-                <a:solidFill>
-                  <a:schemeClr val="tx1"/>
-                </a:solidFill>
-                <a:effectLst/>
-                <a:uLnTx/>
-                <a:uFillTx/>
-                <a:latin typeface="+mn-lt"/>
-                <a:ea typeface="+mn-ea"/>
-                <a:cs typeface="+mn-cs"/>
-              </a:rPr>
-              <a:t>Closures</a:t>
-            </a:r>
+            <a:r>
+              <a:rPr lang="en-US" dirty="0"/>
+              <a:t>Functional programming (FP)</a:t>
+            </a:r>
+            <a:br>
+              <a:rPr lang="en-US" dirty="0"/>
+            </a:br>
+            <a:r>
+              <a:rPr lang="en-US" dirty="0"/>
+              <a:t>Pattern matching</a:t>
+            </a:r>
+          </a:p>
+        </p:txBody>
+      </p:sp>
+      <p:sp>
+        <p:nvSpPr>
+          <p:cNvPr id="3" name="Content Placeholder 2">
+            <a:extLst>
+              <a:ext uri="{FF2B5EF4-FFF2-40B4-BE49-F238E27FC236}">
+                <a16:creationId xmlns:a16="http://schemas.microsoft.com/office/drawing/2014/main" id="{519D56E3-2B90-2A3B-E384-D45FBDF93A21}"/>
+              </a:ext>
+            </a:extLst>
+          </p:cNvPr>
+          <p:cNvSpPr>
+            <a:spLocks noGrp="1"/>
+          </p:cNvSpPr>
+          <p:nvPr>
+            <p:ph idx="1"/>
+          </p:nvPr>
+        </p:nvSpPr>
+        <p:spPr/>
+        <p:txBody>
+          <a:bodyPr/>
+          <a:lstStyle/>
+          <a:p>
+            <a:endParaRPr lang="en-US" dirty="0"/>
           </a:p>
         </p:txBody>
       </p:sp>
     </p:spTree>
     <p:extLst>
       <p:ext uri="{BB962C8B-B14F-4D97-AF65-F5344CB8AC3E}">
-        <p14:creationId xmlns:p14="http://schemas.microsoft.com/office/powerpoint/2010/main" val="2815984157"/>
+        <p14:creationId xmlns:p14="http://schemas.microsoft.com/office/powerpoint/2010/main" val="2815264430"/>
       </p:ext>
     </p:extLst>
   </p:cSld>
@@ -7441,7 +7600,7 @@
                 <a:ea typeface="+mn-ea"/>
                 <a:cs typeface="+mn-cs"/>
               </a:rPr>
-              <a:t>Examples</a:t>
+              <a:t>Closures</a:t>
             </a:r>
           </a:p>
         </p:txBody>
@@ -7449,7 +7608,7 @@
     </p:spTree>
     <p:extLst>
       <p:ext uri="{BB962C8B-B14F-4D97-AF65-F5344CB8AC3E}">
-        <p14:creationId xmlns:p14="http://schemas.microsoft.com/office/powerpoint/2010/main" val="2146797957"/>
+        <p14:creationId xmlns:p14="http://schemas.microsoft.com/office/powerpoint/2010/main" val="2815984157"/>
       </p:ext>
     </p:extLst>
   </p:cSld>
@@ -7481,82 +7640,70 @@
           <p:cNvPr id="2" name="Title 1">
             <a:extLst>
               <a:ext uri="{FF2B5EF4-FFF2-40B4-BE49-F238E27FC236}">
-                <a16:creationId xmlns:a16="http://schemas.microsoft.com/office/drawing/2014/main" id="{7306C212-B3B4-8E92-B9B3-B626EF37EBA4}"/>
+                <a16:creationId xmlns:a16="http://schemas.microsoft.com/office/drawing/2014/main" id="{B6AA4B89-B939-C909-64A3-42C62FB09C80}"/>
               </a:ext>
             </a:extLst>
           </p:cNvPr>
-          <p:cNvSpPr txBox="1">
-            <a:spLocks noGrp="1"/>
-          </p:cNvSpPr>
-          <p:nvPr>
-            <p:ph type="title" idx="4294967295"/>
-          </p:nvPr>
-        </p:nvSpPr>
-        <p:spPr>
-          <a:xfrm>
-            <a:off x="1061794" y="2274838"/>
-            <a:ext cx="10068412" cy="2308324"/>
-          </a:xfrm>
-          <a:prstGeom prst="rect">
-            <a:avLst/>
-          </a:prstGeom>
-          <a:noFill/>
-          <a:ln>
-            <a:noFill/>
-            <a:prstDash/>
-          </a:ln>
-          <a:effectLst/>
-        </p:spPr>
-        <p:txBody>
-          <a:bodyPr rot="0" spcFirstLastPara="0" vertOverflow="overflow" horzOverflow="overflow" vert="horz" wrap="square" lIns="91440" tIns="45720" rIns="91440" bIns="45720" numCol="1" spcCol="0" rtlCol="0" fromWordArt="0" anchor="t" anchorCtr="0" forceAA="0" compatLnSpc="1">
-            <a:prstTxWarp prst="textNoShape">
-              <a:avLst/>
-            </a:prstTxWarp>
-            <a:spAutoFit/>
-          </a:bodyPr>
+          <p:cNvSpPr>
+            <a:spLocks noGrp="1"/>
+          </p:cNvSpPr>
+          <p:nvPr>
+            <p:ph type="title"/>
+          </p:nvPr>
+        </p:nvSpPr>
+        <p:spPr/>
+        <p:txBody>
+          <a:bodyPr/>
           <a:lstStyle/>
           <a:p>
-            <a:pPr marL="0" marR="0" lvl="0" indent="0" algn="ctr" defTabSz="457200" rtl="0" eaLnBrk="1" fontAlgn="auto" latinLnBrk="0" hangingPunct="1">
-              <a:lnSpc>
-                <a:spcPct val="100000"/>
-              </a:lnSpc>
-              <a:spcBef>
-                <a:spcPts val="0"/>
-              </a:spcBef>
-              <a:spcAft>
-                <a:spcPts val="0"/>
-              </a:spcAft>
-              <a:buClrTx/>
-              <a:buSzTx/>
-              <a:buFontTx/>
-              <a:buNone/>
-              <a:tabLst/>
-              <a:defRPr/>
-            </a:pPr>
-            <a:r>
-              <a:rPr kumimoji="0" lang="en-US" sz="7200" b="0" i="0" u="none" strike="noStrike" kern="1200" cap="none" spc="0" normalizeH="0" baseline="0" dirty="0">
-                <a:ln>
-                  <a:noFill/>
-                </a:ln>
-                <a:solidFill>
-                  <a:schemeClr val="tx1"/>
-                </a:solidFill>
-                <a:effectLst/>
-                <a:uLnTx/>
-                <a:uFillTx/>
-                <a:latin typeface="+mn-lt"/>
-                <a:ea typeface="+mn-ea"/>
-                <a:cs typeface="+mn-cs"/>
-              </a:rPr>
-              <a:t>Adopting functional programming</a:t>
-            </a:r>
+            <a:r>
+              <a:rPr lang="de-DE" dirty="0" err="1"/>
+              <a:t>Closures</a:t>
+            </a:r>
+            <a:br>
+              <a:rPr lang="de-DE" dirty="0"/>
+            </a:br>
+            <a:r>
+              <a:rPr lang="de-DE" dirty="0"/>
+              <a:t>Partial </a:t>
+            </a:r>
+            <a:r>
+              <a:rPr lang="de-DE" dirty="0" err="1"/>
+              <a:t>application</a:t>
+            </a:r>
+            <a:endParaRPr lang="en-US" dirty="0"/>
+          </a:p>
+        </p:txBody>
+      </p:sp>
+      <p:sp>
+        <p:nvSpPr>
+          <p:cNvPr id="3" name="Content Placeholder 2">
+            <a:extLst>
+              <a:ext uri="{FF2B5EF4-FFF2-40B4-BE49-F238E27FC236}">
+                <a16:creationId xmlns:a16="http://schemas.microsoft.com/office/drawing/2014/main" id="{51797AC1-F4D1-0A0B-773E-D2CB043B37A1}"/>
+              </a:ext>
+            </a:extLst>
+          </p:cNvPr>
+          <p:cNvSpPr>
+            <a:spLocks noGrp="1"/>
+          </p:cNvSpPr>
+          <p:nvPr>
+            <p:ph idx="1"/>
+          </p:nvPr>
+        </p:nvSpPr>
+        <p:spPr/>
+        <p:txBody>
+          <a:bodyPr/>
+          <a:lstStyle/>
+          <a:p>
+            <a:endParaRPr lang="en-US"/>
           </a:p>
         </p:txBody>
       </p:sp>
     </p:spTree>
     <p:extLst>
       <p:ext uri="{BB962C8B-B14F-4D97-AF65-F5344CB8AC3E}">
-        <p14:creationId xmlns:p14="http://schemas.microsoft.com/office/powerpoint/2010/main" val="1980333425"/>
+        <p14:creationId xmlns:p14="http://schemas.microsoft.com/office/powerpoint/2010/main" val="3067413002"/>
       </p:ext>
     </p:extLst>
   </p:cSld>
@@ -7588,65 +7735,82 @@
           <p:cNvPr id="2" name="Title 1">
             <a:extLst>
               <a:ext uri="{FF2B5EF4-FFF2-40B4-BE49-F238E27FC236}">
-                <a16:creationId xmlns:a16="http://schemas.microsoft.com/office/drawing/2014/main" id="{9F0A4C3A-80AE-E3A6-471D-A74E63C90618}"/>
+                <a16:creationId xmlns:a16="http://schemas.microsoft.com/office/drawing/2014/main" id="{7306C212-B3B4-8E92-B9B3-B626EF37EBA4}"/>
               </a:ext>
             </a:extLst>
           </p:cNvPr>
-          <p:cNvSpPr>
-            <a:spLocks noGrp="1"/>
-          </p:cNvSpPr>
-          <p:nvPr>
-            <p:ph type="title"/>
-          </p:nvPr>
-        </p:nvSpPr>
-        <p:spPr/>
-        <p:txBody>
-          <a:bodyPr/>
+          <p:cNvSpPr txBox="1">
+            <a:spLocks noGrp="1"/>
+          </p:cNvSpPr>
+          <p:nvPr>
+            <p:ph type="title" idx="4294967295"/>
+          </p:nvPr>
+        </p:nvSpPr>
+        <p:spPr>
+          <a:xfrm>
+            <a:off x="1061794" y="2828836"/>
+            <a:ext cx="10068412" cy="1200329"/>
+          </a:xfrm>
+          <a:prstGeom prst="rect">
+            <a:avLst/>
+          </a:prstGeom>
+          <a:noFill/>
+          <a:ln>
+            <a:noFill/>
+            <a:prstDash/>
+          </a:ln>
+          <a:effectLst/>
+        </p:spPr>
+        <p:txBody>
+          <a:bodyPr rot="0" spcFirstLastPara="0" vertOverflow="overflow" horzOverflow="overflow" vert="horz" wrap="square" lIns="91440" tIns="45720" rIns="91440" bIns="45720" numCol="1" spcCol="0" rtlCol="0" fromWordArt="0" anchor="t" anchorCtr="0" forceAA="0" compatLnSpc="1">
+            <a:prstTxWarp prst="textNoShape">
+              <a:avLst/>
+            </a:prstTxWarp>
+            <a:spAutoFit/>
+          </a:bodyPr>
           <a:lstStyle/>
           <a:p>
-            <a:r>
-              <a:rPr lang="en-US" dirty="0"/>
-              <a:t>Adopting functional programming</a:t>
-            </a:r>
-            <a:br>
-              <a:rPr lang="en-US" dirty="0"/>
-            </a:br>
-            <a:r>
-              <a:rPr lang="en-US" dirty="0"/>
-              <a:t>Potential blockers</a:t>
-            </a:r>
-          </a:p>
-        </p:txBody>
-      </p:sp>
-      <p:sp>
-        <p:nvSpPr>
-          <p:cNvPr id="3" name="Content Placeholder 2">
-            <a:extLst>
-              <a:ext uri="{FF2B5EF4-FFF2-40B4-BE49-F238E27FC236}">
-                <a16:creationId xmlns:a16="http://schemas.microsoft.com/office/drawing/2014/main" id="{519D56E3-2B90-2A3B-E384-D45FBDF93A21}"/>
-              </a:ext>
-            </a:extLst>
-          </p:cNvPr>
-          <p:cNvSpPr>
-            <a:spLocks noGrp="1"/>
-          </p:cNvSpPr>
-          <p:nvPr>
-            <p:ph idx="1"/>
-          </p:nvPr>
-        </p:nvSpPr>
-        <p:spPr/>
-        <p:txBody>
-          <a:bodyPr/>
-          <a:lstStyle/>
-          <a:p>
-            <a:endParaRPr lang="en-US" dirty="0"/>
+            <a:pPr marL="0" marR="0" lvl="0" indent="0" algn="ctr" defTabSz="457200" rtl="0" eaLnBrk="1" fontAlgn="auto" latinLnBrk="0" hangingPunct="1">
+              <a:lnSpc>
+                <a:spcPct val="100000"/>
+              </a:lnSpc>
+              <a:spcBef>
+                <a:spcPts val="0"/>
+              </a:spcBef>
+              <a:spcAft>
+                <a:spcPts val="0"/>
+              </a:spcAft>
+              <a:buClrTx/>
+              <a:buSzTx/>
+              <a:buFontTx/>
+              <a:buNone/>
+              <a:tabLst/>
+              <a:defRPr/>
+            </a:pPr>
+            <a:r>
+              <a:rPr kumimoji="0" lang="en-US" sz="7200" b="0" i="0" u="none" strike="noStrike" kern="1200" cap="none" spc="0" normalizeH="0" baseline="0" noProof="0" dirty="0">
+                <a:ln>
+                  <a:noFill/>
+                </a:ln>
+                <a:solidFill>
+                  <a:schemeClr val="tx1"/>
+                </a:solidFill>
+                <a:effectLst/>
+                <a:uLnTx/>
+                <a:uFillTx/>
+                <a:latin typeface="+mn-lt"/>
+                <a:ea typeface="+mn-ea"/>
+                <a:cs typeface="+mn-cs"/>
+              </a:rPr>
+              <a:t>Examples</a:t>
+            </a:r>
           </a:p>
         </p:txBody>
       </p:sp>
     </p:spTree>
     <p:extLst>
       <p:ext uri="{BB962C8B-B14F-4D97-AF65-F5344CB8AC3E}">
-        <p14:creationId xmlns:p14="http://schemas.microsoft.com/office/powerpoint/2010/main" val="2558298236"/>
+        <p14:creationId xmlns:p14="http://schemas.microsoft.com/office/powerpoint/2010/main" val="2146797957"/>
       </p:ext>
     </p:extLst>
   </p:cSld>
@@ -7678,65 +7842,82 @@
           <p:cNvPr id="2" name="Title 1">
             <a:extLst>
               <a:ext uri="{FF2B5EF4-FFF2-40B4-BE49-F238E27FC236}">
-                <a16:creationId xmlns:a16="http://schemas.microsoft.com/office/drawing/2014/main" id="{9F0A4C3A-80AE-E3A6-471D-A74E63C90618}"/>
+                <a16:creationId xmlns:a16="http://schemas.microsoft.com/office/drawing/2014/main" id="{7306C212-B3B4-8E92-B9B3-B626EF37EBA4}"/>
               </a:ext>
             </a:extLst>
           </p:cNvPr>
-          <p:cNvSpPr>
-            <a:spLocks noGrp="1"/>
-          </p:cNvSpPr>
-          <p:nvPr>
-            <p:ph type="title"/>
-          </p:nvPr>
-        </p:nvSpPr>
-        <p:spPr/>
-        <p:txBody>
-          <a:bodyPr/>
+          <p:cNvSpPr txBox="1">
+            <a:spLocks noGrp="1"/>
+          </p:cNvSpPr>
+          <p:nvPr>
+            <p:ph type="title" idx="4294967295"/>
+          </p:nvPr>
+        </p:nvSpPr>
+        <p:spPr>
+          <a:xfrm>
+            <a:off x="1061794" y="2274838"/>
+            <a:ext cx="10068412" cy="2308324"/>
+          </a:xfrm>
+          <a:prstGeom prst="rect">
+            <a:avLst/>
+          </a:prstGeom>
+          <a:noFill/>
+          <a:ln>
+            <a:noFill/>
+            <a:prstDash/>
+          </a:ln>
+          <a:effectLst/>
+        </p:spPr>
+        <p:txBody>
+          <a:bodyPr rot="0" spcFirstLastPara="0" vertOverflow="overflow" horzOverflow="overflow" vert="horz" wrap="square" lIns="91440" tIns="45720" rIns="91440" bIns="45720" numCol="1" spcCol="0" rtlCol="0" fromWordArt="0" anchor="t" anchorCtr="0" forceAA="0" compatLnSpc="1">
+            <a:prstTxWarp prst="textNoShape">
+              <a:avLst/>
+            </a:prstTxWarp>
+            <a:spAutoFit/>
+          </a:bodyPr>
           <a:lstStyle/>
           <a:p>
-            <a:r>
-              <a:rPr lang="en-US" dirty="0"/>
+            <a:pPr marL="0" marR="0" lvl="0" indent="0" algn="ctr" defTabSz="457200" rtl="0" eaLnBrk="1" fontAlgn="auto" latinLnBrk="0" hangingPunct="1">
+              <a:lnSpc>
+                <a:spcPct val="100000"/>
+              </a:lnSpc>
+              <a:spcBef>
+                <a:spcPts val="0"/>
+              </a:spcBef>
+              <a:spcAft>
+                <a:spcPts val="0"/>
+              </a:spcAft>
+              <a:buClrTx/>
+              <a:buSzTx/>
+              <a:buFontTx/>
+              <a:buNone/>
+              <a:tabLst/>
+              <a:defRPr/>
+            </a:pPr>
+            <a:r>
+              <a:rPr kumimoji="0" lang="en-US" sz="7200" b="0" i="0" u="none" strike="noStrike" kern="1200" cap="none" spc="0" normalizeH="0" baseline="0" dirty="0">
+                <a:ln>
+                  <a:noFill/>
+                </a:ln>
+                <a:solidFill>
+                  <a:schemeClr val="tx1"/>
+                </a:solidFill>
+                <a:effectLst/>
+                <a:uLnTx/>
+                <a:uFillTx/>
+                <a:latin typeface="+mn-lt"/>
+                <a:ea typeface="+mn-ea"/>
+                <a:cs typeface="+mn-cs"/>
+              </a:rPr>
               <a:t>Adopting functional programming</a:t>
             </a:r>
-            <a:br>
-              <a:rPr lang="en-US" dirty="0"/>
-            </a:br>
-            <a:r>
-              <a:rPr lang="en-US" dirty="0"/>
-              <a:t>Performance</a:t>
-            </a:r>
-          </a:p>
-        </p:txBody>
-      </p:sp>
-      <p:sp>
-        <p:nvSpPr>
-          <p:cNvPr id="3" name="Content Placeholder 2">
-            <a:extLst>
-              <a:ext uri="{FF2B5EF4-FFF2-40B4-BE49-F238E27FC236}">
-                <a16:creationId xmlns:a16="http://schemas.microsoft.com/office/drawing/2014/main" id="{519D56E3-2B90-2A3B-E384-D45FBDF93A21}"/>
-              </a:ext>
-            </a:extLst>
-          </p:cNvPr>
-          <p:cNvSpPr>
-            <a:spLocks noGrp="1"/>
-          </p:cNvSpPr>
-          <p:nvPr>
-            <p:ph idx="1"/>
-          </p:nvPr>
-        </p:nvSpPr>
-        <p:spPr/>
-        <p:txBody>
-          <a:bodyPr/>
-          <a:lstStyle/>
-          <a:p>
-            <a:endParaRPr lang="en-US" dirty="0"/>
           </a:p>
         </p:txBody>
       </p:sp>
     </p:spTree>
     <p:extLst>
       <p:ext uri="{BB962C8B-B14F-4D97-AF65-F5344CB8AC3E}">
-        <p14:creationId xmlns:p14="http://schemas.microsoft.com/office/powerpoint/2010/main" val="3844268154"/>
+        <p14:creationId xmlns:p14="http://schemas.microsoft.com/office/powerpoint/2010/main" val="1980333425"/>
       </p:ext>
     </p:extLst>
   </p:cSld>
@@ -7890,82 +8071,65 @@
           <p:cNvPr id="2" name="Title 1">
             <a:extLst>
               <a:ext uri="{FF2B5EF4-FFF2-40B4-BE49-F238E27FC236}">
-                <a16:creationId xmlns:a16="http://schemas.microsoft.com/office/drawing/2014/main" id="{7306C212-B3B4-8E92-B9B3-B626EF37EBA4}"/>
+                <a16:creationId xmlns:a16="http://schemas.microsoft.com/office/drawing/2014/main" id="{9F0A4C3A-80AE-E3A6-471D-A74E63C90618}"/>
               </a:ext>
             </a:extLst>
           </p:cNvPr>
-          <p:cNvSpPr txBox="1">
-            <a:spLocks noGrp="1"/>
-          </p:cNvSpPr>
-          <p:nvPr>
-            <p:ph type="title" idx="4294967295"/>
-          </p:nvPr>
-        </p:nvSpPr>
-        <p:spPr>
-          <a:xfrm>
-            <a:off x="1061794" y="2828836"/>
-            <a:ext cx="10068412" cy="1200329"/>
-          </a:xfrm>
-          <a:prstGeom prst="rect">
-            <a:avLst/>
-          </a:prstGeom>
-          <a:noFill/>
-          <a:ln>
-            <a:noFill/>
-            <a:prstDash/>
-          </a:ln>
-          <a:effectLst/>
-        </p:spPr>
-        <p:txBody>
-          <a:bodyPr rot="0" spcFirstLastPara="0" vertOverflow="overflow" horzOverflow="overflow" vert="horz" wrap="square" lIns="91440" tIns="45720" rIns="91440" bIns="45720" numCol="1" spcCol="0" rtlCol="0" fromWordArt="0" anchor="t" anchorCtr="0" forceAA="0" compatLnSpc="1">
-            <a:prstTxWarp prst="textNoShape">
-              <a:avLst/>
-            </a:prstTxWarp>
-            <a:spAutoFit/>
-          </a:bodyPr>
+          <p:cNvSpPr>
+            <a:spLocks noGrp="1"/>
+          </p:cNvSpPr>
+          <p:nvPr>
+            <p:ph type="title"/>
+          </p:nvPr>
+        </p:nvSpPr>
+        <p:spPr/>
+        <p:txBody>
+          <a:bodyPr/>
           <a:lstStyle/>
           <a:p>
-            <a:pPr marL="0" marR="0" lvl="0" indent="0" algn="ctr" defTabSz="457200" rtl="0" eaLnBrk="1" fontAlgn="auto" latinLnBrk="0" hangingPunct="1">
-              <a:lnSpc>
-                <a:spcPct val="100000"/>
-              </a:lnSpc>
-              <a:spcBef>
-                <a:spcPts val="0"/>
-              </a:spcBef>
-              <a:spcAft>
-                <a:spcPts val="0"/>
-              </a:spcAft>
-              <a:buClrTx/>
-              <a:buSzTx/>
-              <a:buFontTx/>
-              <a:buNone/>
-              <a:tabLst/>
-              <a:defRPr/>
-            </a:pPr>
-            <a:r>
-              <a:rPr kumimoji="0" lang="en-US" sz="7200" b="0" i="0" u="none" strike="noStrike" kern="1200" cap="none" spc="0" normalizeH="0" baseline="0" noProof="0" dirty="0">
-                <a:ln>
-                  <a:noFill/>
-                </a:ln>
-                <a:solidFill>
-                  <a:schemeClr val="tx1"/>
-                </a:solidFill>
-                <a:effectLst/>
-                <a:uLnTx/>
-                <a:uFillTx/>
-                <a:latin typeface="+mn-lt"/>
-                <a:ea typeface="+mn-ea"/>
-                <a:cs typeface="+mn-cs"/>
-              </a:rPr>
-              <a:t>Next steps</a:t>
-            </a:r>
+            <a:r>
+              <a:rPr lang="en-US" dirty="0"/>
+              <a:t>Adopting functional programming</a:t>
+            </a:r>
+            <a:br>
+              <a:rPr lang="en-US" dirty="0"/>
+            </a:br>
+            <a:r>
+              <a:rPr lang="en-US" dirty="0"/>
+              <a:t>Potential blockers</a:t>
+            </a:r>
+          </a:p>
+        </p:txBody>
+      </p:sp>
+      <p:sp>
+        <p:nvSpPr>
+          <p:cNvPr id="3" name="Content Placeholder 2">
+            <a:extLst>
+              <a:ext uri="{FF2B5EF4-FFF2-40B4-BE49-F238E27FC236}">
+                <a16:creationId xmlns:a16="http://schemas.microsoft.com/office/drawing/2014/main" id="{519D56E3-2B90-2A3B-E384-D45FBDF93A21}"/>
+              </a:ext>
+            </a:extLst>
+          </p:cNvPr>
+          <p:cNvSpPr>
+            <a:spLocks noGrp="1"/>
+          </p:cNvSpPr>
+          <p:nvPr>
+            <p:ph idx="1"/>
+          </p:nvPr>
+        </p:nvSpPr>
+        <p:spPr/>
+        <p:txBody>
+          <a:bodyPr/>
+          <a:lstStyle/>
+          <a:p>
+            <a:endParaRPr lang="en-US" dirty="0"/>
           </a:p>
         </p:txBody>
       </p:sp>
     </p:spTree>
     <p:extLst>
       <p:ext uri="{BB962C8B-B14F-4D97-AF65-F5344CB8AC3E}">
-        <p14:creationId xmlns:p14="http://schemas.microsoft.com/office/powerpoint/2010/main" val="1448221693"/>
+        <p14:creationId xmlns:p14="http://schemas.microsoft.com/office/powerpoint/2010/main" val="2558298236"/>
       </p:ext>
     </p:extLst>
   </p:cSld>
@@ -8015,14 +8179,14 @@
           <a:p>
             <a:r>
               <a:rPr lang="en-US" dirty="0"/>
-              <a:t>Next steps and further resource</a:t>
+              <a:t>Adopting functional programming</a:t>
             </a:r>
             <a:br>
               <a:rPr lang="en-US" dirty="0"/>
             </a:br>
             <a:r>
               <a:rPr lang="en-US" dirty="0"/>
-              <a:t>More FP with C#</a:t>
+              <a:t>Performance</a:t>
             </a:r>
           </a:p>
         </p:txBody>
@@ -8055,7 +8219,7 @@
     </p:spTree>
     <p:extLst>
       <p:ext uri="{BB962C8B-B14F-4D97-AF65-F5344CB8AC3E}">
-        <p14:creationId xmlns:p14="http://schemas.microsoft.com/office/powerpoint/2010/main" val="874669026"/>
+        <p14:creationId xmlns:p14="http://schemas.microsoft.com/office/powerpoint/2010/main" val="3844268154"/>
       </p:ext>
     </p:extLst>
   </p:cSld>
@@ -8087,65 +8251,82 @@
           <p:cNvPr id="2" name="Title 1">
             <a:extLst>
               <a:ext uri="{FF2B5EF4-FFF2-40B4-BE49-F238E27FC236}">
-                <a16:creationId xmlns:a16="http://schemas.microsoft.com/office/drawing/2014/main" id="{9F0A4C3A-80AE-E3A6-471D-A74E63C90618}"/>
+                <a16:creationId xmlns:a16="http://schemas.microsoft.com/office/drawing/2014/main" id="{7306C212-B3B4-8E92-B9B3-B626EF37EBA4}"/>
               </a:ext>
             </a:extLst>
           </p:cNvPr>
-          <p:cNvSpPr>
-            <a:spLocks noGrp="1"/>
-          </p:cNvSpPr>
-          <p:nvPr>
-            <p:ph type="title"/>
-          </p:nvPr>
-        </p:nvSpPr>
-        <p:spPr/>
-        <p:txBody>
-          <a:bodyPr/>
+          <p:cNvSpPr txBox="1">
+            <a:spLocks noGrp="1"/>
+          </p:cNvSpPr>
+          <p:nvPr>
+            <p:ph type="title" idx="4294967295"/>
+          </p:nvPr>
+        </p:nvSpPr>
+        <p:spPr>
+          <a:xfrm>
+            <a:off x="1061794" y="2828836"/>
+            <a:ext cx="10068412" cy="1200329"/>
+          </a:xfrm>
+          <a:prstGeom prst="rect">
+            <a:avLst/>
+          </a:prstGeom>
+          <a:noFill/>
+          <a:ln>
+            <a:noFill/>
+            <a:prstDash/>
+          </a:ln>
+          <a:effectLst/>
+        </p:spPr>
+        <p:txBody>
+          <a:bodyPr rot="0" spcFirstLastPara="0" vertOverflow="overflow" horzOverflow="overflow" vert="horz" wrap="square" lIns="91440" tIns="45720" rIns="91440" bIns="45720" numCol="1" spcCol="0" rtlCol="0" fromWordArt="0" anchor="t" anchorCtr="0" forceAA="0" compatLnSpc="1">
+            <a:prstTxWarp prst="textNoShape">
+              <a:avLst/>
+            </a:prstTxWarp>
+            <a:spAutoFit/>
+          </a:bodyPr>
           <a:lstStyle/>
           <a:p>
-            <a:r>
-              <a:rPr lang="en-US" dirty="0"/>
-              <a:t>Next steps and further resource</a:t>
-            </a:r>
-            <a:br>
-              <a:rPr lang="en-US" dirty="0"/>
-            </a:br>
-            <a:r>
-              <a:rPr lang="en-US" dirty="0"/>
-              <a:t>Functional(-first) languages</a:t>
-            </a:r>
-          </a:p>
-        </p:txBody>
-      </p:sp>
-      <p:sp>
-        <p:nvSpPr>
-          <p:cNvPr id="3" name="Content Placeholder 2">
-            <a:extLst>
-              <a:ext uri="{FF2B5EF4-FFF2-40B4-BE49-F238E27FC236}">
-                <a16:creationId xmlns:a16="http://schemas.microsoft.com/office/drawing/2014/main" id="{519D56E3-2B90-2A3B-E384-D45FBDF93A21}"/>
-              </a:ext>
-            </a:extLst>
-          </p:cNvPr>
-          <p:cNvSpPr>
-            <a:spLocks noGrp="1"/>
-          </p:cNvSpPr>
-          <p:nvPr>
-            <p:ph idx="1"/>
-          </p:nvPr>
-        </p:nvSpPr>
-        <p:spPr/>
-        <p:txBody>
-          <a:bodyPr/>
-          <a:lstStyle/>
-          <a:p>
-            <a:endParaRPr lang="en-US" dirty="0"/>
+            <a:pPr marL="0" marR="0" lvl="0" indent="0" algn="ctr" defTabSz="457200" rtl="0" eaLnBrk="1" fontAlgn="auto" latinLnBrk="0" hangingPunct="1">
+              <a:lnSpc>
+                <a:spcPct val="100000"/>
+              </a:lnSpc>
+              <a:spcBef>
+                <a:spcPts val="0"/>
+              </a:spcBef>
+              <a:spcAft>
+                <a:spcPts val="0"/>
+              </a:spcAft>
+              <a:buClrTx/>
+              <a:buSzTx/>
+              <a:buFontTx/>
+              <a:buNone/>
+              <a:tabLst/>
+              <a:defRPr/>
+            </a:pPr>
+            <a:r>
+              <a:rPr kumimoji="0" lang="en-US" sz="7200" b="0" i="0" u="none" strike="noStrike" kern="1200" cap="none" spc="0" normalizeH="0" baseline="0" noProof="0" dirty="0">
+                <a:ln>
+                  <a:noFill/>
+                </a:ln>
+                <a:solidFill>
+                  <a:schemeClr val="tx1"/>
+                </a:solidFill>
+                <a:effectLst/>
+                <a:uLnTx/>
+                <a:uFillTx/>
+                <a:latin typeface="+mn-lt"/>
+                <a:ea typeface="+mn-ea"/>
+                <a:cs typeface="+mn-cs"/>
+              </a:rPr>
+              <a:t>Next steps</a:t>
+            </a:r>
           </a:p>
         </p:txBody>
       </p:sp>
     </p:spTree>
     <p:extLst>
       <p:ext uri="{BB962C8B-B14F-4D97-AF65-F5344CB8AC3E}">
-        <p14:creationId xmlns:p14="http://schemas.microsoft.com/office/powerpoint/2010/main" val="73239858"/>
+        <p14:creationId xmlns:p14="http://schemas.microsoft.com/office/powerpoint/2010/main" val="1448221693"/>
       </p:ext>
     </p:extLst>
   </p:cSld>
@@ -8202,6 +8383,186 @@
             </a:br>
             <a:r>
               <a:rPr lang="en-US" dirty="0"/>
+              <a:t>More FP with C#</a:t>
+            </a:r>
+          </a:p>
+        </p:txBody>
+      </p:sp>
+      <p:sp>
+        <p:nvSpPr>
+          <p:cNvPr id="3" name="Content Placeholder 2">
+            <a:extLst>
+              <a:ext uri="{FF2B5EF4-FFF2-40B4-BE49-F238E27FC236}">
+                <a16:creationId xmlns:a16="http://schemas.microsoft.com/office/drawing/2014/main" id="{519D56E3-2B90-2A3B-E384-D45FBDF93A21}"/>
+              </a:ext>
+            </a:extLst>
+          </p:cNvPr>
+          <p:cNvSpPr>
+            <a:spLocks noGrp="1"/>
+          </p:cNvSpPr>
+          <p:nvPr>
+            <p:ph idx="1"/>
+          </p:nvPr>
+        </p:nvSpPr>
+        <p:spPr/>
+        <p:txBody>
+          <a:bodyPr/>
+          <a:lstStyle/>
+          <a:p>
+            <a:endParaRPr lang="en-US" dirty="0"/>
+          </a:p>
+        </p:txBody>
+      </p:sp>
+    </p:spTree>
+    <p:extLst>
+      <p:ext uri="{BB962C8B-B14F-4D97-AF65-F5344CB8AC3E}">
+        <p14:creationId xmlns:p14="http://schemas.microsoft.com/office/powerpoint/2010/main" val="874669026"/>
+      </p:ext>
+    </p:extLst>
+  </p:cSld>
+  <p:clrMapOvr>
+    <a:masterClrMapping/>
+  </p:clrMapOvr>
+</p:sld>
+</file>
+
+<file path=ppt/slides/slide24.xml><?xml version="1.0" encoding="utf-8"?>
+<p:sld xmlns:a="http://schemas.openxmlformats.org/drawingml/2006/main" xmlns:r="http://schemas.openxmlformats.org/officeDocument/2006/relationships" xmlns:p="http://schemas.openxmlformats.org/presentationml/2006/main">
+  <p:cSld>
+    <p:spTree>
+      <p:nvGrpSpPr>
+        <p:cNvPr id="1" name=""/>
+        <p:cNvGrpSpPr/>
+        <p:nvPr/>
+      </p:nvGrpSpPr>
+      <p:grpSpPr>
+        <a:xfrm>
+          <a:off x="0" y="0"/>
+          <a:ext cx="0" cy="0"/>
+          <a:chOff x="0" y="0"/>
+          <a:chExt cx="0" cy="0"/>
+        </a:xfrm>
+      </p:grpSpPr>
+      <p:sp>
+        <p:nvSpPr>
+          <p:cNvPr id="2" name="Title 1">
+            <a:extLst>
+              <a:ext uri="{FF2B5EF4-FFF2-40B4-BE49-F238E27FC236}">
+                <a16:creationId xmlns:a16="http://schemas.microsoft.com/office/drawing/2014/main" id="{9F0A4C3A-80AE-E3A6-471D-A74E63C90618}"/>
+              </a:ext>
+            </a:extLst>
+          </p:cNvPr>
+          <p:cNvSpPr>
+            <a:spLocks noGrp="1"/>
+          </p:cNvSpPr>
+          <p:nvPr>
+            <p:ph type="title"/>
+          </p:nvPr>
+        </p:nvSpPr>
+        <p:spPr/>
+        <p:txBody>
+          <a:bodyPr/>
+          <a:lstStyle/>
+          <a:p>
+            <a:r>
+              <a:rPr lang="en-US" dirty="0"/>
+              <a:t>Next steps and further resource</a:t>
+            </a:r>
+            <a:br>
+              <a:rPr lang="en-US" dirty="0"/>
+            </a:br>
+            <a:r>
+              <a:rPr lang="en-US" dirty="0"/>
+              <a:t>Functional(-first) languages</a:t>
+            </a:r>
+          </a:p>
+        </p:txBody>
+      </p:sp>
+      <p:sp>
+        <p:nvSpPr>
+          <p:cNvPr id="3" name="Content Placeholder 2">
+            <a:extLst>
+              <a:ext uri="{FF2B5EF4-FFF2-40B4-BE49-F238E27FC236}">
+                <a16:creationId xmlns:a16="http://schemas.microsoft.com/office/drawing/2014/main" id="{519D56E3-2B90-2A3B-E384-D45FBDF93A21}"/>
+              </a:ext>
+            </a:extLst>
+          </p:cNvPr>
+          <p:cNvSpPr>
+            <a:spLocks noGrp="1"/>
+          </p:cNvSpPr>
+          <p:nvPr>
+            <p:ph idx="1"/>
+          </p:nvPr>
+        </p:nvSpPr>
+        <p:spPr/>
+        <p:txBody>
+          <a:bodyPr/>
+          <a:lstStyle/>
+          <a:p>
+            <a:endParaRPr lang="en-US" dirty="0"/>
+          </a:p>
+        </p:txBody>
+      </p:sp>
+    </p:spTree>
+    <p:extLst>
+      <p:ext uri="{BB962C8B-B14F-4D97-AF65-F5344CB8AC3E}">
+        <p14:creationId xmlns:p14="http://schemas.microsoft.com/office/powerpoint/2010/main" val="73239858"/>
+      </p:ext>
+    </p:extLst>
+  </p:cSld>
+  <p:clrMapOvr>
+    <a:masterClrMapping/>
+  </p:clrMapOvr>
+</p:sld>
+</file>
+
+<file path=ppt/slides/slide25.xml><?xml version="1.0" encoding="utf-8"?>
+<p:sld xmlns:a="http://schemas.openxmlformats.org/drawingml/2006/main" xmlns:r="http://schemas.openxmlformats.org/officeDocument/2006/relationships" xmlns:p="http://schemas.openxmlformats.org/presentationml/2006/main">
+  <p:cSld>
+    <p:spTree>
+      <p:nvGrpSpPr>
+        <p:cNvPr id="1" name=""/>
+        <p:cNvGrpSpPr/>
+        <p:nvPr/>
+      </p:nvGrpSpPr>
+      <p:grpSpPr>
+        <a:xfrm>
+          <a:off x="0" y="0"/>
+          <a:ext cx="0" cy="0"/>
+          <a:chOff x="0" y="0"/>
+          <a:chExt cx="0" cy="0"/>
+        </a:xfrm>
+      </p:grpSpPr>
+      <p:sp>
+        <p:nvSpPr>
+          <p:cNvPr id="2" name="Title 1">
+            <a:extLst>
+              <a:ext uri="{FF2B5EF4-FFF2-40B4-BE49-F238E27FC236}">
+                <a16:creationId xmlns:a16="http://schemas.microsoft.com/office/drawing/2014/main" id="{9F0A4C3A-80AE-E3A6-471D-A74E63C90618}"/>
+              </a:ext>
+            </a:extLst>
+          </p:cNvPr>
+          <p:cNvSpPr>
+            <a:spLocks noGrp="1"/>
+          </p:cNvSpPr>
+          <p:nvPr>
+            <p:ph type="title"/>
+          </p:nvPr>
+        </p:nvSpPr>
+        <p:spPr/>
+        <p:txBody>
+          <a:bodyPr/>
+          <a:lstStyle/>
+          <a:p>
+            <a:r>
+              <a:rPr lang="en-US" dirty="0"/>
+              <a:t>Next steps and further resource</a:t>
+            </a:r>
+            <a:br>
+              <a:rPr lang="en-US" dirty="0"/>
+            </a:br>
+            <a:r>
+              <a:rPr lang="en-US" dirty="0"/>
               <a:t>Learning more about FP</a:t>
             </a:r>
           </a:p>
@@ -8245,7 +8606,7 @@
 </p:sld>
 </file>
 
-<file path=ppt/slides/slide24.xml><?xml version="1.0" encoding="utf-8"?>
+<file path=ppt/slides/slide26.xml><?xml version="1.0" encoding="utf-8"?>
 <p:sld xmlns:a="http://schemas.openxmlformats.org/drawingml/2006/main" xmlns:r="http://schemas.openxmlformats.org/officeDocument/2006/relationships" xmlns:p="http://schemas.openxmlformats.org/presentationml/2006/main">
   <p:cSld>
     <p:spTree>
@@ -8485,7 +8846,7 @@
       </p:sp>
       <p:pic>
         <p:nvPicPr>
-          <p:cNvPr id="9" name="Graphic 8">
+          <p:cNvPr id="9" name="Graphic 8" descr="Mastodon">
             <a:extLst>
               <a:ext uri="{FF2B5EF4-FFF2-40B4-BE49-F238E27FC236}">
                 <a16:creationId xmlns:a16="http://schemas.microsoft.com/office/drawing/2014/main" id="{1F47F66B-111A-E39A-C755-448AA05DD27D}"/>
@@ -8570,7 +8931,7 @@
 </p:sld>
 </file>
 
-<file path=ppt/slides/slide25.xml><?xml version="1.0" encoding="utf-8"?>
+<file path=ppt/slides/slide27.xml><?xml version="1.0" encoding="utf-8"?>
 <p:sld xmlns:a="http://schemas.openxmlformats.org/drawingml/2006/main" xmlns:r="http://schemas.openxmlformats.org/officeDocument/2006/relationships" xmlns:p="http://schemas.openxmlformats.org/presentationml/2006/main">
   <p:cSld>
     <p:spTree>
@@ -8587,45 +8948,6 @@
           <a:chExt cx="0" cy="0"/>
         </a:xfrm>
       </p:grpSpPr>
-      <p:pic>
-        <p:nvPicPr>
-          <p:cNvPr id="4" name="Graphic 3">
-            <a:extLst>
-              <a:ext uri="{FF2B5EF4-FFF2-40B4-BE49-F238E27FC236}">
-                <a16:creationId xmlns:a16="http://schemas.microsoft.com/office/drawing/2014/main" id="{C5C316CD-AE8F-7E66-44D6-77898BBB0EE1}"/>
-              </a:ext>
-            </a:extLst>
-          </p:cNvPr>
-          <p:cNvPicPr>
-            <a:picLocks noChangeAspect="1"/>
-          </p:cNvPicPr>
-          <p:nvPr/>
-        </p:nvPicPr>
-        <p:blipFill>
-          <a:blip r:embed="rId2">
-            <a:extLst>
-              <a:ext uri="{28A0092B-C50C-407E-A947-70E740481C1C}">
-                <a14:useLocalDpi xmlns:a14="http://schemas.microsoft.com/office/drawing/2010/main" val="0"/>
-              </a:ext>
-              <a:ext uri="{96DAC541-7B7A-43D3-8B79-37D633B846F1}">
-                <asvg:svgBlip xmlns:asvg="http://schemas.microsoft.com/office/drawing/2016/SVG/main" r:embed="rId3"/>
-              </a:ext>
-            </a:extLst>
-          </a:blip>
-          <a:stretch>
-            <a:fillRect/>
-          </a:stretch>
-        </p:blipFill>
-        <p:spPr>
-          <a:xfrm>
-            <a:off x="457200" y="6126480"/>
-            <a:ext cx="274320" cy="292855"/>
-          </a:xfrm>
-          <a:prstGeom prst="rect">
-            <a:avLst/>
-          </a:prstGeom>
-        </p:spPr>
-      </p:pic>
       <p:sp>
         <p:nvSpPr>
           <p:cNvPr id="2" name="Title 1">
@@ -8644,7 +8966,7 @@
         </p:nvSpPr>
         <p:spPr>
           <a:xfrm>
-            <a:off x="1061794" y="2828836"/>
+            <a:off x="1061794" y="2832079"/>
             <a:ext cx="10068412" cy="1200329"/>
           </a:xfrm>
           <a:prstGeom prst="rect">
@@ -8718,7 +9040,7 @@
           <p:nvPr/>
         </p:nvPicPr>
         <p:blipFill>
-          <a:blip r:embed="rId4">
+          <a:blip r:embed="rId2">
             <a:extLst>
               <a:ext uri="{28A0092B-C50C-407E-A947-70E740481C1C}">
                 <a14:useLocalDpi xmlns:a14="http://schemas.microsoft.com/office/drawing/2010/main" val="0"/>
@@ -8790,7 +9112,7 @@
           <p:nvPr/>
         </p:nvPicPr>
         <p:blipFill>
-          <a:blip r:embed="rId5">
+          <a:blip r:embed="rId3">
             <a:extLst>
               <a:ext uri="{28A0092B-C50C-407E-A947-70E740481C1C}">
                 <a14:useLocalDpi xmlns:a14="http://schemas.microsoft.com/office/drawing/2010/main" val="0"/>
@@ -8847,6 +9169,45 @@
           </a:p>
         </p:txBody>
       </p:sp>
+      <p:pic>
+        <p:nvPicPr>
+          <p:cNvPr id="4" name="Graphic 3" descr="Mastodon">
+            <a:extLst>
+              <a:ext uri="{FF2B5EF4-FFF2-40B4-BE49-F238E27FC236}">
+                <a16:creationId xmlns:a16="http://schemas.microsoft.com/office/drawing/2014/main" id="{C5C316CD-AE8F-7E66-44D6-77898BBB0EE1}"/>
+              </a:ext>
+            </a:extLst>
+          </p:cNvPr>
+          <p:cNvPicPr>
+            <a:picLocks noChangeAspect="1"/>
+          </p:cNvPicPr>
+          <p:nvPr/>
+        </p:nvPicPr>
+        <p:blipFill>
+          <a:blip r:embed="rId4">
+            <a:extLst>
+              <a:ext uri="{28A0092B-C50C-407E-A947-70E740481C1C}">
+                <a14:useLocalDpi xmlns:a14="http://schemas.microsoft.com/office/drawing/2010/main" val="0"/>
+              </a:ext>
+              <a:ext uri="{96DAC541-7B7A-43D3-8B79-37D633B846F1}">
+                <asvg:svgBlip xmlns:asvg="http://schemas.microsoft.com/office/drawing/2016/SVG/main" r:embed="rId5"/>
+              </a:ext>
+            </a:extLst>
+          </a:blip>
+          <a:stretch>
+            <a:fillRect/>
+          </a:stretch>
+        </p:blipFill>
+        <p:spPr>
+          <a:xfrm>
+            <a:off x="457200" y="6126480"/>
+            <a:ext cx="274320" cy="292855"/>
+          </a:xfrm>
+          <a:prstGeom prst="rect">
+            <a:avLst/>
+          </a:prstGeom>
+        </p:spPr>
+      </p:pic>
       <p:sp>
         <p:nvSpPr>
           <p:cNvPr id="24" name="TextBox 23">
@@ -11466,7 +11827,7 @@
                 <a:ea typeface="+mn-ea"/>
                 <a:cs typeface="+mn-cs"/>
               </a:rPr>
-              <a:t>Orders of functions</a:t>
+              <a:t>Pure functions</a:t>
             </a:r>
           </a:p>
         </p:txBody>

</xml_diff>

<commit_message>
Removed section 'adopting FP' and added two sidebars instead
</commit_message>
<xml_diff>
--- a/doc/GetFuncY.pptx
+++ b/doc/GetFuncY.pptx
@@ -16,22 +16,21 @@
     <p:sldId id="310" r:id="rId10"/>
     <p:sldId id="311" r:id="rId11"/>
     <p:sldId id="312" r:id="rId12"/>
-    <p:sldId id="313" r:id="rId13"/>
-    <p:sldId id="293" r:id="rId14"/>
-    <p:sldId id="301" r:id="rId15"/>
-    <p:sldId id="302" r:id="rId16"/>
-    <p:sldId id="296" r:id="rId17"/>
-    <p:sldId id="314" r:id="rId18"/>
-    <p:sldId id="295" r:id="rId19"/>
-    <p:sldId id="292" r:id="rId20"/>
-    <p:sldId id="307" r:id="rId21"/>
-    <p:sldId id="303" r:id="rId22"/>
-    <p:sldId id="294" r:id="rId23"/>
-    <p:sldId id="304" r:id="rId24"/>
-    <p:sldId id="305" r:id="rId25"/>
-    <p:sldId id="306" r:id="rId26"/>
-    <p:sldId id="284" r:id="rId27"/>
-    <p:sldId id="285" r:id="rId28"/>
+    <p:sldId id="315" r:id="rId13"/>
+    <p:sldId id="313" r:id="rId14"/>
+    <p:sldId id="293" r:id="rId15"/>
+    <p:sldId id="301" r:id="rId16"/>
+    <p:sldId id="302" r:id="rId17"/>
+    <p:sldId id="296" r:id="rId18"/>
+    <p:sldId id="314" r:id="rId19"/>
+    <p:sldId id="295" r:id="rId20"/>
+    <p:sldId id="316" r:id="rId21"/>
+    <p:sldId id="294" r:id="rId22"/>
+    <p:sldId id="304" r:id="rId23"/>
+    <p:sldId id="305" r:id="rId24"/>
+    <p:sldId id="306" r:id="rId25"/>
+    <p:sldId id="284" r:id="rId26"/>
+    <p:sldId id="285" r:id="rId27"/>
   </p:sldIdLst>
   <p:sldSz cx="12192000" cy="6858000"/>
   <p:notesSz cx="6858000" cy="9144000"/>
@@ -324,7 +323,7 @@
           <a:p>
             <a:fld id="{B4B6E119-0B6E-4A43-814F-75CF8686C874}" type="datetimeFigureOut">
               <a:rPr lang="en-US" smtClean="0"/>
-              <a:t>3/31/2023</a:t>
+              <a:t>5/10/2023</a:t>
             </a:fld>
             <a:endParaRPr lang="en-US"/>
           </a:p>
@@ -599,7 +598,7 @@
           <a:p>
             <a:fld id="{B4B6E119-0B6E-4A43-814F-75CF8686C874}" type="datetimeFigureOut">
               <a:rPr lang="en-US" smtClean="0"/>
-              <a:t>3/31/2023</a:t>
+              <a:t>5/10/2023</a:t>
             </a:fld>
             <a:endParaRPr lang="en-US"/>
           </a:p>
@@ -793,7 +792,7 @@
           <a:p>
             <a:fld id="{B4B6E119-0B6E-4A43-814F-75CF8686C874}" type="datetimeFigureOut">
               <a:rPr lang="en-US" smtClean="0"/>
-              <a:t>3/31/2023</a:t>
+              <a:t>5/10/2023</a:t>
             </a:fld>
             <a:endParaRPr lang="en-US"/>
           </a:p>
@@ -1066,7 +1065,7 @@
           <a:p>
             <a:fld id="{B4B6E119-0B6E-4A43-814F-75CF8686C874}" type="datetimeFigureOut">
               <a:rPr lang="en-US" smtClean="0"/>
-              <a:t>3/31/2023</a:t>
+              <a:t>5/10/2023</a:t>
             </a:fld>
             <a:endParaRPr lang="en-US"/>
           </a:p>
@@ -1407,7 +1406,7 @@
           <a:p>
             <a:fld id="{B4B6E119-0B6E-4A43-814F-75CF8686C874}" type="datetimeFigureOut">
               <a:rPr lang="en-US" smtClean="0"/>
-              <a:t>3/31/2023</a:t>
+              <a:t>5/10/2023</a:t>
             </a:fld>
             <a:endParaRPr lang="en-US"/>
           </a:p>
@@ -2030,7 +2029,7 @@
           <a:p>
             <a:fld id="{B4B6E119-0B6E-4A43-814F-75CF8686C874}" type="datetimeFigureOut">
               <a:rPr lang="en-US" smtClean="0"/>
-              <a:t>3/31/2023</a:t>
+              <a:t>5/10/2023</a:t>
             </a:fld>
             <a:endParaRPr lang="en-US"/>
           </a:p>
@@ -2890,7 +2889,7 @@
           <a:p>
             <a:fld id="{B4B6E119-0B6E-4A43-814F-75CF8686C874}" type="datetimeFigureOut">
               <a:rPr lang="en-US" smtClean="0"/>
-              <a:t>3/31/2023</a:t>
+              <a:t>5/10/2023</a:t>
             </a:fld>
             <a:endParaRPr lang="en-US"/>
           </a:p>
@@ -3060,7 +3059,7 @@
           <a:p>
             <a:fld id="{B4B6E119-0B6E-4A43-814F-75CF8686C874}" type="datetimeFigureOut">
               <a:rPr lang="en-US" smtClean="0"/>
-              <a:t>3/31/2023</a:t>
+              <a:t>5/10/2023</a:t>
             </a:fld>
             <a:endParaRPr lang="en-US"/>
           </a:p>
@@ -3240,7 +3239,7 @@
           <a:p>
             <a:fld id="{B4B6E119-0B6E-4A43-814F-75CF8686C874}" type="datetimeFigureOut">
               <a:rPr lang="en-US" smtClean="0"/>
-              <a:t>3/31/2023</a:t>
+              <a:t>5/10/2023</a:t>
             </a:fld>
             <a:endParaRPr lang="en-US"/>
           </a:p>
@@ -3410,7 +3409,7 @@
           <a:p>
             <a:fld id="{B4B6E119-0B6E-4A43-814F-75CF8686C874}" type="datetimeFigureOut">
               <a:rPr lang="en-US" smtClean="0"/>
-              <a:t>3/31/2023</a:t>
+              <a:t>5/10/2023</a:t>
             </a:fld>
             <a:endParaRPr lang="en-US"/>
           </a:p>
@@ -3657,7 +3656,7 @@
           <a:p>
             <a:fld id="{B4B6E119-0B6E-4A43-814F-75CF8686C874}" type="datetimeFigureOut">
               <a:rPr lang="en-US" smtClean="0"/>
-              <a:t>3/31/2023</a:t>
+              <a:t>5/10/2023</a:t>
             </a:fld>
             <a:endParaRPr lang="en-US"/>
           </a:p>
@@ -3949,7 +3948,7 @@
           <a:p>
             <a:fld id="{B4B6E119-0B6E-4A43-814F-75CF8686C874}" type="datetimeFigureOut">
               <a:rPr lang="en-US" smtClean="0"/>
-              <a:t>3/31/2023</a:t>
+              <a:t>5/10/2023</a:t>
             </a:fld>
             <a:endParaRPr lang="en-US"/>
           </a:p>
@@ -4393,7 +4392,7 @@
           <a:p>
             <a:fld id="{B4B6E119-0B6E-4A43-814F-75CF8686C874}" type="datetimeFigureOut">
               <a:rPr lang="en-US" smtClean="0"/>
-              <a:t>3/31/2023</a:t>
+              <a:t>5/10/2023</a:t>
             </a:fld>
             <a:endParaRPr lang="en-US"/>
           </a:p>
@@ -4511,7 +4510,7 @@
           <a:p>
             <a:fld id="{B4B6E119-0B6E-4A43-814F-75CF8686C874}" type="datetimeFigureOut">
               <a:rPr lang="en-US" smtClean="0"/>
-              <a:t>3/31/2023</a:t>
+              <a:t>5/10/2023</a:t>
             </a:fld>
             <a:endParaRPr lang="en-US"/>
           </a:p>
@@ -4606,7 +4605,7 @@
           <a:p>
             <a:fld id="{B4B6E119-0B6E-4A43-814F-75CF8686C874}" type="datetimeFigureOut">
               <a:rPr lang="en-US" smtClean="0"/>
-              <a:t>3/31/2023</a:t>
+              <a:t>5/10/2023</a:t>
             </a:fld>
             <a:endParaRPr lang="en-US"/>
           </a:p>
@@ -4885,7 +4884,7 @@
           <a:p>
             <a:fld id="{B4B6E119-0B6E-4A43-814F-75CF8686C874}" type="datetimeFigureOut">
               <a:rPr lang="en-US" smtClean="0"/>
-              <a:t>3/31/2023</a:t>
+              <a:t>5/10/2023</a:t>
             </a:fld>
             <a:endParaRPr lang="en-US"/>
           </a:p>
@@ -5160,7 +5159,7 @@
           <a:p>
             <a:fld id="{B4B6E119-0B6E-4A43-814F-75CF8686C874}" type="datetimeFigureOut">
               <a:rPr lang="en-US" smtClean="0"/>
-              <a:t>3/31/2023</a:t>
+              <a:t>5/10/2023</a:t>
             </a:fld>
             <a:endParaRPr lang="en-US"/>
           </a:p>
@@ -5589,7 +5588,7 @@
           <a:p>
             <a:fld id="{B4B6E119-0B6E-4A43-814F-75CF8686C874}" type="datetimeFigureOut">
               <a:rPr lang="en-US" smtClean="0"/>
-              <a:t>3/31/2023</a:t>
+              <a:t>5/10/2023</a:t>
             </a:fld>
             <a:endParaRPr lang="en-US"/>
           </a:p>
@@ -7153,7 +7152,7 @@
           <p:cNvPr id="2" name="Title 1">
             <a:extLst>
               <a:ext uri="{FF2B5EF4-FFF2-40B4-BE49-F238E27FC236}">
-                <a16:creationId xmlns:a16="http://schemas.microsoft.com/office/drawing/2014/main" id="{9F0A4C3A-80AE-E3A6-471D-A74E63C90618}"/>
+                <a16:creationId xmlns:a16="http://schemas.microsoft.com/office/drawing/2014/main" id="{BAEA4039-AD4C-CCEC-5481-F6211383D7FE}"/>
               </a:ext>
             </a:extLst>
           </p:cNvPr>
@@ -7171,14 +7170,14 @@
           <a:p>
             <a:r>
               <a:rPr lang="en-US" dirty="0"/>
-              <a:t>Pure functions</a:t>
+              <a:t>Sidebar</a:t>
             </a:r>
             <a:br>
               <a:rPr lang="en-US" dirty="0"/>
             </a:br>
             <a:r>
               <a:rPr lang="en-US" dirty="0"/>
-              <a:t>Advantages</a:t>
+              <a:t>When to optimize for performance</a:t>
             </a:r>
           </a:p>
         </p:txBody>
@@ -7188,7 +7187,7 @@
           <p:cNvPr id="3" name="Content Placeholder 2">
             <a:extLst>
               <a:ext uri="{FF2B5EF4-FFF2-40B4-BE49-F238E27FC236}">
-                <a16:creationId xmlns:a16="http://schemas.microsoft.com/office/drawing/2014/main" id="{519D56E3-2B90-2A3B-E384-D45FBDF93A21}"/>
+                <a16:creationId xmlns:a16="http://schemas.microsoft.com/office/drawing/2014/main" id="{36CB3168-5E46-1D81-2669-2929B58D54B5}"/>
               </a:ext>
             </a:extLst>
           </p:cNvPr>
@@ -7204,17 +7203,66 @@
           <a:bodyPr/>
           <a:lstStyle/>
           <a:p>
-            <a:r>
-              <a:rPr lang="en-US" dirty="0"/>
-              <a:t>Don</a:t>
-            </a:r>
+            <a:endParaRPr lang="en-US" dirty="0"/>
+          </a:p>
+        </p:txBody>
+      </p:sp>
+      <p:sp>
+        <p:nvSpPr>
+          <p:cNvPr id="4" name="Rectangle 3">
+            <a:extLst>
+              <a:ext uri="{FF2B5EF4-FFF2-40B4-BE49-F238E27FC236}">
+                <a16:creationId xmlns:a16="http://schemas.microsoft.com/office/drawing/2014/main" id="{AD0F4012-83B9-697A-AE32-EE5606D6A6FC}"/>
+              </a:ext>
+            </a:extLst>
+          </p:cNvPr>
+          <p:cNvSpPr/>
+          <p:nvPr/>
+        </p:nvSpPr>
+        <p:spPr>
+          <a:xfrm>
+            <a:off x="0" y="0"/>
+            <a:ext cx="228600" cy="6858000"/>
+          </a:xfrm>
+          <a:prstGeom prst="rect">
+            <a:avLst/>
+          </a:prstGeom>
+          <a:solidFill>
+            <a:schemeClr val="tx2"/>
+          </a:solidFill>
+          <a:ln>
+            <a:noFill/>
+          </a:ln>
+        </p:spPr>
+        <p:style>
+          <a:lnRef idx="2">
+            <a:schemeClr val="accent1">
+              <a:shade val="15000"/>
+            </a:schemeClr>
+          </a:lnRef>
+          <a:fillRef idx="1">
+            <a:schemeClr val="accent1"/>
+          </a:fillRef>
+          <a:effectRef idx="0">
+            <a:schemeClr val="accent1"/>
+          </a:effectRef>
+          <a:fontRef idx="minor">
+            <a:schemeClr val="lt1"/>
+          </a:fontRef>
+        </p:style>
+        <p:txBody>
+          <a:bodyPr rtlCol="0" anchor="ctr"/>
+          <a:lstStyle/>
+          <a:p>
+            <a:pPr algn="ctr"/>
+            <a:endParaRPr lang="en-US" dirty="0"/>
           </a:p>
         </p:txBody>
       </p:sp>
     </p:spTree>
     <p:extLst>
       <p:ext uri="{BB962C8B-B14F-4D97-AF65-F5344CB8AC3E}">
-        <p14:creationId xmlns:p14="http://schemas.microsoft.com/office/powerpoint/2010/main" val="1456719261"/>
+        <p14:creationId xmlns:p14="http://schemas.microsoft.com/office/powerpoint/2010/main" val="1147382270"/>
       </p:ext>
     </p:extLst>
   </p:cSld>
@@ -7246,74 +7294,60 @@
           <p:cNvPr id="2" name="Title 1">
             <a:extLst>
               <a:ext uri="{FF2B5EF4-FFF2-40B4-BE49-F238E27FC236}">
-                <a16:creationId xmlns:a16="http://schemas.microsoft.com/office/drawing/2014/main" id="{7306C212-B3B4-8E92-B9B3-B626EF37EBA4}"/>
+                <a16:creationId xmlns:a16="http://schemas.microsoft.com/office/drawing/2014/main" id="{9F0A4C3A-80AE-E3A6-471D-A74E63C90618}"/>
               </a:ext>
             </a:extLst>
           </p:cNvPr>
-          <p:cNvSpPr txBox="1">
-            <a:spLocks noGrp="1"/>
-          </p:cNvSpPr>
-          <p:nvPr>
-            <p:ph type="title" idx="4294967295"/>
-          </p:nvPr>
-        </p:nvSpPr>
-        <p:spPr>
-          <a:xfrm>
-            <a:off x="1061794" y="2274838"/>
-            <a:ext cx="10068412" cy="2308324"/>
-          </a:xfrm>
-          <a:prstGeom prst="rect">
-            <a:avLst/>
-          </a:prstGeom>
-          <a:noFill/>
-          <a:ln>
-            <a:noFill/>
-            <a:prstDash/>
-          </a:ln>
-          <a:effectLst/>
-        </p:spPr>
-        <p:txBody>
-          <a:bodyPr rot="0" spcFirstLastPara="0" vertOverflow="overflow" horzOverflow="overflow" vert="horz" wrap="square" lIns="91440" tIns="45720" rIns="91440" bIns="45720" numCol="1" spcCol="0" rtlCol="0" fromWordArt="0" anchor="t" anchorCtr="0" forceAA="0" compatLnSpc="1">
-            <a:prstTxWarp prst="textNoShape">
-              <a:avLst/>
-            </a:prstTxWarp>
-            <a:spAutoFit/>
-          </a:bodyPr>
+          <p:cNvSpPr>
+            <a:spLocks noGrp="1"/>
+          </p:cNvSpPr>
+          <p:nvPr>
+            <p:ph type="title"/>
+          </p:nvPr>
+        </p:nvSpPr>
+        <p:spPr/>
+        <p:txBody>
+          <a:bodyPr/>
           <a:lstStyle/>
           <a:p>
-            <a:pPr marL="0" marR="0" lvl="0" indent="0" algn="ctr" defTabSz="457200" rtl="0" eaLnBrk="1" fontAlgn="auto" latinLnBrk="0" hangingPunct="1">
-              <a:lnSpc>
-                <a:spcPct val="100000"/>
-              </a:lnSpc>
-              <a:spcBef>
-                <a:spcPts val="0"/>
-              </a:spcBef>
-              <a:spcAft>
-                <a:spcPts val="0"/>
-              </a:spcAft>
-              <a:buClrTx/>
-              <a:buSzTx/>
-              <a:buFontTx/>
-              <a:buNone/>
-              <a:tabLst/>
-              <a:defRPr/>
-            </a:pPr>
-            <a:r>
-              <a:rPr kumimoji="0" lang="en-US" sz="7200" b="0" i="0" u="none" strike="noStrike" kern="1200" cap="none" spc="0" normalizeH="0" baseline="0" noProof="0" dirty="0">
-                <a:ln>
-                  <a:noFill/>
-                </a:ln>
-                <a:solidFill>
-                  <a:schemeClr val="tx1"/>
-                </a:solidFill>
-                <a:effectLst/>
-                <a:uLnTx/>
-                <a:uFillTx/>
-                <a:latin typeface="+mn-lt"/>
-                <a:ea typeface="+mn-ea"/>
-                <a:cs typeface="+mn-cs"/>
-              </a:rPr>
-              <a:t>Functional programming</a:t>
+            <a:r>
+              <a:rPr lang="en-US" dirty="0"/>
+              <a:t>Pure functions</a:t>
+            </a:r>
+            <a:br>
+              <a:rPr lang="en-US" dirty="0"/>
+            </a:br>
+            <a:r>
+              <a:rPr lang="en-US" dirty="0"/>
+              <a:t>Advantages</a:t>
+            </a:r>
+          </a:p>
+        </p:txBody>
+      </p:sp>
+      <p:sp>
+        <p:nvSpPr>
+          <p:cNvPr id="3" name="Content Placeholder 2">
+            <a:extLst>
+              <a:ext uri="{FF2B5EF4-FFF2-40B4-BE49-F238E27FC236}">
+                <a16:creationId xmlns:a16="http://schemas.microsoft.com/office/drawing/2014/main" id="{519D56E3-2B90-2A3B-E384-D45FBDF93A21}"/>
+              </a:ext>
+            </a:extLst>
+          </p:cNvPr>
+          <p:cNvSpPr>
+            <a:spLocks noGrp="1"/>
+          </p:cNvSpPr>
+          <p:nvPr>
+            <p:ph idx="1"/>
+          </p:nvPr>
+        </p:nvSpPr>
+        <p:spPr/>
+        <p:txBody>
+          <a:bodyPr/>
+          <a:lstStyle/>
+          <a:p>
+            <a:r>
+              <a:rPr lang="en-US" dirty="0"/>
+              <a:t>Don</a:t>
             </a:r>
           </a:p>
         </p:txBody>
@@ -7321,7 +7355,7 @@
     </p:spTree>
     <p:extLst>
       <p:ext uri="{BB962C8B-B14F-4D97-AF65-F5344CB8AC3E}">
-        <p14:creationId xmlns:p14="http://schemas.microsoft.com/office/powerpoint/2010/main" val="3310324046"/>
+        <p14:creationId xmlns:p14="http://schemas.microsoft.com/office/powerpoint/2010/main" val="1456719261"/>
       </p:ext>
     </p:extLst>
   </p:cSld>
@@ -7353,65 +7387,82 @@
           <p:cNvPr id="2" name="Title 1">
             <a:extLst>
               <a:ext uri="{FF2B5EF4-FFF2-40B4-BE49-F238E27FC236}">
-                <a16:creationId xmlns:a16="http://schemas.microsoft.com/office/drawing/2014/main" id="{9F0A4C3A-80AE-E3A6-471D-A74E63C90618}"/>
+                <a16:creationId xmlns:a16="http://schemas.microsoft.com/office/drawing/2014/main" id="{7306C212-B3B4-8E92-B9B3-B626EF37EBA4}"/>
               </a:ext>
             </a:extLst>
           </p:cNvPr>
-          <p:cNvSpPr>
-            <a:spLocks noGrp="1"/>
-          </p:cNvSpPr>
-          <p:nvPr>
-            <p:ph type="title"/>
-          </p:nvPr>
-        </p:nvSpPr>
-        <p:spPr/>
-        <p:txBody>
-          <a:bodyPr/>
+          <p:cNvSpPr txBox="1">
+            <a:spLocks noGrp="1"/>
+          </p:cNvSpPr>
+          <p:nvPr>
+            <p:ph type="title" idx="4294967295"/>
+          </p:nvPr>
+        </p:nvSpPr>
+        <p:spPr>
+          <a:xfrm>
+            <a:off x="1061794" y="2274838"/>
+            <a:ext cx="10068412" cy="2308324"/>
+          </a:xfrm>
+          <a:prstGeom prst="rect">
+            <a:avLst/>
+          </a:prstGeom>
+          <a:noFill/>
+          <a:ln>
+            <a:noFill/>
+            <a:prstDash/>
+          </a:ln>
+          <a:effectLst/>
+        </p:spPr>
+        <p:txBody>
+          <a:bodyPr rot="0" spcFirstLastPara="0" vertOverflow="overflow" horzOverflow="overflow" vert="horz" wrap="square" lIns="91440" tIns="45720" rIns="91440" bIns="45720" numCol="1" spcCol="0" rtlCol="0" fromWordArt="0" anchor="t" anchorCtr="0" forceAA="0" compatLnSpc="1">
+            <a:prstTxWarp prst="textNoShape">
+              <a:avLst/>
+            </a:prstTxWarp>
+            <a:spAutoFit/>
+          </a:bodyPr>
           <a:lstStyle/>
           <a:p>
-            <a:r>
-              <a:rPr lang="en-US" dirty="0"/>
-              <a:t>Functional programming (FP)</a:t>
-            </a:r>
-            <a:br>
-              <a:rPr lang="en-US" dirty="0"/>
-            </a:br>
-            <a:r>
-              <a:rPr lang="en-US" dirty="0"/>
-              <a:t>Definition</a:t>
-            </a:r>
-          </a:p>
-        </p:txBody>
-      </p:sp>
-      <p:sp>
-        <p:nvSpPr>
-          <p:cNvPr id="3" name="Content Placeholder 2">
-            <a:extLst>
-              <a:ext uri="{FF2B5EF4-FFF2-40B4-BE49-F238E27FC236}">
-                <a16:creationId xmlns:a16="http://schemas.microsoft.com/office/drawing/2014/main" id="{519D56E3-2B90-2A3B-E384-D45FBDF93A21}"/>
-              </a:ext>
-            </a:extLst>
-          </p:cNvPr>
-          <p:cNvSpPr>
-            <a:spLocks noGrp="1"/>
-          </p:cNvSpPr>
-          <p:nvPr>
-            <p:ph idx="1"/>
-          </p:nvPr>
-        </p:nvSpPr>
-        <p:spPr/>
-        <p:txBody>
-          <a:bodyPr/>
-          <a:lstStyle/>
-          <a:p>
-            <a:endParaRPr lang="en-US" dirty="0"/>
+            <a:pPr marL="0" marR="0" lvl="0" indent="0" algn="ctr" defTabSz="457200" rtl="0" eaLnBrk="1" fontAlgn="auto" latinLnBrk="0" hangingPunct="1">
+              <a:lnSpc>
+                <a:spcPct val="100000"/>
+              </a:lnSpc>
+              <a:spcBef>
+                <a:spcPts val="0"/>
+              </a:spcBef>
+              <a:spcAft>
+                <a:spcPts val="0"/>
+              </a:spcAft>
+              <a:buClrTx/>
+              <a:buSzTx/>
+              <a:buFontTx/>
+              <a:buNone/>
+              <a:tabLst/>
+              <a:defRPr/>
+            </a:pPr>
+            <a:r>
+              <a:rPr kumimoji="0" lang="en-US" sz="7200" b="0" i="0" u="none" strike="noStrike" kern="1200" cap="none" spc="0" normalizeH="0" baseline="0" noProof="0" dirty="0">
+                <a:ln>
+                  <a:noFill/>
+                </a:ln>
+                <a:solidFill>
+                  <a:schemeClr val="tx1"/>
+                </a:solidFill>
+                <a:effectLst/>
+                <a:uLnTx/>
+                <a:uFillTx/>
+                <a:latin typeface="+mn-lt"/>
+                <a:ea typeface="+mn-ea"/>
+                <a:cs typeface="+mn-cs"/>
+              </a:rPr>
+              <a:t>Functional programming</a:t>
+            </a:r>
           </a:p>
         </p:txBody>
       </p:sp>
     </p:spTree>
     <p:extLst>
       <p:ext uri="{BB962C8B-B14F-4D97-AF65-F5344CB8AC3E}">
-        <p14:creationId xmlns:p14="http://schemas.microsoft.com/office/powerpoint/2010/main" val="98042496"/>
+        <p14:creationId xmlns:p14="http://schemas.microsoft.com/office/powerpoint/2010/main" val="3310324046"/>
       </p:ext>
     </p:extLst>
   </p:cSld>
@@ -7468,7 +7519,7 @@
             </a:br>
             <a:r>
               <a:rPr lang="en-US" dirty="0"/>
-              <a:t>Pattern matching</a:t>
+              <a:t>Definition</a:t>
             </a:r>
           </a:p>
         </p:txBody>
@@ -7501,7 +7552,7 @@
     </p:spTree>
     <p:extLst>
       <p:ext uri="{BB962C8B-B14F-4D97-AF65-F5344CB8AC3E}">
-        <p14:creationId xmlns:p14="http://schemas.microsoft.com/office/powerpoint/2010/main" val="2815264430"/>
+        <p14:creationId xmlns:p14="http://schemas.microsoft.com/office/powerpoint/2010/main" val="98042496"/>
       </p:ext>
     </p:extLst>
   </p:cSld>
@@ -7533,82 +7584,65 @@
           <p:cNvPr id="2" name="Title 1">
             <a:extLst>
               <a:ext uri="{FF2B5EF4-FFF2-40B4-BE49-F238E27FC236}">
-                <a16:creationId xmlns:a16="http://schemas.microsoft.com/office/drawing/2014/main" id="{7306C212-B3B4-8E92-B9B3-B626EF37EBA4}"/>
+                <a16:creationId xmlns:a16="http://schemas.microsoft.com/office/drawing/2014/main" id="{9F0A4C3A-80AE-E3A6-471D-A74E63C90618}"/>
               </a:ext>
             </a:extLst>
           </p:cNvPr>
-          <p:cNvSpPr txBox="1">
-            <a:spLocks noGrp="1"/>
-          </p:cNvSpPr>
-          <p:nvPr>
-            <p:ph type="title" idx="4294967295"/>
-          </p:nvPr>
-        </p:nvSpPr>
-        <p:spPr>
-          <a:xfrm>
-            <a:off x="1061794" y="2828836"/>
-            <a:ext cx="10068412" cy="1200329"/>
-          </a:xfrm>
-          <a:prstGeom prst="rect">
-            <a:avLst/>
-          </a:prstGeom>
-          <a:noFill/>
-          <a:ln>
-            <a:noFill/>
-            <a:prstDash/>
-          </a:ln>
-          <a:effectLst/>
-        </p:spPr>
-        <p:txBody>
-          <a:bodyPr rot="0" spcFirstLastPara="0" vertOverflow="overflow" horzOverflow="overflow" vert="horz" wrap="square" lIns="91440" tIns="45720" rIns="91440" bIns="45720" numCol="1" spcCol="0" rtlCol="0" fromWordArt="0" anchor="t" anchorCtr="0" forceAA="0" compatLnSpc="1">
-            <a:prstTxWarp prst="textNoShape">
-              <a:avLst/>
-            </a:prstTxWarp>
-            <a:spAutoFit/>
-          </a:bodyPr>
+          <p:cNvSpPr>
+            <a:spLocks noGrp="1"/>
+          </p:cNvSpPr>
+          <p:nvPr>
+            <p:ph type="title"/>
+          </p:nvPr>
+        </p:nvSpPr>
+        <p:spPr/>
+        <p:txBody>
+          <a:bodyPr/>
           <a:lstStyle/>
           <a:p>
-            <a:pPr marL="0" marR="0" lvl="0" indent="0" algn="ctr" defTabSz="457200" rtl="0" eaLnBrk="1" fontAlgn="auto" latinLnBrk="0" hangingPunct="1">
-              <a:lnSpc>
-                <a:spcPct val="100000"/>
-              </a:lnSpc>
-              <a:spcBef>
-                <a:spcPts val="0"/>
-              </a:spcBef>
-              <a:spcAft>
-                <a:spcPts val="0"/>
-              </a:spcAft>
-              <a:buClrTx/>
-              <a:buSzTx/>
-              <a:buFontTx/>
-              <a:buNone/>
-              <a:tabLst/>
-              <a:defRPr/>
-            </a:pPr>
-            <a:r>
-              <a:rPr kumimoji="0" lang="en-US" sz="7200" b="0" i="0" u="none" strike="noStrike" kern="1200" cap="none" spc="0" normalizeH="0" baseline="0" noProof="0" dirty="0">
-                <a:ln>
-                  <a:noFill/>
-                </a:ln>
-                <a:solidFill>
-                  <a:schemeClr val="tx1"/>
-                </a:solidFill>
-                <a:effectLst/>
-                <a:uLnTx/>
-                <a:uFillTx/>
-                <a:latin typeface="+mn-lt"/>
-                <a:ea typeface="+mn-ea"/>
-                <a:cs typeface="+mn-cs"/>
-              </a:rPr>
-              <a:t>Closures</a:t>
-            </a:r>
+            <a:r>
+              <a:rPr lang="en-US" dirty="0"/>
+              <a:t>Functional programming (FP)</a:t>
+            </a:r>
+            <a:br>
+              <a:rPr lang="en-US" dirty="0"/>
+            </a:br>
+            <a:r>
+              <a:rPr lang="en-US" dirty="0"/>
+              <a:t>Pattern matching</a:t>
+            </a:r>
+          </a:p>
+        </p:txBody>
+      </p:sp>
+      <p:sp>
+        <p:nvSpPr>
+          <p:cNvPr id="3" name="Content Placeholder 2">
+            <a:extLst>
+              <a:ext uri="{FF2B5EF4-FFF2-40B4-BE49-F238E27FC236}">
+                <a16:creationId xmlns:a16="http://schemas.microsoft.com/office/drawing/2014/main" id="{519D56E3-2B90-2A3B-E384-D45FBDF93A21}"/>
+              </a:ext>
+            </a:extLst>
+          </p:cNvPr>
+          <p:cNvSpPr>
+            <a:spLocks noGrp="1"/>
+          </p:cNvSpPr>
+          <p:nvPr>
+            <p:ph idx="1"/>
+          </p:nvPr>
+        </p:nvSpPr>
+        <p:spPr/>
+        <p:txBody>
+          <a:bodyPr/>
+          <a:lstStyle/>
+          <a:p>
+            <a:endParaRPr lang="en-US" dirty="0"/>
           </a:p>
         </p:txBody>
       </p:sp>
     </p:spTree>
     <p:extLst>
       <p:ext uri="{BB962C8B-B14F-4D97-AF65-F5344CB8AC3E}">
-        <p14:creationId xmlns:p14="http://schemas.microsoft.com/office/powerpoint/2010/main" val="2815984157"/>
+        <p14:creationId xmlns:p14="http://schemas.microsoft.com/office/powerpoint/2010/main" val="2815264430"/>
       </p:ext>
     </p:extLst>
   </p:cSld>
@@ -7640,70 +7674,82 @@
           <p:cNvPr id="2" name="Title 1">
             <a:extLst>
               <a:ext uri="{FF2B5EF4-FFF2-40B4-BE49-F238E27FC236}">
-                <a16:creationId xmlns:a16="http://schemas.microsoft.com/office/drawing/2014/main" id="{B6AA4B89-B939-C909-64A3-42C62FB09C80}"/>
+                <a16:creationId xmlns:a16="http://schemas.microsoft.com/office/drawing/2014/main" id="{7306C212-B3B4-8E92-B9B3-B626EF37EBA4}"/>
               </a:ext>
             </a:extLst>
           </p:cNvPr>
-          <p:cNvSpPr>
-            <a:spLocks noGrp="1"/>
-          </p:cNvSpPr>
-          <p:nvPr>
-            <p:ph type="title"/>
-          </p:nvPr>
-        </p:nvSpPr>
-        <p:spPr/>
-        <p:txBody>
-          <a:bodyPr/>
+          <p:cNvSpPr txBox="1">
+            <a:spLocks noGrp="1"/>
+          </p:cNvSpPr>
+          <p:nvPr>
+            <p:ph type="title" idx="4294967295"/>
+          </p:nvPr>
+        </p:nvSpPr>
+        <p:spPr>
+          <a:xfrm>
+            <a:off x="1061794" y="2828836"/>
+            <a:ext cx="10068412" cy="1200329"/>
+          </a:xfrm>
+          <a:prstGeom prst="rect">
+            <a:avLst/>
+          </a:prstGeom>
+          <a:noFill/>
+          <a:ln>
+            <a:noFill/>
+            <a:prstDash/>
+          </a:ln>
+          <a:effectLst/>
+        </p:spPr>
+        <p:txBody>
+          <a:bodyPr rot="0" spcFirstLastPara="0" vertOverflow="overflow" horzOverflow="overflow" vert="horz" wrap="square" lIns="91440" tIns="45720" rIns="91440" bIns="45720" numCol="1" spcCol="0" rtlCol="0" fromWordArt="0" anchor="t" anchorCtr="0" forceAA="0" compatLnSpc="1">
+            <a:prstTxWarp prst="textNoShape">
+              <a:avLst/>
+            </a:prstTxWarp>
+            <a:spAutoFit/>
+          </a:bodyPr>
           <a:lstStyle/>
           <a:p>
-            <a:r>
-              <a:rPr lang="de-DE" dirty="0" err="1"/>
+            <a:pPr marL="0" marR="0" lvl="0" indent="0" algn="ctr" defTabSz="457200" rtl="0" eaLnBrk="1" fontAlgn="auto" latinLnBrk="0" hangingPunct="1">
+              <a:lnSpc>
+                <a:spcPct val="100000"/>
+              </a:lnSpc>
+              <a:spcBef>
+                <a:spcPts val="0"/>
+              </a:spcBef>
+              <a:spcAft>
+                <a:spcPts val="0"/>
+              </a:spcAft>
+              <a:buClrTx/>
+              <a:buSzTx/>
+              <a:buFontTx/>
+              <a:buNone/>
+              <a:tabLst/>
+              <a:defRPr/>
+            </a:pPr>
+            <a:r>
+              <a:rPr kumimoji="0" lang="en-US" sz="7200" b="0" i="0" u="none" strike="noStrike" kern="1200" cap="none" spc="0" normalizeH="0" baseline="0" noProof="0" dirty="0">
+                <a:ln>
+                  <a:noFill/>
+                </a:ln>
+                <a:solidFill>
+                  <a:schemeClr val="tx1"/>
+                </a:solidFill>
+                <a:effectLst/>
+                <a:uLnTx/>
+                <a:uFillTx/>
+                <a:latin typeface="+mn-lt"/>
+                <a:ea typeface="+mn-ea"/>
+                <a:cs typeface="+mn-cs"/>
+              </a:rPr>
               <a:t>Closures</a:t>
             </a:r>
-            <a:br>
-              <a:rPr lang="de-DE" dirty="0"/>
-            </a:br>
-            <a:r>
-              <a:rPr lang="de-DE" dirty="0"/>
-              <a:t>Partial </a:t>
-            </a:r>
-            <a:r>
-              <a:rPr lang="de-DE" dirty="0" err="1"/>
-              <a:t>application</a:t>
-            </a:r>
-            <a:endParaRPr lang="en-US" dirty="0"/>
-          </a:p>
-        </p:txBody>
-      </p:sp>
-      <p:sp>
-        <p:nvSpPr>
-          <p:cNvPr id="3" name="Content Placeholder 2">
-            <a:extLst>
-              <a:ext uri="{FF2B5EF4-FFF2-40B4-BE49-F238E27FC236}">
-                <a16:creationId xmlns:a16="http://schemas.microsoft.com/office/drawing/2014/main" id="{51797AC1-F4D1-0A0B-773E-D2CB043B37A1}"/>
-              </a:ext>
-            </a:extLst>
-          </p:cNvPr>
-          <p:cNvSpPr>
-            <a:spLocks noGrp="1"/>
-          </p:cNvSpPr>
-          <p:nvPr>
-            <p:ph idx="1"/>
-          </p:nvPr>
-        </p:nvSpPr>
-        <p:spPr/>
-        <p:txBody>
-          <a:bodyPr/>
-          <a:lstStyle/>
-          <a:p>
-            <a:endParaRPr lang="en-US"/>
           </a:p>
         </p:txBody>
       </p:sp>
     </p:spTree>
     <p:extLst>
       <p:ext uri="{BB962C8B-B14F-4D97-AF65-F5344CB8AC3E}">
-        <p14:creationId xmlns:p14="http://schemas.microsoft.com/office/powerpoint/2010/main" val="3067413002"/>
+        <p14:creationId xmlns:p14="http://schemas.microsoft.com/office/powerpoint/2010/main" val="2815984157"/>
       </p:ext>
     </p:extLst>
   </p:cSld>
@@ -7735,82 +7781,70 @@
           <p:cNvPr id="2" name="Title 1">
             <a:extLst>
               <a:ext uri="{FF2B5EF4-FFF2-40B4-BE49-F238E27FC236}">
-                <a16:creationId xmlns:a16="http://schemas.microsoft.com/office/drawing/2014/main" id="{7306C212-B3B4-8E92-B9B3-B626EF37EBA4}"/>
+                <a16:creationId xmlns:a16="http://schemas.microsoft.com/office/drawing/2014/main" id="{B6AA4B89-B939-C909-64A3-42C62FB09C80}"/>
               </a:ext>
             </a:extLst>
           </p:cNvPr>
-          <p:cNvSpPr txBox="1">
-            <a:spLocks noGrp="1"/>
-          </p:cNvSpPr>
-          <p:nvPr>
-            <p:ph type="title" idx="4294967295"/>
-          </p:nvPr>
-        </p:nvSpPr>
-        <p:spPr>
-          <a:xfrm>
-            <a:off x="1061794" y="2828836"/>
-            <a:ext cx="10068412" cy="1200329"/>
-          </a:xfrm>
-          <a:prstGeom prst="rect">
-            <a:avLst/>
-          </a:prstGeom>
-          <a:noFill/>
-          <a:ln>
-            <a:noFill/>
-            <a:prstDash/>
-          </a:ln>
-          <a:effectLst/>
-        </p:spPr>
-        <p:txBody>
-          <a:bodyPr rot="0" spcFirstLastPara="0" vertOverflow="overflow" horzOverflow="overflow" vert="horz" wrap="square" lIns="91440" tIns="45720" rIns="91440" bIns="45720" numCol="1" spcCol="0" rtlCol="0" fromWordArt="0" anchor="t" anchorCtr="0" forceAA="0" compatLnSpc="1">
-            <a:prstTxWarp prst="textNoShape">
-              <a:avLst/>
-            </a:prstTxWarp>
-            <a:spAutoFit/>
-          </a:bodyPr>
+          <p:cNvSpPr>
+            <a:spLocks noGrp="1"/>
+          </p:cNvSpPr>
+          <p:nvPr>
+            <p:ph type="title"/>
+          </p:nvPr>
+        </p:nvSpPr>
+        <p:spPr/>
+        <p:txBody>
+          <a:bodyPr/>
           <a:lstStyle/>
           <a:p>
-            <a:pPr marL="0" marR="0" lvl="0" indent="0" algn="ctr" defTabSz="457200" rtl="0" eaLnBrk="1" fontAlgn="auto" latinLnBrk="0" hangingPunct="1">
-              <a:lnSpc>
-                <a:spcPct val="100000"/>
-              </a:lnSpc>
-              <a:spcBef>
-                <a:spcPts val="0"/>
-              </a:spcBef>
-              <a:spcAft>
-                <a:spcPts val="0"/>
-              </a:spcAft>
-              <a:buClrTx/>
-              <a:buSzTx/>
-              <a:buFontTx/>
-              <a:buNone/>
-              <a:tabLst/>
-              <a:defRPr/>
-            </a:pPr>
-            <a:r>
-              <a:rPr kumimoji="0" lang="en-US" sz="7200" b="0" i="0" u="none" strike="noStrike" kern="1200" cap="none" spc="0" normalizeH="0" baseline="0" noProof="0" dirty="0">
-                <a:ln>
-                  <a:noFill/>
-                </a:ln>
-                <a:solidFill>
-                  <a:schemeClr val="tx1"/>
-                </a:solidFill>
-                <a:effectLst/>
-                <a:uLnTx/>
-                <a:uFillTx/>
-                <a:latin typeface="+mn-lt"/>
-                <a:ea typeface="+mn-ea"/>
-                <a:cs typeface="+mn-cs"/>
-              </a:rPr>
-              <a:t>Examples</a:t>
-            </a:r>
+            <a:r>
+              <a:rPr lang="de-DE" dirty="0" err="1"/>
+              <a:t>Closures</a:t>
+            </a:r>
+            <a:br>
+              <a:rPr lang="de-DE" dirty="0"/>
+            </a:br>
+            <a:r>
+              <a:rPr lang="de-DE" dirty="0"/>
+              <a:t>Partial </a:t>
+            </a:r>
+            <a:r>
+              <a:rPr lang="de-DE" dirty="0" err="1"/>
+              <a:t>application</a:t>
+            </a:r>
+            <a:endParaRPr lang="en-US" dirty="0"/>
+          </a:p>
+        </p:txBody>
+      </p:sp>
+      <p:sp>
+        <p:nvSpPr>
+          <p:cNvPr id="3" name="Content Placeholder 2">
+            <a:extLst>
+              <a:ext uri="{FF2B5EF4-FFF2-40B4-BE49-F238E27FC236}">
+                <a16:creationId xmlns:a16="http://schemas.microsoft.com/office/drawing/2014/main" id="{51797AC1-F4D1-0A0B-773E-D2CB043B37A1}"/>
+              </a:ext>
+            </a:extLst>
+          </p:cNvPr>
+          <p:cNvSpPr>
+            <a:spLocks noGrp="1"/>
+          </p:cNvSpPr>
+          <p:nvPr>
+            <p:ph idx="1"/>
+          </p:nvPr>
+        </p:nvSpPr>
+        <p:spPr/>
+        <p:txBody>
+          <a:bodyPr/>
+          <a:lstStyle/>
+          <a:p>
+            <a:endParaRPr lang="en-US"/>
           </a:p>
         </p:txBody>
       </p:sp>
     </p:spTree>
     <p:extLst>
       <p:ext uri="{BB962C8B-B14F-4D97-AF65-F5344CB8AC3E}">
-        <p14:creationId xmlns:p14="http://schemas.microsoft.com/office/powerpoint/2010/main" val="2146797957"/>
+        <p14:creationId xmlns:p14="http://schemas.microsoft.com/office/powerpoint/2010/main" val="3067413002"/>
       </p:ext>
     </p:extLst>
   </p:cSld>
@@ -7855,8 +7889,8 @@
         </p:nvSpPr>
         <p:spPr>
           <a:xfrm>
-            <a:off x="1061794" y="2274838"/>
-            <a:ext cx="10068412" cy="2308324"/>
+            <a:off x="1061794" y="2828836"/>
+            <a:ext cx="10068412" cy="1200329"/>
           </a:xfrm>
           <a:prstGeom prst="rect">
             <a:avLst/>
@@ -7895,7 +7929,7 @@
               <a:defRPr/>
             </a:pPr>
             <a:r>
-              <a:rPr kumimoji="0" lang="en-US" sz="7200" b="0" i="0" u="none" strike="noStrike" kern="1200" cap="none" spc="0" normalizeH="0" baseline="0" dirty="0">
+              <a:rPr kumimoji="0" lang="en-US" sz="7200" b="0" i="0" u="none" strike="noStrike" kern="1200" cap="none" spc="0" normalizeH="0" baseline="0" noProof="0" dirty="0">
                 <a:ln>
                   <a:noFill/>
                 </a:ln>
@@ -7909,7 +7943,7 @@
                 <a:ea typeface="+mn-ea"/>
                 <a:cs typeface="+mn-cs"/>
               </a:rPr>
-              <a:t>Adopting functional programming</a:t>
+              <a:t>Examples</a:t>
             </a:r>
           </a:p>
         </p:txBody>
@@ -7917,7 +7951,7 @@
     </p:spTree>
     <p:extLst>
       <p:ext uri="{BB962C8B-B14F-4D97-AF65-F5344CB8AC3E}">
-        <p14:creationId xmlns:p14="http://schemas.microsoft.com/office/powerpoint/2010/main" val="1980333425"/>
+        <p14:creationId xmlns:p14="http://schemas.microsoft.com/office/powerpoint/2010/main" val="2146797957"/>
       </p:ext>
     </p:extLst>
   </p:cSld>
@@ -8020,12 +8054,6 @@
             <a:r>
               <a:rPr lang="en-US" dirty="0"/>
               <a:t>Examples</a:t>
-            </a:r>
-          </a:p>
-          <a:p>
-            <a:r>
-              <a:rPr lang="en-US" dirty="0"/>
-              <a:t>Adopting functional programming</a:t>
             </a:r>
           </a:p>
           <a:p>
@@ -8071,7 +8099,7 @@
           <p:cNvPr id="2" name="Title 1">
             <a:extLst>
               <a:ext uri="{FF2B5EF4-FFF2-40B4-BE49-F238E27FC236}">
-                <a16:creationId xmlns:a16="http://schemas.microsoft.com/office/drawing/2014/main" id="{9F0A4C3A-80AE-E3A6-471D-A74E63C90618}"/>
+                <a16:creationId xmlns:a16="http://schemas.microsoft.com/office/drawing/2014/main" id="{BAEA4039-AD4C-CCEC-5481-F6211383D7FE}"/>
               </a:ext>
             </a:extLst>
           </p:cNvPr>
@@ -8089,14 +8117,14 @@
           <a:p>
             <a:r>
               <a:rPr lang="en-US" dirty="0"/>
-              <a:t>Adopting functional programming</a:t>
+              <a:t>Sidebar</a:t>
             </a:r>
             <a:br>
               <a:rPr lang="en-US" dirty="0"/>
             </a:br>
             <a:r>
               <a:rPr lang="en-US" dirty="0"/>
-              <a:t>Potential blockers</a:t>
+              <a:t>The “problem” with FP</a:t>
             </a:r>
           </a:p>
         </p:txBody>
@@ -8106,7 +8134,7 @@
           <p:cNvPr id="3" name="Content Placeholder 2">
             <a:extLst>
               <a:ext uri="{FF2B5EF4-FFF2-40B4-BE49-F238E27FC236}">
-                <a16:creationId xmlns:a16="http://schemas.microsoft.com/office/drawing/2014/main" id="{519D56E3-2B90-2A3B-E384-D45FBDF93A21}"/>
+                <a16:creationId xmlns:a16="http://schemas.microsoft.com/office/drawing/2014/main" id="{36CB3168-5E46-1D81-2669-2929B58D54B5}"/>
               </a:ext>
             </a:extLst>
           </p:cNvPr>
@@ -8126,10 +8154,62 @@
           </a:p>
         </p:txBody>
       </p:sp>
+      <p:sp>
+        <p:nvSpPr>
+          <p:cNvPr id="4" name="Rectangle 3">
+            <a:extLst>
+              <a:ext uri="{FF2B5EF4-FFF2-40B4-BE49-F238E27FC236}">
+                <a16:creationId xmlns:a16="http://schemas.microsoft.com/office/drawing/2014/main" id="{AD0F4012-83B9-697A-AE32-EE5606D6A6FC}"/>
+              </a:ext>
+            </a:extLst>
+          </p:cNvPr>
+          <p:cNvSpPr/>
+          <p:nvPr/>
+        </p:nvSpPr>
+        <p:spPr>
+          <a:xfrm>
+            <a:off x="0" y="0"/>
+            <a:ext cx="228600" cy="6858000"/>
+          </a:xfrm>
+          <a:prstGeom prst="rect">
+            <a:avLst/>
+          </a:prstGeom>
+          <a:solidFill>
+            <a:schemeClr val="tx2"/>
+          </a:solidFill>
+          <a:ln>
+            <a:noFill/>
+          </a:ln>
+        </p:spPr>
+        <p:style>
+          <a:lnRef idx="2">
+            <a:schemeClr val="accent1">
+              <a:shade val="15000"/>
+            </a:schemeClr>
+          </a:lnRef>
+          <a:fillRef idx="1">
+            <a:schemeClr val="accent1"/>
+          </a:fillRef>
+          <a:effectRef idx="0">
+            <a:schemeClr val="accent1"/>
+          </a:effectRef>
+          <a:fontRef idx="minor">
+            <a:schemeClr val="lt1"/>
+          </a:fontRef>
+        </p:style>
+        <p:txBody>
+          <a:bodyPr rtlCol="0" anchor="ctr"/>
+          <a:lstStyle/>
+          <a:p>
+            <a:pPr algn="ctr"/>
+            <a:endParaRPr lang="en-US" dirty="0"/>
+          </a:p>
+        </p:txBody>
+      </p:sp>
     </p:spTree>
     <p:extLst>
       <p:ext uri="{BB962C8B-B14F-4D97-AF65-F5344CB8AC3E}">
-        <p14:creationId xmlns:p14="http://schemas.microsoft.com/office/powerpoint/2010/main" val="2558298236"/>
+        <p14:creationId xmlns:p14="http://schemas.microsoft.com/office/powerpoint/2010/main" val="839160025"/>
       </p:ext>
     </p:extLst>
   </p:cSld>
@@ -8161,65 +8241,82 @@
           <p:cNvPr id="2" name="Title 1">
             <a:extLst>
               <a:ext uri="{FF2B5EF4-FFF2-40B4-BE49-F238E27FC236}">
-                <a16:creationId xmlns:a16="http://schemas.microsoft.com/office/drawing/2014/main" id="{9F0A4C3A-80AE-E3A6-471D-A74E63C90618}"/>
+                <a16:creationId xmlns:a16="http://schemas.microsoft.com/office/drawing/2014/main" id="{7306C212-B3B4-8E92-B9B3-B626EF37EBA4}"/>
               </a:ext>
             </a:extLst>
           </p:cNvPr>
-          <p:cNvSpPr>
-            <a:spLocks noGrp="1"/>
-          </p:cNvSpPr>
-          <p:nvPr>
-            <p:ph type="title"/>
-          </p:nvPr>
-        </p:nvSpPr>
-        <p:spPr/>
-        <p:txBody>
-          <a:bodyPr/>
+          <p:cNvSpPr txBox="1">
+            <a:spLocks noGrp="1"/>
+          </p:cNvSpPr>
+          <p:nvPr>
+            <p:ph type="title" idx="4294967295"/>
+          </p:nvPr>
+        </p:nvSpPr>
+        <p:spPr>
+          <a:xfrm>
+            <a:off x="1061794" y="2828836"/>
+            <a:ext cx="10068412" cy="1200329"/>
+          </a:xfrm>
+          <a:prstGeom prst="rect">
+            <a:avLst/>
+          </a:prstGeom>
+          <a:noFill/>
+          <a:ln>
+            <a:noFill/>
+            <a:prstDash/>
+          </a:ln>
+          <a:effectLst/>
+        </p:spPr>
+        <p:txBody>
+          <a:bodyPr rot="0" spcFirstLastPara="0" vertOverflow="overflow" horzOverflow="overflow" vert="horz" wrap="square" lIns="91440" tIns="45720" rIns="91440" bIns="45720" numCol="1" spcCol="0" rtlCol="0" fromWordArt="0" anchor="t" anchorCtr="0" forceAA="0" compatLnSpc="1">
+            <a:prstTxWarp prst="textNoShape">
+              <a:avLst/>
+            </a:prstTxWarp>
+            <a:spAutoFit/>
+          </a:bodyPr>
           <a:lstStyle/>
           <a:p>
-            <a:r>
-              <a:rPr lang="en-US" dirty="0"/>
-              <a:t>Adopting functional programming</a:t>
-            </a:r>
-            <a:br>
-              <a:rPr lang="en-US" dirty="0"/>
-            </a:br>
-            <a:r>
-              <a:rPr lang="en-US" dirty="0"/>
-              <a:t>Performance</a:t>
-            </a:r>
-          </a:p>
-        </p:txBody>
-      </p:sp>
-      <p:sp>
-        <p:nvSpPr>
-          <p:cNvPr id="3" name="Content Placeholder 2">
-            <a:extLst>
-              <a:ext uri="{FF2B5EF4-FFF2-40B4-BE49-F238E27FC236}">
-                <a16:creationId xmlns:a16="http://schemas.microsoft.com/office/drawing/2014/main" id="{519D56E3-2B90-2A3B-E384-D45FBDF93A21}"/>
-              </a:ext>
-            </a:extLst>
-          </p:cNvPr>
-          <p:cNvSpPr>
-            <a:spLocks noGrp="1"/>
-          </p:cNvSpPr>
-          <p:nvPr>
-            <p:ph idx="1"/>
-          </p:nvPr>
-        </p:nvSpPr>
-        <p:spPr/>
-        <p:txBody>
-          <a:bodyPr/>
-          <a:lstStyle/>
-          <a:p>
-            <a:endParaRPr lang="en-US" dirty="0"/>
+            <a:pPr marL="0" marR="0" lvl="0" indent="0" algn="ctr" defTabSz="457200" rtl="0" eaLnBrk="1" fontAlgn="auto" latinLnBrk="0" hangingPunct="1">
+              <a:lnSpc>
+                <a:spcPct val="100000"/>
+              </a:lnSpc>
+              <a:spcBef>
+                <a:spcPts val="0"/>
+              </a:spcBef>
+              <a:spcAft>
+                <a:spcPts val="0"/>
+              </a:spcAft>
+              <a:buClrTx/>
+              <a:buSzTx/>
+              <a:buFontTx/>
+              <a:buNone/>
+              <a:tabLst/>
+              <a:defRPr/>
+            </a:pPr>
+            <a:r>
+              <a:rPr kumimoji="0" lang="en-US" sz="7200" b="0" i="0" u="none" strike="noStrike" kern="1200" cap="none" spc="0" normalizeH="0" baseline="0" noProof="0" dirty="0">
+                <a:ln>
+                  <a:noFill/>
+                </a:ln>
+                <a:solidFill>
+                  <a:schemeClr val="tx1"/>
+                </a:solidFill>
+                <a:effectLst/>
+                <a:uLnTx/>
+                <a:uFillTx/>
+                <a:latin typeface="+mn-lt"/>
+                <a:ea typeface="+mn-ea"/>
+                <a:cs typeface="+mn-cs"/>
+              </a:rPr>
+              <a:t>Next steps</a:t>
+            </a:r>
           </a:p>
         </p:txBody>
       </p:sp>
     </p:spTree>
     <p:extLst>
       <p:ext uri="{BB962C8B-B14F-4D97-AF65-F5344CB8AC3E}">
-        <p14:creationId xmlns:p14="http://schemas.microsoft.com/office/powerpoint/2010/main" val="3844268154"/>
+        <p14:creationId xmlns:p14="http://schemas.microsoft.com/office/powerpoint/2010/main" val="1448221693"/>
       </p:ext>
     </p:extLst>
   </p:cSld>
@@ -8251,82 +8348,65 @@
           <p:cNvPr id="2" name="Title 1">
             <a:extLst>
               <a:ext uri="{FF2B5EF4-FFF2-40B4-BE49-F238E27FC236}">
-                <a16:creationId xmlns:a16="http://schemas.microsoft.com/office/drawing/2014/main" id="{7306C212-B3B4-8E92-B9B3-B626EF37EBA4}"/>
+                <a16:creationId xmlns:a16="http://schemas.microsoft.com/office/drawing/2014/main" id="{9F0A4C3A-80AE-E3A6-471D-A74E63C90618}"/>
               </a:ext>
             </a:extLst>
           </p:cNvPr>
-          <p:cNvSpPr txBox="1">
-            <a:spLocks noGrp="1"/>
-          </p:cNvSpPr>
-          <p:nvPr>
-            <p:ph type="title" idx="4294967295"/>
-          </p:nvPr>
-        </p:nvSpPr>
-        <p:spPr>
-          <a:xfrm>
-            <a:off x="1061794" y="2828836"/>
-            <a:ext cx="10068412" cy="1200329"/>
-          </a:xfrm>
-          <a:prstGeom prst="rect">
-            <a:avLst/>
-          </a:prstGeom>
-          <a:noFill/>
-          <a:ln>
-            <a:noFill/>
-            <a:prstDash/>
-          </a:ln>
-          <a:effectLst/>
-        </p:spPr>
-        <p:txBody>
-          <a:bodyPr rot="0" spcFirstLastPara="0" vertOverflow="overflow" horzOverflow="overflow" vert="horz" wrap="square" lIns="91440" tIns="45720" rIns="91440" bIns="45720" numCol="1" spcCol="0" rtlCol="0" fromWordArt="0" anchor="t" anchorCtr="0" forceAA="0" compatLnSpc="1">
-            <a:prstTxWarp prst="textNoShape">
-              <a:avLst/>
-            </a:prstTxWarp>
-            <a:spAutoFit/>
-          </a:bodyPr>
+          <p:cNvSpPr>
+            <a:spLocks noGrp="1"/>
+          </p:cNvSpPr>
+          <p:nvPr>
+            <p:ph type="title"/>
+          </p:nvPr>
+        </p:nvSpPr>
+        <p:spPr/>
+        <p:txBody>
+          <a:bodyPr/>
           <a:lstStyle/>
           <a:p>
-            <a:pPr marL="0" marR="0" lvl="0" indent="0" algn="ctr" defTabSz="457200" rtl="0" eaLnBrk="1" fontAlgn="auto" latinLnBrk="0" hangingPunct="1">
-              <a:lnSpc>
-                <a:spcPct val="100000"/>
-              </a:lnSpc>
-              <a:spcBef>
-                <a:spcPts val="0"/>
-              </a:spcBef>
-              <a:spcAft>
-                <a:spcPts val="0"/>
-              </a:spcAft>
-              <a:buClrTx/>
-              <a:buSzTx/>
-              <a:buFontTx/>
-              <a:buNone/>
-              <a:tabLst/>
-              <a:defRPr/>
-            </a:pPr>
-            <a:r>
-              <a:rPr kumimoji="0" lang="en-US" sz="7200" b="0" i="0" u="none" strike="noStrike" kern="1200" cap="none" spc="0" normalizeH="0" baseline="0" noProof="0" dirty="0">
-                <a:ln>
-                  <a:noFill/>
-                </a:ln>
-                <a:solidFill>
-                  <a:schemeClr val="tx1"/>
-                </a:solidFill>
-                <a:effectLst/>
-                <a:uLnTx/>
-                <a:uFillTx/>
-                <a:latin typeface="+mn-lt"/>
-                <a:ea typeface="+mn-ea"/>
-                <a:cs typeface="+mn-cs"/>
-              </a:rPr>
-              <a:t>Next steps</a:t>
-            </a:r>
+            <a:r>
+              <a:rPr lang="en-US" dirty="0"/>
+              <a:t>Next steps and further resource</a:t>
+            </a:r>
+            <a:br>
+              <a:rPr lang="en-US" dirty="0"/>
+            </a:br>
+            <a:r>
+              <a:rPr lang="en-US" dirty="0"/>
+              <a:t>More FP with C#</a:t>
+            </a:r>
+          </a:p>
+        </p:txBody>
+      </p:sp>
+      <p:sp>
+        <p:nvSpPr>
+          <p:cNvPr id="3" name="Content Placeholder 2">
+            <a:extLst>
+              <a:ext uri="{FF2B5EF4-FFF2-40B4-BE49-F238E27FC236}">
+                <a16:creationId xmlns:a16="http://schemas.microsoft.com/office/drawing/2014/main" id="{519D56E3-2B90-2A3B-E384-D45FBDF93A21}"/>
+              </a:ext>
+            </a:extLst>
+          </p:cNvPr>
+          <p:cNvSpPr>
+            <a:spLocks noGrp="1"/>
+          </p:cNvSpPr>
+          <p:nvPr>
+            <p:ph idx="1"/>
+          </p:nvPr>
+        </p:nvSpPr>
+        <p:spPr/>
+        <p:txBody>
+          <a:bodyPr/>
+          <a:lstStyle/>
+          <a:p>
+            <a:endParaRPr lang="en-US" dirty="0"/>
           </a:p>
         </p:txBody>
       </p:sp>
     </p:spTree>
     <p:extLst>
       <p:ext uri="{BB962C8B-B14F-4D97-AF65-F5344CB8AC3E}">
-        <p14:creationId xmlns:p14="http://schemas.microsoft.com/office/powerpoint/2010/main" val="1448221693"/>
+        <p14:creationId xmlns:p14="http://schemas.microsoft.com/office/powerpoint/2010/main" val="874669026"/>
       </p:ext>
     </p:extLst>
   </p:cSld>
@@ -8383,7 +8463,7 @@
             </a:br>
             <a:r>
               <a:rPr lang="en-US" dirty="0"/>
-              <a:t>More FP with C#</a:t>
+              <a:t>Functional(-first) languages</a:t>
             </a:r>
           </a:p>
         </p:txBody>
@@ -8416,7 +8496,7 @@
     </p:spTree>
     <p:extLst>
       <p:ext uri="{BB962C8B-B14F-4D97-AF65-F5344CB8AC3E}">
-        <p14:creationId xmlns:p14="http://schemas.microsoft.com/office/powerpoint/2010/main" val="874669026"/>
+        <p14:creationId xmlns:p14="http://schemas.microsoft.com/office/powerpoint/2010/main" val="73239858"/>
       </p:ext>
     </p:extLst>
   </p:cSld>
@@ -8473,96 +8553,6 @@
             </a:br>
             <a:r>
               <a:rPr lang="en-US" dirty="0"/>
-              <a:t>Functional(-first) languages</a:t>
-            </a:r>
-          </a:p>
-        </p:txBody>
-      </p:sp>
-      <p:sp>
-        <p:nvSpPr>
-          <p:cNvPr id="3" name="Content Placeholder 2">
-            <a:extLst>
-              <a:ext uri="{FF2B5EF4-FFF2-40B4-BE49-F238E27FC236}">
-                <a16:creationId xmlns:a16="http://schemas.microsoft.com/office/drawing/2014/main" id="{519D56E3-2B90-2A3B-E384-D45FBDF93A21}"/>
-              </a:ext>
-            </a:extLst>
-          </p:cNvPr>
-          <p:cNvSpPr>
-            <a:spLocks noGrp="1"/>
-          </p:cNvSpPr>
-          <p:nvPr>
-            <p:ph idx="1"/>
-          </p:nvPr>
-        </p:nvSpPr>
-        <p:spPr/>
-        <p:txBody>
-          <a:bodyPr/>
-          <a:lstStyle/>
-          <a:p>
-            <a:endParaRPr lang="en-US" dirty="0"/>
-          </a:p>
-        </p:txBody>
-      </p:sp>
-    </p:spTree>
-    <p:extLst>
-      <p:ext uri="{BB962C8B-B14F-4D97-AF65-F5344CB8AC3E}">
-        <p14:creationId xmlns:p14="http://schemas.microsoft.com/office/powerpoint/2010/main" val="73239858"/>
-      </p:ext>
-    </p:extLst>
-  </p:cSld>
-  <p:clrMapOvr>
-    <a:masterClrMapping/>
-  </p:clrMapOvr>
-</p:sld>
-</file>
-
-<file path=ppt/slides/slide25.xml><?xml version="1.0" encoding="utf-8"?>
-<p:sld xmlns:a="http://schemas.openxmlformats.org/drawingml/2006/main" xmlns:r="http://schemas.openxmlformats.org/officeDocument/2006/relationships" xmlns:p="http://schemas.openxmlformats.org/presentationml/2006/main">
-  <p:cSld>
-    <p:spTree>
-      <p:nvGrpSpPr>
-        <p:cNvPr id="1" name=""/>
-        <p:cNvGrpSpPr/>
-        <p:nvPr/>
-      </p:nvGrpSpPr>
-      <p:grpSpPr>
-        <a:xfrm>
-          <a:off x="0" y="0"/>
-          <a:ext cx="0" cy="0"/>
-          <a:chOff x="0" y="0"/>
-          <a:chExt cx="0" cy="0"/>
-        </a:xfrm>
-      </p:grpSpPr>
-      <p:sp>
-        <p:nvSpPr>
-          <p:cNvPr id="2" name="Title 1">
-            <a:extLst>
-              <a:ext uri="{FF2B5EF4-FFF2-40B4-BE49-F238E27FC236}">
-                <a16:creationId xmlns:a16="http://schemas.microsoft.com/office/drawing/2014/main" id="{9F0A4C3A-80AE-E3A6-471D-A74E63C90618}"/>
-              </a:ext>
-            </a:extLst>
-          </p:cNvPr>
-          <p:cNvSpPr>
-            <a:spLocks noGrp="1"/>
-          </p:cNvSpPr>
-          <p:nvPr>
-            <p:ph type="title"/>
-          </p:nvPr>
-        </p:nvSpPr>
-        <p:spPr/>
-        <p:txBody>
-          <a:bodyPr/>
-          <a:lstStyle/>
-          <a:p>
-            <a:r>
-              <a:rPr lang="en-US" dirty="0"/>
-              <a:t>Next steps and further resource</a:t>
-            </a:r>
-            <a:br>
-              <a:rPr lang="en-US" dirty="0"/>
-            </a:br>
-            <a:r>
-              <a:rPr lang="en-US" dirty="0"/>
               <a:t>Learning more about FP</a:t>
             </a:r>
           </a:p>
@@ -8606,7 +8596,7 @@
 </p:sld>
 </file>
 
-<file path=ppt/slides/slide26.xml><?xml version="1.0" encoding="utf-8"?>
+<file path=ppt/slides/slide25.xml><?xml version="1.0" encoding="utf-8"?>
 <p:sld xmlns:a="http://schemas.openxmlformats.org/drawingml/2006/main" xmlns:r="http://schemas.openxmlformats.org/officeDocument/2006/relationships" xmlns:p="http://schemas.openxmlformats.org/presentationml/2006/main">
   <p:cSld>
     <p:spTree>
@@ -8931,7 +8921,7 @@
 </p:sld>
 </file>
 
-<file path=ppt/slides/slide27.xml><?xml version="1.0" encoding="utf-8"?>
+<file path=ppt/slides/slide26.xml><?xml version="1.0" encoding="utf-8"?>
 <p:sld xmlns:a="http://schemas.openxmlformats.org/drawingml/2006/main" xmlns:r="http://schemas.openxmlformats.org/officeDocument/2006/relationships" xmlns:p="http://schemas.openxmlformats.org/presentationml/2006/main">
   <p:cSld>
     <p:spTree>

</xml_diff>

<commit_message>
Added (placeholder) slides for referential transparency and compile-time function execution sidebars
</commit_message>
<xml_diff>
--- a/doc/GetFuncY.pptx
+++ b/doc/GetFuncY.pptx
@@ -18,19 +18,21 @@
     <p:sldId id="312" r:id="rId12"/>
     <p:sldId id="315" r:id="rId13"/>
     <p:sldId id="313" r:id="rId14"/>
-    <p:sldId id="293" r:id="rId15"/>
-    <p:sldId id="301" r:id="rId16"/>
-    <p:sldId id="302" r:id="rId17"/>
-    <p:sldId id="296" r:id="rId18"/>
-    <p:sldId id="314" r:id="rId19"/>
-    <p:sldId id="295" r:id="rId20"/>
-    <p:sldId id="316" r:id="rId21"/>
-    <p:sldId id="294" r:id="rId22"/>
-    <p:sldId id="304" r:id="rId23"/>
-    <p:sldId id="305" r:id="rId24"/>
-    <p:sldId id="306" r:id="rId25"/>
-    <p:sldId id="284" r:id="rId26"/>
-    <p:sldId id="285" r:id="rId27"/>
+    <p:sldId id="317" r:id="rId15"/>
+    <p:sldId id="318" r:id="rId16"/>
+    <p:sldId id="293" r:id="rId17"/>
+    <p:sldId id="301" r:id="rId18"/>
+    <p:sldId id="302" r:id="rId19"/>
+    <p:sldId id="296" r:id="rId20"/>
+    <p:sldId id="314" r:id="rId21"/>
+    <p:sldId id="295" r:id="rId22"/>
+    <p:sldId id="316" r:id="rId23"/>
+    <p:sldId id="294" r:id="rId24"/>
+    <p:sldId id="304" r:id="rId25"/>
+    <p:sldId id="305" r:id="rId26"/>
+    <p:sldId id="306" r:id="rId27"/>
+    <p:sldId id="284" r:id="rId28"/>
+    <p:sldId id="285" r:id="rId29"/>
   </p:sldIdLst>
   <p:sldSz cx="12192000" cy="6858000"/>
   <p:notesSz cx="6858000" cy="9144000"/>
@@ -323,7 +325,7 @@
           <a:p>
             <a:fld id="{B4B6E119-0B6E-4A43-814F-75CF8686C874}" type="datetimeFigureOut">
               <a:rPr lang="en-US" smtClean="0"/>
-              <a:t>5/10/2023</a:t>
+              <a:t>6/26/23</a:t>
             </a:fld>
             <a:endParaRPr lang="en-US"/>
           </a:p>
@@ -598,7 +600,7 @@
           <a:p>
             <a:fld id="{B4B6E119-0B6E-4A43-814F-75CF8686C874}" type="datetimeFigureOut">
               <a:rPr lang="en-US" smtClean="0"/>
-              <a:t>5/10/2023</a:t>
+              <a:t>6/26/23</a:t>
             </a:fld>
             <a:endParaRPr lang="en-US"/>
           </a:p>
@@ -792,7 +794,7 @@
           <a:p>
             <a:fld id="{B4B6E119-0B6E-4A43-814F-75CF8686C874}" type="datetimeFigureOut">
               <a:rPr lang="en-US" smtClean="0"/>
-              <a:t>5/10/2023</a:t>
+              <a:t>6/26/23</a:t>
             </a:fld>
             <a:endParaRPr lang="en-US"/>
           </a:p>
@@ -1065,7 +1067,7 @@
           <a:p>
             <a:fld id="{B4B6E119-0B6E-4A43-814F-75CF8686C874}" type="datetimeFigureOut">
               <a:rPr lang="en-US" smtClean="0"/>
-              <a:t>5/10/2023</a:t>
+              <a:t>6/26/23</a:t>
             </a:fld>
             <a:endParaRPr lang="en-US"/>
           </a:p>
@@ -1406,7 +1408,7 @@
           <a:p>
             <a:fld id="{B4B6E119-0B6E-4A43-814F-75CF8686C874}" type="datetimeFigureOut">
               <a:rPr lang="en-US" smtClean="0"/>
-              <a:t>5/10/2023</a:t>
+              <a:t>6/26/23</a:t>
             </a:fld>
             <a:endParaRPr lang="en-US"/>
           </a:p>
@@ -2029,7 +2031,7 @@
           <a:p>
             <a:fld id="{B4B6E119-0B6E-4A43-814F-75CF8686C874}" type="datetimeFigureOut">
               <a:rPr lang="en-US" smtClean="0"/>
-              <a:t>5/10/2023</a:t>
+              <a:t>6/26/23</a:t>
             </a:fld>
             <a:endParaRPr lang="en-US"/>
           </a:p>
@@ -2889,7 +2891,7 @@
           <a:p>
             <a:fld id="{B4B6E119-0B6E-4A43-814F-75CF8686C874}" type="datetimeFigureOut">
               <a:rPr lang="en-US" smtClean="0"/>
-              <a:t>5/10/2023</a:t>
+              <a:t>6/26/23</a:t>
             </a:fld>
             <a:endParaRPr lang="en-US"/>
           </a:p>
@@ -3059,7 +3061,7 @@
           <a:p>
             <a:fld id="{B4B6E119-0B6E-4A43-814F-75CF8686C874}" type="datetimeFigureOut">
               <a:rPr lang="en-US" smtClean="0"/>
-              <a:t>5/10/2023</a:t>
+              <a:t>6/26/23</a:t>
             </a:fld>
             <a:endParaRPr lang="en-US"/>
           </a:p>
@@ -3239,7 +3241,7 @@
           <a:p>
             <a:fld id="{B4B6E119-0B6E-4A43-814F-75CF8686C874}" type="datetimeFigureOut">
               <a:rPr lang="en-US" smtClean="0"/>
-              <a:t>5/10/2023</a:t>
+              <a:t>6/26/23</a:t>
             </a:fld>
             <a:endParaRPr lang="en-US"/>
           </a:p>
@@ -3409,7 +3411,7 @@
           <a:p>
             <a:fld id="{B4B6E119-0B6E-4A43-814F-75CF8686C874}" type="datetimeFigureOut">
               <a:rPr lang="en-US" smtClean="0"/>
-              <a:t>5/10/2023</a:t>
+              <a:t>6/26/23</a:t>
             </a:fld>
             <a:endParaRPr lang="en-US"/>
           </a:p>
@@ -3656,7 +3658,7 @@
           <a:p>
             <a:fld id="{B4B6E119-0B6E-4A43-814F-75CF8686C874}" type="datetimeFigureOut">
               <a:rPr lang="en-US" smtClean="0"/>
-              <a:t>5/10/2023</a:t>
+              <a:t>6/26/23</a:t>
             </a:fld>
             <a:endParaRPr lang="en-US"/>
           </a:p>
@@ -3948,7 +3950,7 @@
           <a:p>
             <a:fld id="{B4B6E119-0B6E-4A43-814F-75CF8686C874}" type="datetimeFigureOut">
               <a:rPr lang="en-US" smtClean="0"/>
-              <a:t>5/10/2023</a:t>
+              <a:t>6/26/23</a:t>
             </a:fld>
             <a:endParaRPr lang="en-US"/>
           </a:p>
@@ -4392,7 +4394,7 @@
           <a:p>
             <a:fld id="{B4B6E119-0B6E-4A43-814F-75CF8686C874}" type="datetimeFigureOut">
               <a:rPr lang="en-US" smtClean="0"/>
-              <a:t>5/10/2023</a:t>
+              <a:t>6/26/23</a:t>
             </a:fld>
             <a:endParaRPr lang="en-US"/>
           </a:p>
@@ -4510,7 +4512,7 @@
           <a:p>
             <a:fld id="{B4B6E119-0B6E-4A43-814F-75CF8686C874}" type="datetimeFigureOut">
               <a:rPr lang="en-US" smtClean="0"/>
-              <a:t>5/10/2023</a:t>
+              <a:t>6/26/23</a:t>
             </a:fld>
             <a:endParaRPr lang="en-US"/>
           </a:p>
@@ -4605,7 +4607,7 @@
           <a:p>
             <a:fld id="{B4B6E119-0B6E-4A43-814F-75CF8686C874}" type="datetimeFigureOut">
               <a:rPr lang="en-US" smtClean="0"/>
-              <a:t>5/10/2023</a:t>
+              <a:t>6/26/23</a:t>
             </a:fld>
             <a:endParaRPr lang="en-US"/>
           </a:p>
@@ -4884,7 +4886,7 @@
           <a:p>
             <a:fld id="{B4B6E119-0B6E-4A43-814F-75CF8686C874}" type="datetimeFigureOut">
               <a:rPr lang="en-US" smtClean="0"/>
-              <a:t>5/10/2023</a:t>
+              <a:t>6/26/23</a:t>
             </a:fld>
             <a:endParaRPr lang="en-US"/>
           </a:p>
@@ -5159,7 +5161,7 @@
           <a:p>
             <a:fld id="{B4B6E119-0B6E-4A43-814F-75CF8686C874}" type="datetimeFigureOut">
               <a:rPr lang="en-US" smtClean="0"/>
-              <a:t>5/10/2023</a:t>
+              <a:t>6/26/23</a:t>
             </a:fld>
             <a:endParaRPr lang="en-US"/>
           </a:p>
@@ -5588,7 +5590,7 @@
           <a:p>
             <a:fld id="{B4B6E119-0B6E-4A43-814F-75CF8686C874}" type="datetimeFigureOut">
               <a:rPr lang="en-US" smtClean="0"/>
-              <a:t>5/10/2023</a:t>
+              <a:t>6/26/23</a:t>
             </a:fld>
             <a:endParaRPr lang="en-US"/>
           </a:p>
@@ -7387,718 +7389,6 @@
           <p:cNvPr id="2" name="Title 1">
             <a:extLst>
               <a:ext uri="{FF2B5EF4-FFF2-40B4-BE49-F238E27FC236}">
-                <a16:creationId xmlns:a16="http://schemas.microsoft.com/office/drawing/2014/main" id="{7306C212-B3B4-8E92-B9B3-B626EF37EBA4}"/>
-              </a:ext>
-            </a:extLst>
-          </p:cNvPr>
-          <p:cNvSpPr txBox="1">
-            <a:spLocks noGrp="1"/>
-          </p:cNvSpPr>
-          <p:nvPr>
-            <p:ph type="title" idx="4294967295"/>
-          </p:nvPr>
-        </p:nvSpPr>
-        <p:spPr>
-          <a:xfrm>
-            <a:off x="1061794" y="2274838"/>
-            <a:ext cx="10068412" cy="2308324"/>
-          </a:xfrm>
-          <a:prstGeom prst="rect">
-            <a:avLst/>
-          </a:prstGeom>
-          <a:noFill/>
-          <a:ln>
-            <a:noFill/>
-            <a:prstDash/>
-          </a:ln>
-          <a:effectLst/>
-        </p:spPr>
-        <p:txBody>
-          <a:bodyPr rot="0" spcFirstLastPara="0" vertOverflow="overflow" horzOverflow="overflow" vert="horz" wrap="square" lIns="91440" tIns="45720" rIns="91440" bIns="45720" numCol="1" spcCol="0" rtlCol="0" fromWordArt="0" anchor="t" anchorCtr="0" forceAA="0" compatLnSpc="1">
-            <a:prstTxWarp prst="textNoShape">
-              <a:avLst/>
-            </a:prstTxWarp>
-            <a:spAutoFit/>
-          </a:bodyPr>
-          <a:lstStyle/>
-          <a:p>
-            <a:pPr marL="0" marR="0" lvl="0" indent="0" algn="ctr" defTabSz="457200" rtl="0" eaLnBrk="1" fontAlgn="auto" latinLnBrk="0" hangingPunct="1">
-              <a:lnSpc>
-                <a:spcPct val="100000"/>
-              </a:lnSpc>
-              <a:spcBef>
-                <a:spcPts val="0"/>
-              </a:spcBef>
-              <a:spcAft>
-                <a:spcPts val="0"/>
-              </a:spcAft>
-              <a:buClrTx/>
-              <a:buSzTx/>
-              <a:buFontTx/>
-              <a:buNone/>
-              <a:tabLst/>
-              <a:defRPr/>
-            </a:pPr>
-            <a:r>
-              <a:rPr kumimoji="0" lang="en-US" sz="7200" b="0" i="0" u="none" strike="noStrike" kern="1200" cap="none" spc="0" normalizeH="0" baseline="0" noProof="0" dirty="0">
-                <a:ln>
-                  <a:noFill/>
-                </a:ln>
-                <a:solidFill>
-                  <a:schemeClr val="tx1"/>
-                </a:solidFill>
-                <a:effectLst/>
-                <a:uLnTx/>
-                <a:uFillTx/>
-                <a:latin typeface="+mn-lt"/>
-                <a:ea typeface="+mn-ea"/>
-                <a:cs typeface="+mn-cs"/>
-              </a:rPr>
-              <a:t>Functional programming</a:t>
-            </a:r>
-          </a:p>
-        </p:txBody>
-      </p:sp>
-    </p:spTree>
-    <p:extLst>
-      <p:ext uri="{BB962C8B-B14F-4D97-AF65-F5344CB8AC3E}">
-        <p14:creationId xmlns:p14="http://schemas.microsoft.com/office/powerpoint/2010/main" val="3310324046"/>
-      </p:ext>
-    </p:extLst>
-  </p:cSld>
-  <p:clrMapOvr>
-    <a:masterClrMapping/>
-  </p:clrMapOvr>
-</p:sld>
-</file>
-
-<file path=ppt/slides/slide15.xml><?xml version="1.0" encoding="utf-8"?>
-<p:sld xmlns:a="http://schemas.openxmlformats.org/drawingml/2006/main" xmlns:r="http://schemas.openxmlformats.org/officeDocument/2006/relationships" xmlns:p="http://schemas.openxmlformats.org/presentationml/2006/main">
-  <p:cSld>
-    <p:spTree>
-      <p:nvGrpSpPr>
-        <p:cNvPr id="1" name=""/>
-        <p:cNvGrpSpPr/>
-        <p:nvPr/>
-      </p:nvGrpSpPr>
-      <p:grpSpPr>
-        <a:xfrm>
-          <a:off x="0" y="0"/>
-          <a:ext cx="0" cy="0"/>
-          <a:chOff x="0" y="0"/>
-          <a:chExt cx="0" cy="0"/>
-        </a:xfrm>
-      </p:grpSpPr>
-      <p:sp>
-        <p:nvSpPr>
-          <p:cNvPr id="2" name="Title 1">
-            <a:extLst>
-              <a:ext uri="{FF2B5EF4-FFF2-40B4-BE49-F238E27FC236}">
-                <a16:creationId xmlns:a16="http://schemas.microsoft.com/office/drawing/2014/main" id="{9F0A4C3A-80AE-E3A6-471D-A74E63C90618}"/>
-              </a:ext>
-            </a:extLst>
-          </p:cNvPr>
-          <p:cNvSpPr>
-            <a:spLocks noGrp="1"/>
-          </p:cNvSpPr>
-          <p:nvPr>
-            <p:ph type="title"/>
-          </p:nvPr>
-        </p:nvSpPr>
-        <p:spPr/>
-        <p:txBody>
-          <a:bodyPr/>
-          <a:lstStyle/>
-          <a:p>
-            <a:r>
-              <a:rPr lang="en-US" dirty="0"/>
-              <a:t>Functional programming (FP)</a:t>
-            </a:r>
-            <a:br>
-              <a:rPr lang="en-US" dirty="0"/>
-            </a:br>
-            <a:r>
-              <a:rPr lang="en-US" dirty="0"/>
-              <a:t>Definition</a:t>
-            </a:r>
-          </a:p>
-        </p:txBody>
-      </p:sp>
-      <p:sp>
-        <p:nvSpPr>
-          <p:cNvPr id="3" name="Content Placeholder 2">
-            <a:extLst>
-              <a:ext uri="{FF2B5EF4-FFF2-40B4-BE49-F238E27FC236}">
-                <a16:creationId xmlns:a16="http://schemas.microsoft.com/office/drawing/2014/main" id="{519D56E3-2B90-2A3B-E384-D45FBDF93A21}"/>
-              </a:ext>
-            </a:extLst>
-          </p:cNvPr>
-          <p:cNvSpPr>
-            <a:spLocks noGrp="1"/>
-          </p:cNvSpPr>
-          <p:nvPr>
-            <p:ph idx="1"/>
-          </p:nvPr>
-        </p:nvSpPr>
-        <p:spPr/>
-        <p:txBody>
-          <a:bodyPr/>
-          <a:lstStyle/>
-          <a:p>
-            <a:endParaRPr lang="en-US" dirty="0"/>
-          </a:p>
-        </p:txBody>
-      </p:sp>
-    </p:spTree>
-    <p:extLst>
-      <p:ext uri="{BB962C8B-B14F-4D97-AF65-F5344CB8AC3E}">
-        <p14:creationId xmlns:p14="http://schemas.microsoft.com/office/powerpoint/2010/main" val="98042496"/>
-      </p:ext>
-    </p:extLst>
-  </p:cSld>
-  <p:clrMapOvr>
-    <a:masterClrMapping/>
-  </p:clrMapOvr>
-</p:sld>
-</file>
-
-<file path=ppt/slides/slide16.xml><?xml version="1.0" encoding="utf-8"?>
-<p:sld xmlns:a="http://schemas.openxmlformats.org/drawingml/2006/main" xmlns:r="http://schemas.openxmlformats.org/officeDocument/2006/relationships" xmlns:p="http://schemas.openxmlformats.org/presentationml/2006/main">
-  <p:cSld>
-    <p:spTree>
-      <p:nvGrpSpPr>
-        <p:cNvPr id="1" name=""/>
-        <p:cNvGrpSpPr/>
-        <p:nvPr/>
-      </p:nvGrpSpPr>
-      <p:grpSpPr>
-        <a:xfrm>
-          <a:off x="0" y="0"/>
-          <a:ext cx="0" cy="0"/>
-          <a:chOff x="0" y="0"/>
-          <a:chExt cx="0" cy="0"/>
-        </a:xfrm>
-      </p:grpSpPr>
-      <p:sp>
-        <p:nvSpPr>
-          <p:cNvPr id="2" name="Title 1">
-            <a:extLst>
-              <a:ext uri="{FF2B5EF4-FFF2-40B4-BE49-F238E27FC236}">
-                <a16:creationId xmlns:a16="http://schemas.microsoft.com/office/drawing/2014/main" id="{9F0A4C3A-80AE-E3A6-471D-A74E63C90618}"/>
-              </a:ext>
-            </a:extLst>
-          </p:cNvPr>
-          <p:cNvSpPr>
-            <a:spLocks noGrp="1"/>
-          </p:cNvSpPr>
-          <p:nvPr>
-            <p:ph type="title"/>
-          </p:nvPr>
-        </p:nvSpPr>
-        <p:spPr/>
-        <p:txBody>
-          <a:bodyPr/>
-          <a:lstStyle/>
-          <a:p>
-            <a:r>
-              <a:rPr lang="en-US" dirty="0"/>
-              <a:t>Functional programming (FP)</a:t>
-            </a:r>
-            <a:br>
-              <a:rPr lang="en-US" dirty="0"/>
-            </a:br>
-            <a:r>
-              <a:rPr lang="en-US" dirty="0"/>
-              <a:t>Pattern matching</a:t>
-            </a:r>
-          </a:p>
-        </p:txBody>
-      </p:sp>
-      <p:sp>
-        <p:nvSpPr>
-          <p:cNvPr id="3" name="Content Placeholder 2">
-            <a:extLst>
-              <a:ext uri="{FF2B5EF4-FFF2-40B4-BE49-F238E27FC236}">
-                <a16:creationId xmlns:a16="http://schemas.microsoft.com/office/drawing/2014/main" id="{519D56E3-2B90-2A3B-E384-D45FBDF93A21}"/>
-              </a:ext>
-            </a:extLst>
-          </p:cNvPr>
-          <p:cNvSpPr>
-            <a:spLocks noGrp="1"/>
-          </p:cNvSpPr>
-          <p:nvPr>
-            <p:ph idx="1"/>
-          </p:nvPr>
-        </p:nvSpPr>
-        <p:spPr/>
-        <p:txBody>
-          <a:bodyPr/>
-          <a:lstStyle/>
-          <a:p>
-            <a:endParaRPr lang="en-US" dirty="0"/>
-          </a:p>
-        </p:txBody>
-      </p:sp>
-    </p:spTree>
-    <p:extLst>
-      <p:ext uri="{BB962C8B-B14F-4D97-AF65-F5344CB8AC3E}">
-        <p14:creationId xmlns:p14="http://schemas.microsoft.com/office/powerpoint/2010/main" val="2815264430"/>
-      </p:ext>
-    </p:extLst>
-  </p:cSld>
-  <p:clrMapOvr>
-    <a:masterClrMapping/>
-  </p:clrMapOvr>
-</p:sld>
-</file>
-
-<file path=ppt/slides/slide17.xml><?xml version="1.0" encoding="utf-8"?>
-<p:sld xmlns:a="http://schemas.openxmlformats.org/drawingml/2006/main" xmlns:r="http://schemas.openxmlformats.org/officeDocument/2006/relationships" xmlns:p="http://schemas.openxmlformats.org/presentationml/2006/main">
-  <p:cSld>
-    <p:spTree>
-      <p:nvGrpSpPr>
-        <p:cNvPr id="1" name=""/>
-        <p:cNvGrpSpPr/>
-        <p:nvPr/>
-      </p:nvGrpSpPr>
-      <p:grpSpPr>
-        <a:xfrm>
-          <a:off x="0" y="0"/>
-          <a:ext cx="0" cy="0"/>
-          <a:chOff x="0" y="0"/>
-          <a:chExt cx="0" cy="0"/>
-        </a:xfrm>
-      </p:grpSpPr>
-      <p:sp>
-        <p:nvSpPr>
-          <p:cNvPr id="2" name="Title 1">
-            <a:extLst>
-              <a:ext uri="{FF2B5EF4-FFF2-40B4-BE49-F238E27FC236}">
-                <a16:creationId xmlns:a16="http://schemas.microsoft.com/office/drawing/2014/main" id="{7306C212-B3B4-8E92-B9B3-B626EF37EBA4}"/>
-              </a:ext>
-            </a:extLst>
-          </p:cNvPr>
-          <p:cNvSpPr txBox="1">
-            <a:spLocks noGrp="1"/>
-          </p:cNvSpPr>
-          <p:nvPr>
-            <p:ph type="title" idx="4294967295"/>
-          </p:nvPr>
-        </p:nvSpPr>
-        <p:spPr>
-          <a:xfrm>
-            <a:off x="1061794" y="2828836"/>
-            <a:ext cx="10068412" cy="1200329"/>
-          </a:xfrm>
-          <a:prstGeom prst="rect">
-            <a:avLst/>
-          </a:prstGeom>
-          <a:noFill/>
-          <a:ln>
-            <a:noFill/>
-            <a:prstDash/>
-          </a:ln>
-          <a:effectLst/>
-        </p:spPr>
-        <p:txBody>
-          <a:bodyPr rot="0" spcFirstLastPara="0" vertOverflow="overflow" horzOverflow="overflow" vert="horz" wrap="square" lIns="91440" tIns="45720" rIns="91440" bIns="45720" numCol="1" spcCol="0" rtlCol="0" fromWordArt="0" anchor="t" anchorCtr="0" forceAA="0" compatLnSpc="1">
-            <a:prstTxWarp prst="textNoShape">
-              <a:avLst/>
-            </a:prstTxWarp>
-            <a:spAutoFit/>
-          </a:bodyPr>
-          <a:lstStyle/>
-          <a:p>
-            <a:pPr marL="0" marR="0" lvl="0" indent="0" algn="ctr" defTabSz="457200" rtl="0" eaLnBrk="1" fontAlgn="auto" latinLnBrk="0" hangingPunct="1">
-              <a:lnSpc>
-                <a:spcPct val="100000"/>
-              </a:lnSpc>
-              <a:spcBef>
-                <a:spcPts val="0"/>
-              </a:spcBef>
-              <a:spcAft>
-                <a:spcPts val="0"/>
-              </a:spcAft>
-              <a:buClrTx/>
-              <a:buSzTx/>
-              <a:buFontTx/>
-              <a:buNone/>
-              <a:tabLst/>
-              <a:defRPr/>
-            </a:pPr>
-            <a:r>
-              <a:rPr kumimoji="0" lang="en-US" sz="7200" b="0" i="0" u="none" strike="noStrike" kern="1200" cap="none" spc="0" normalizeH="0" baseline="0" noProof="0" dirty="0">
-                <a:ln>
-                  <a:noFill/>
-                </a:ln>
-                <a:solidFill>
-                  <a:schemeClr val="tx1"/>
-                </a:solidFill>
-                <a:effectLst/>
-                <a:uLnTx/>
-                <a:uFillTx/>
-                <a:latin typeface="+mn-lt"/>
-                <a:ea typeface="+mn-ea"/>
-                <a:cs typeface="+mn-cs"/>
-              </a:rPr>
-              <a:t>Closures</a:t>
-            </a:r>
-          </a:p>
-        </p:txBody>
-      </p:sp>
-    </p:spTree>
-    <p:extLst>
-      <p:ext uri="{BB962C8B-B14F-4D97-AF65-F5344CB8AC3E}">
-        <p14:creationId xmlns:p14="http://schemas.microsoft.com/office/powerpoint/2010/main" val="2815984157"/>
-      </p:ext>
-    </p:extLst>
-  </p:cSld>
-  <p:clrMapOvr>
-    <a:masterClrMapping/>
-  </p:clrMapOvr>
-</p:sld>
-</file>
-
-<file path=ppt/slides/slide18.xml><?xml version="1.0" encoding="utf-8"?>
-<p:sld xmlns:a="http://schemas.openxmlformats.org/drawingml/2006/main" xmlns:r="http://schemas.openxmlformats.org/officeDocument/2006/relationships" xmlns:p="http://schemas.openxmlformats.org/presentationml/2006/main">
-  <p:cSld>
-    <p:spTree>
-      <p:nvGrpSpPr>
-        <p:cNvPr id="1" name=""/>
-        <p:cNvGrpSpPr/>
-        <p:nvPr/>
-      </p:nvGrpSpPr>
-      <p:grpSpPr>
-        <a:xfrm>
-          <a:off x="0" y="0"/>
-          <a:ext cx="0" cy="0"/>
-          <a:chOff x="0" y="0"/>
-          <a:chExt cx="0" cy="0"/>
-        </a:xfrm>
-      </p:grpSpPr>
-      <p:sp>
-        <p:nvSpPr>
-          <p:cNvPr id="2" name="Title 1">
-            <a:extLst>
-              <a:ext uri="{FF2B5EF4-FFF2-40B4-BE49-F238E27FC236}">
-                <a16:creationId xmlns:a16="http://schemas.microsoft.com/office/drawing/2014/main" id="{B6AA4B89-B939-C909-64A3-42C62FB09C80}"/>
-              </a:ext>
-            </a:extLst>
-          </p:cNvPr>
-          <p:cNvSpPr>
-            <a:spLocks noGrp="1"/>
-          </p:cNvSpPr>
-          <p:nvPr>
-            <p:ph type="title"/>
-          </p:nvPr>
-        </p:nvSpPr>
-        <p:spPr/>
-        <p:txBody>
-          <a:bodyPr/>
-          <a:lstStyle/>
-          <a:p>
-            <a:r>
-              <a:rPr lang="de-DE" dirty="0" err="1"/>
-              <a:t>Closures</a:t>
-            </a:r>
-            <a:br>
-              <a:rPr lang="de-DE" dirty="0"/>
-            </a:br>
-            <a:r>
-              <a:rPr lang="de-DE" dirty="0"/>
-              <a:t>Partial </a:t>
-            </a:r>
-            <a:r>
-              <a:rPr lang="de-DE" dirty="0" err="1"/>
-              <a:t>application</a:t>
-            </a:r>
-            <a:endParaRPr lang="en-US" dirty="0"/>
-          </a:p>
-        </p:txBody>
-      </p:sp>
-      <p:sp>
-        <p:nvSpPr>
-          <p:cNvPr id="3" name="Content Placeholder 2">
-            <a:extLst>
-              <a:ext uri="{FF2B5EF4-FFF2-40B4-BE49-F238E27FC236}">
-                <a16:creationId xmlns:a16="http://schemas.microsoft.com/office/drawing/2014/main" id="{51797AC1-F4D1-0A0B-773E-D2CB043B37A1}"/>
-              </a:ext>
-            </a:extLst>
-          </p:cNvPr>
-          <p:cNvSpPr>
-            <a:spLocks noGrp="1"/>
-          </p:cNvSpPr>
-          <p:nvPr>
-            <p:ph idx="1"/>
-          </p:nvPr>
-        </p:nvSpPr>
-        <p:spPr/>
-        <p:txBody>
-          <a:bodyPr/>
-          <a:lstStyle/>
-          <a:p>
-            <a:endParaRPr lang="en-US"/>
-          </a:p>
-        </p:txBody>
-      </p:sp>
-    </p:spTree>
-    <p:extLst>
-      <p:ext uri="{BB962C8B-B14F-4D97-AF65-F5344CB8AC3E}">
-        <p14:creationId xmlns:p14="http://schemas.microsoft.com/office/powerpoint/2010/main" val="3067413002"/>
-      </p:ext>
-    </p:extLst>
-  </p:cSld>
-  <p:clrMapOvr>
-    <a:masterClrMapping/>
-  </p:clrMapOvr>
-</p:sld>
-</file>
-
-<file path=ppt/slides/slide19.xml><?xml version="1.0" encoding="utf-8"?>
-<p:sld xmlns:a="http://schemas.openxmlformats.org/drawingml/2006/main" xmlns:r="http://schemas.openxmlformats.org/officeDocument/2006/relationships" xmlns:p="http://schemas.openxmlformats.org/presentationml/2006/main">
-  <p:cSld>
-    <p:spTree>
-      <p:nvGrpSpPr>
-        <p:cNvPr id="1" name=""/>
-        <p:cNvGrpSpPr/>
-        <p:nvPr/>
-      </p:nvGrpSpPr>
-      <p:grpSpPr>
-        <a:xfrm>
-          <a:off x="0" y="0"/>
-          <a:ext cx="0" cy="0"/>
-          <a:chOff x="0" y="0"/>
-          <a:chExt cx="0" cy="0"/>
-        </a:xfrm>
-      </p:grpSpPr>
-      <p:sp>
-        <p:nvSpPr>
-          <p:cNvPr id="2" name="Title 1">
-            <a:extLst>
-              <a:ext uri="{FF2B5EF4-FFF2-40B4-BE49-F238E27FC236}">
-                <a16:creationId xmlns:a16="http://schemas.microsoft.com/office/drawing/2014/main" id="{7306C212-B3B4-8E92-B9B3-B626EF37EBA4}"/>
-              </a:ext>
-            </a:extLst>
-          </p:cNvPr>
-          <p:cNvSpPr txBox="1">
-            <a:spLocks noGrp="1"/>
-          </p:cNvSpPr>
-          <p:nvPr>
-            <p:ph type="title" idx="4294967295"/>
-          </p:nvPr>
-        </p:nvSpPr>
-        <p:spPr>
-          <a:xfrm>
-            <a:off x="1061794" y="2828836"/>
-            <a:ext cx="10068412" cy="1200329"/>
-          </a:xfrm>
-          <a:prstGeom prst="rect">
-            <a:avLst/>
-          </a:prstGeom>
-          <a:noFill/>
-          <a:ln>
-            <a:noFill/>
-            <a:prstDash/>
-          </a:ln>
-          <a:effectLst/>
-        </p:spPr>
-        <p:txBody>
-          <a:bodyPr rot="0" spcFirstLastPara="0" vertOverflow="overflow" horzOverflow="overflow" vert="horz" wrap="square" lIns="91440" tIns="45720" rIns="91440" bIns="45720" numCol="1" spcCol="0" rtlCol="0" fromWordArt="0" anchor="t" anchorCtr="0" forceAA="0" compatLnSpc="1">
-            <a:prstTxWarp prst="textNoShape">
-              <a:avLst/>
-            </a:prstTxWarp>
-            <a:spAutoFit/>
-          </a:bodyPr>
-          <a:lstStyle/>
-          <a:p>
-            <a:pPr marL="0" marR="0" lvl="0" indent="0" algn="ctr" defTabSz="457200" rtl="0" eaLnBrk="1" fontAlgn="auto" latinLnBrk="0" hangingPunct="1">
-              <a:lnSpc>
-                <a:spcPct val="100000"/>
-              </a:lnSpc>
-              <a:spcBef>
-                <a:spcPts val="0"/>
-              </a:spcBef>
-              <a:spcAft>
-                <a:spcPts val="0"/>
-              </a:spcAft>
-              <a:buClrTx/>
-              <a:buSzTx/>
-              <a:buFontTx/>
-              <a:buNone/>
-              <a:tabLst/>
-              <a:defRPr/>
-            </a:pPr>
-            <a:r>
-              <a:rPr kumimoji="0" lang="en-US" sz="7200" b="0" i="0" u="none" strike="noStrike" kern="1200" cap="none" spc="0" normalizeH="0" baseline="0" noProof="0" dirty="0">
-                <a:ln>
-                  <a:noFill/>
-                </a:ln>
-                <a:solidFill>
-                  <a:schemeClr val="tx1"/>
-                </a:solidFill>
-                <a:effectLst/>
-                <a:uLnTx/>
-                <a:uFillTx/>
-                <a:latin typeface="+mn-lt"/>
-                <a:ea typeface="+mn-ea"/>
-                <a:cs typeface="+mn-cs"/>
-              </a:rPr>
-              <a:t>Examples</a:t>
-            </a:r>
-          </a:p>
-        </p:txBody>
-      </p:sp>
-    </p:spTree>
-    <p:extLst>
-      <p:ext uri="{BB962C8B-B14F-4D97-AF65-F5344CB8AC3E}">
-        <p14:creationId xmlns:p14="http://schemas.microsoft.com/office/powerpoint/2010/main" val="2146797957"/>
-      </p:ext>
-    </p:extLst>
-  </p:cSld>
-  <p:clrMapOvr>
-    <a:masterClrMapping/>
-  </p:clrMapOvr>
-</p:sld>
-</file>
-
-<file path=ppt/slides/slide2.xml><?xml version="1.0" encoding="utf-8"?>
-<p:sld xmlns:a="http://schemas.openxmlformats.org/drawingml/2006/main" xmlns:r="http://schemas.openxmlformats.org/officeDocument/2006/relationships" xmlns:p="http://schemas.openxmlformats.org/presentationml/2006/main">
-  <p:cSld>
-    <p:spTree>
-      <p:nvGrpSpPr>
-        <p:cNvPr id="1" name=""/>
-        <p:cNvGrpSpPr/>
-        <p:nvPr/>
-      </p:nvGrpSpPr>
-      <p:grpSpPr>
-        <a:xfrm>
-          <a:off x="0" y="0"/>
-          <a:ext cx="0" cy="0"/>
-          <a:chOff x="0" y="0"/>
-          <a:chExt cx="0" cy="0"/>
-        </a:xfrm>
-      </p:grpSpPr>
-      <p:sp>
-        <p:nvSpPr>
-          <p:cNvPr id="2" name="Title 1">
-            <a:extLst>
-              <a:ext uri="{FF2B5EF4-FFF2-40B4-BE49-F238E27FC236}">
-                <a16:creationId xmlns:a16="http://schemas.microsoft.com/office/drawing/2014/main" id="{B5AB5A65-FBAA-DC24-398C-2298A2AF58C3}"/>
-              </a:ext>
-            </a:extLst>
-          </p:cNvPr>
-          <p:cNvSpPr>
-            <a:spLocks noGrp="1"/>
-          </p:cNvSpPr>
-          <p:nvPr>
-            <p:ph type="title"/>
-          </p:nvPr>
-        </p:nvSpPr>
-        <p:spPr/>
-        <p:txBody>
-          <a:bodyPr/>
-          <a:lstStyle/>
-          <a:p>
-            <a:r>
-              <a:rPr lang="en-US" dirty="0"/>
-              <a:t>Overview</a:t>
-            </a:r>
-          </a:p>
-        </p:txBody>
-      </p:sp>
-      <p:sp>
-        <p:nvSpPr>
-          <p:cNvPr id="3" name="Content Placeholder 2">
-            <a:extLst>
-              <a:ext uri="{FF2B5EF4-FFF2-40B4-BE49-F238E27FC236}">
-                <a16:creationId xmlns:a16="http://schemas.microsoft.com/office/drawing/2014/main" id="{0123CA19-329D-0F80-C469-2825866C6CA4}"/>
-              </a:ext>
-            </a:extLst>
-          </p:cNvPr>
-          <p:cNvSpPr>
-            <a:spLocks noGrp="1"/>
-          </p:cNvSpPr>
-          <p:nvPr>
-            <p:ph idx="1"/>
-          </p:nvPr>
-        </p:nvSpPr>
-        <p:spPr/>
-        <p:txBody>
-          <a:bodyPr/>
-          <a:lstStyle/>
-          <a:p>
-            <a:r>
-              <a:rPr lang="en-US" dirty="0"/>
-              <a:t>Orders of functions</a:t>
-            </a:r>
-          </a:p>
-          <a:p>
-            <a:r>
-              <a:rPr lang="en-US" dirty="0"/>
-              <a:t>Pure functions</a:t>
-            </a:r>
-          </a:p>
-          <a:p>
-            <a:r>
-              <a:rPr lang="en-US" dirty="0"/>
-              <a:t>Functional programming (FP)</a:t>
-            </a:r>
-          </a:p>
-          <a:p>
-            <a:r>
-              <a:rPr lang="en-US" dirty="0"/>
-              <a:t>Closures</a:t>
-            </a:r>
-          </a:p>
-          <a:p>
-            <a:r>
-              <a:rPr lang="en-US" dirty="0"/>
-              <a:t>Examples</a:t>
-            </a:r>
-          </a:p>
-          <a:p>
-            <a:r>
-              <a:rPr lang="en-US" dirty="0"/>
-              <a:t>Next steps and further resource</a:t>
-            </a:r>
-          </a:p>
-        </p:txBody>
-      </p:sp>
-    </p:spTree>
-    <p:extLst>
-      <p:ext uri="{BB962C8B-B14F-4D97-AF65-F5344CB8AC3E}">
-        <p14:creationId xmlns:p14="http://schemas.microsoft.com/office/powerpoint/2010/main" val="1836417717"/>
-      </p:ext>
-    </p:extLst>
-  </p:cSld>
-  <p:clrMapOvr>
-    <a:masterClrMapping/>
-  </p:clrMapOvr>
-</p:sld>
-</file>
-
-<file path=ppt/slides/slide20.xml><?xml version="1.0" encoding="utf-8"?>
-<p:sld xmlns:a="http://schemas.openxmlformats.org/drawingml/2006/main" xmlns:r="http://schemas.openxmlformats.org/officeDocument/2006/relationships" xmlns:p="http://schemas.openxmlformats.org/presentationml/2006/main">
-  <p:cSld>
-    <p:spTree>
-      <p:nvGrpSpPr>
-        <p:cNvPr id="1" name=""/>
-        <p:cNvGrpSpPr/>
-        <p:nvPr/>
-      </p:nvGrpSpPr>
-      <p:grpSpPr>
-        <a:xfrm>
-          <a:off x="0" y="0"/>
-          <a:ext cx="0" cy="0"/>
-          <a:chOff x="0" y="0"/>
-          <a:chExt cx="0" cy="0"/>
-        </a:xfrm>
-      </p:grpSpPr>
-      <p:sp>
-        <p:nvSpPr>
-          <p:cNvPr id="2" name="Title 1">
-            <a:extLst>
-              <a:ext uri="{FF2B5EF4-FFF2-40B4-BE49-F238E27FC236}">
                 <a16:creationId xmlns:a16="http://schemas.microsoft.com/office/drawing/2014/main" id="{BAEA4039-AD4C-CCEC-5481-F6211383D7FE}"/>
               </a:ext>
             </a:extLst>
@@ -8124,7 +7414,7 @@
             </a:br>
             <a:r>
               <a:rPr lang="en-US" dirty="0"/>
-              <a:t>The “problem” with FP</a:t>
+              <a:t>Referential transparency</a:t>
             </a:r>
           </a:p>
         </p:txBody>
@@ -8209,7 +7499,754 @@
     </p:spTree>
     <p:extLst>
       <p:ext uri="{BB962C8B-B14F-4D97-AF65-F5344CB8AC3E}">
-        <p14:creationId xmlns:p14="http://schemas.microsoft.com/office/powerpoint/2010/main" val="839160025"/>
+        <p14:creationId xmlns:p14="http://schemas.microsoft.com/office/powerpoint/2010/main" val="3162695344"/>
+      </p:ext>
+    </p:extLst>
+  </p:cSld>
+  <p:clrMapOvr>
+    <a:masterClrMapping/>
+  </p:clrMapOvr>
+</p:sld>
+</file>
+
+<file path=ppt/slides/slide15.xml><?xml version="1.0" encoding="utf-8"?>
+<p:sld xmlns:a="http://schemas.openxmlformats.org/drawingml/2006/main" xmlns:r="http://schemas.openxmlformats.org/officeDocument/2006/relationships" xmlns:p="http://schemas.openxmlformats.org/presentationml/2006/main">
+  <p:cSld>
+    <p:spTree>
+      <p:nvGrpSpPr>
+        <p:cNvPr id="1" name=""/>
+        <p:cNvGrpSpPr/>
+        <p:nvPr/>
+      </p:nvGrpSpPr>
+      <p:grpSpPr>
+        <a:xfrm>
+          <a:off x="0" y="0"/>
+          <a:ext cx="0" cy="0"/>
+          <a:chOff x="0" y="0"/>
+          <a:chExt cx="0" cy="0"/>
+        </a:xfrm>
+      </p:grpSpPr>
+      <p:sp>
+        <p:nvSpPr>
+          <p:cNvPr id="2" name="Title 1">
+            <a:extLst>
+              <a:ext uri="{FF2B5EF4-FFF2-40B4-BE49-F238E27FC236}">
+                <a16:creationId xmlns:a16="http://schemas.microsoft.com/office/drawing/2014/main" id="{BAEA4039-AD4C-CCEC-5481-F6211383D7FE}"/>
+              </a:ext>
+            </a:extLst>
+          </p:cNvPr>
+          <p:cNvSpPr>
+            <a:spLocks noGrp="1"/>
+          </p:cNvSpPr>
+          <p:nvPr>
+            <p:ph type="title"/>
+          </p:nvPr>
+        </p:nvSpPr>
+        <p:spPr/>
+        <p:txBody>
+          <a:bodyPr/>
+          <a:lstStyle/>
+          <a:p>
+            <a:r>
+              <a:rPr lang="en-US" dirty="0"/>
+              <a:t>Sidebar</a:t>
+            </a:r>
+            <a:br>
+              <a:rPr lang="en-US" dirty="0"/>
+            </a:br>
+            <a:r>
+              <a:rPr lang="en-US" dirty="0"/>
+              <a:t>Compile-time function execution</a:t>
+            </a:r>
+          </a:p>
+        </p:txBody>
+      </p:sp>
+      <p:sp>
+        <p:nvSpPr>
+          <p:cNvPr id="3" name="Content Placeholder 2">
+            <a:extLst>
+              <a:ext uri="{FF2B5EF4-FFF2-40B4-BE49-F238E27FC236}">
+                <a16:creationId xmlns:a16="http://schemas.microsoft.com/office/drawing/2014/main" id="{36CB3168-5E46-1D81-2669-2929B58D54B5}"/>
+              </a:ext>
+            </a:extLst>
+          </p:cNvPr>
+          <p:cNvSpPr>
+            <a:spLocks noGrp="1"/>
+          </p:cNvSpPr>
+          <p:nvPr>
+            <p:ph idx="1"/>
+          </p:nvPr>
+        </p:nvSpPr>
+        <p:spPr/>
+        <p:txBody>
+          <a:bodyPr/>
+          <a:lstStyle/>
+          <a:p>
+            <a:endParaRPr lang="en-US" dirty="0"/>
+          </a:p>
+        </p:txBody>
+      </p:sp>
+      <p:sp>
+        <p:nvSpPr>
+          <p:cNvPr id="4" name="Rectangle 3">
+            <a:extLst>
+              <a:ext uri="{FF2B5EF4-FFF2-40B4-BE49-F238E27FC236}">
+                <a16:creationId xmlns:a16="http://schemas.microsoft.com/office/drawing/2014/main" id="{AD0F4012-83B9-697A-AE32-EE5606D6A6FC}"/>
+              </a:ext>
+            </a:extLst>
+          </p:cNvPr>
+          <p:cNvSpPr/>
+          <p:nvPr/>
+        </p:nvSpPr>
+        <p:spPr>
+          <a:xfrm>
+            <a:off x="0" y="0"/>
+            <a:ext cx="228600" cy="6858000"/>
+          </a:xfrm>
+          <a:prstGeom prst="rect">
+            <a:avLst/>
+          </a:prstGeom>
+          <a:solidFill>
+            <a:schemeClr val="tx2"/>
+          </a:solidFill>
+          <a:ln>
+            <a:noFill/>
+          </a:ln>
+        </p:spPr>
+        <p:style>
+          <a:lnRef idx="2">
+            <a:schemeClr val="accent1">
+              <a:shade val="15000"/>
+            </a:schemeClr>
+          </a:lnRef>
+          <a:fillRef idx="1">
+            <a:schemeClr val="accent1"/>
+          </a:fillRef>
+          <a:effectRef idx="0">
+            <a:schemeClr val="accent1"/>
+          </a:effectRef>
+          <a:fontRef idx="minor">
+            <a:schemeClr val="lt1"/>
+          </a:fontRef>
+        </p:style>
+        <p:txBody>
+          <a:bodyPr rtlCol="0" anchor="ctr"/>
+          <a:lstStyle/>
+          <a:p>
+            <a:pPr algn="ctr"/>
+            <a:endParaRPr lang="en-US" dirty="0"/>
+          </a:p>
+        </p:txBody>
+      </p:sp>
+    </p:spTree>
+    <p:extLst>
+      <p:ext uri="{BB962C8B-B14F-4D97-AF65-F5344CB8AC3E}">
+        <p14:creationId xmlns:p14="http://schemas.microsoft.com/office/powerpoint/2010/main" val="4158501898"/>
+      </p:ext>
+    </p:extLst>
+  </p:cSld>
+  <p:clrMapOvr>
+    <a:masterClrMapping/>
+  </p:clrMapOvr>
+</p:sld>
+</file>
+
+<file path=ppt/slides/slide16.xml><?xml version="1.0" encoding="utf-8"?>
+<p:sld xmlns:a="http://schemas.openxmlformats.org/drawingml/2006/main" xmlns:r="http://schemas.openxmlformats.org/officeDocument/2006/relationships" xmlns:p="http://schemas.openxmlformats.org/presentationml/2006/main">
+  <p:cSld>
+    <p:spTree>
+      <p:nvGrpSpPr>
+        <p:cNvPr id="1" name=""/>
+        <p:cNvGrpSpPr/>
+        <p:nvPr/>
+      </p:nvGrpSpPr>
+      <p:grpSpPr>
+        <a:xfrm>
+          <a:off x="0" y="0"/>
+          <a:ext cx="0" cy="0"/>
+          <a:chOff x="0" y="0"/>
+          <a:chExt cx="0" cy="0"/>
+        </a:xfrm>
+      </p:grpSpPr>
+      <p:sp>
+        <p:nvSpPr>
+          <p:cNvPr id="2" name="Title 1">
+            <a:extLst>
+              <a:ext uri="{FF2B5EF4-FFF2-40B4-BE49-F238E27FC236}">
+                <a16:creationId xmlns:a16="http://schemas.microsoft.com/office/drawing/2014/main" id="{7306C212-B3B4-8E92-B9B3-B626EF37EBA4}"/>
+              </a:ext>
+            </a:extLst>
+          </p:cNvPr>
+          <p:cNvSpPr txBox="1">
+            <a:spLocks noGrp="1"/>
+          </p:cNvSpPr>
+          <p:nvPr>
+            <p:ph type="title" idx="4294967295"/>
+          </p:nvPr>
+        </p:nvSpPr>
+        <p:spPr>
+          <a:xfrm>
+            <a:off x="1061794" y="2274838"/>
+            <a:ext cx="10068412" cy="2308324"/>
+          </a:xfrm>
+          <a:prstGeom prst="rect">
+            <a:avLst/>
+          </a:prstGeom>
+          <a:noFill/>
+          <a:ln>
+            <a:noFill/>
+            <a:prstDash/>
+          </a:ln>
+          <a:effectLst/>
+        </p:spPr>
+        <p:txBody>
+          <a:bodyPr rot="0" spcFirstLastPara="0" vertOverflow="overflow" horzOverflow="overflow" vert="horz" wrap="square" lIns="91440" tIns="45720" rIns="91440" bIns="45720" numCol="1" spcCol="0" rtlCol="0" fromWordArt="0" anchor="t" anchorCtr="0" forceAA="0" compatLnSpc="1">
+            <a:prstTxWarp prst="textNoShape">
+              <a:avLst/>
+            </a:prstTxWarp>
+            <a:spAutoFit/>
+          </a:bodyPr>
+          <a:lstStyle/>
+          <a:p>
+            <a:pPr marL="0" marR="0" lvl="0" indent="0" algn="ctr" defTabSz="457200" rtl="0" eaLnBrk="1" fontAlgn="auto" latinLnBrk="0" hangingPunct="1">
+              <a:lnSpc>
+                <a:spcPct val="100000"/>
+              </a:lnSpc>
+              <a:spcBef>
+                <a:spcPts val="0"/>
+              </a:spcBef>
+              <a:spcAft>
+                <a:spcPts val="0"/>
+              </a:spcAft>
+              <a:buClrTx/>
+              <a:buSzTx/>
+              <a:buFontTx/>
+              <a:buNone/>
+              <a:tabLst/>
+              <a:defRPr/>
+            </a:pPr>
+            <a:r>
+              <a:rPr kumimoji="0" lang="en-US" sz="7200" b="0" i="0" u="none" strike="noStrike" kern="1200" cap="none" spc="0" normalizeH="0" baseline="0" noProof="0" dirty="0">
+                <a:ln>
+                  <a:noFill/>
+                </a:ln>
+                <a:solidFill>
+                  <a:schemeClr val="tx1"/>
+                </a:solidFill>
+                <a:effectLst/>
+                <a:uLnTx/>
+                <a:uFillTx/>
+                <a:latin typeface="+mn-lt"/>
+                <a:ea typeface="+mn-ea"/>
+                <a:cs typeface="+mn-cs"/>
+              </a:rPr>
+              <a:t>Functional programming</a:t>
+            </a:r>
+          </a:p>
+        </p:txBody>
+      </p:sp>
+    </p:spTree>
+    <p:extLst>
+      <p:ext uri="{BB962C8B-B14F-4D97-AF65-F5344CB8AC3E}">
+        <p14:creationId xmlns:p14="http://schemas.microsoft.com/office/powerpoint/2010/main" val="3310324046"/>
+      </p:ext>
+    </p:extLst>
+  </p:cSld>
+  <p:clrMapOvr>
+    <a:masterClrMapping/>
+  </p:clrMapOvr>
+</p:sld>
+</file>
+
+<file path=ppt/slides/slide17.xml><?xml version="1.0" encoding="utf-8"?>
+<p:sld xmlns:a="http://schemas.openxmlformats.org/drawingml/2006/main" xmlns:r="http://schemas.openxmlformats.org/officeDocument/2006/relationships" xmlns:p="http://schemas.openxmlformats.org/presentationml/2006/main">
+  <p:cSld>
+    <p:spTree>
+      <p:nvGrpSpPr>
+        <p:cNvPr id="1" name=""/>
+        <p:cNvGrpSpPr/>
+        <p:nvPr/>
+      </p:nvGrpSpPr>
+      <p:grpSpPr>
+        <a:xfrm>
+          <a:off x="0" y="0"/>
+          <a:ext cx="0" cy="0"/>
+          <a:chOff x="0" y="0"/>
+          <a:chExt cx="0" cy="0"/>
+        </a:xfrm>
+      </p:grpSpPr>
+      <p:sp>
+        <p:nvSpPr>
+          <p:cNvPr id="2" name="Title 1">
+            <a:extLst>
+              <a:ext uri="{FF2B5EF4-FFF2-40B4-BE49-F238E27FC236}">
+                <a16:creationId xmlns:a16="http://schemas.microsoft.com/office/drawing/2014/main" id="{9F0A4C3A-80AE-E3A6-471D-A74E63C90618}"/>
+              </a:ext>
+            </a:extLst>
+          </p:cNvPr>
+          <p:cNvSpPr>
+            <a:spLocks noGrp="1"/>
+          </p:cNvSpPr>
+          <p:nvPr>
+            <p:ph type="title"/>
+          </p:nvPr>
+        </p:nvSpPr>
+        <p:spPr/>
+        <p:txBody>
+          <a:bodyPr/>
+          <a:lstStyle/>
+          <a:p>
+            <a:r>
+              <a:rPr lang="en-US" dirty="0"/>
+              <a:t>Functional programming (FP)</a:t>
+            </a:r>
+            <a:br>
+              <a:rPr lang="en-US" dirty="0"/>
+            </a:br>
+            <a:r>
+              <a:rPr lang="en-US" dirty="0"/>
+              <a:t>Definition</a:t>
+            </a:r>
+          </a:p>
+        </p:txBody>
+      </p:sp>
+      <p:sp>
+        <p:nvSpPr>
+          <p:cNvPr id="3" name="Content Placeholder 2">
+            <a:extLst>
+              <a:ext uri="{FF2B5EF4-FFF2-40B4-BE49-F238E27FC236}">
+                <a16:creationId xmlns:a16="http://schemas.microsoft.com/office/drawing/2014/main" id="{519D56E3-2B90-2A3B-E384-D45FBDF93A21}"/>
+              </a:ext>
+            </a:extLst>
+          </p:cNvPr>
+          <p:cNvSpPr>
+            <a:spLocks noGrp="1"/>
+          </p:cNvSpPr>
+          <p:nvPr>
+            <p:ph idx="1"/>
+          </p:nvPr>
+        </p:nvSpPr>
+        <p:spPr/>
+        <p:txBody>
+          <a:bodyPr/>
+          <a:lstStyle/>
+          <a:p>
+            <a:endParaRPr lang="en-US" dirty="0"/>
+          </a:p>
+        </p:txBody>
+      </p:sp>
+    </p:spTree>
+    <p:extLst>
+      <p:ext uri="{BB962C8B-B14F-4D97-AF65-F5344CB8AC3E}">
+        <p14:creationId xmlns:p14="http://schemas.microsoft.com/office/powerpoint/2010/main" val="98042496"/>
+      </p:ext>
+    </p:extLst>
+  </p:cSld>
+  <p:clrMapOvr>
+    <a:masterClrMapping/>
+  </p:clrMapOvr>
+</p:sld>
+</file>
+
+<file path=ppt/slides/slide18.xml><?xml version="1.0" encoding="utf-8"?>
+<p:sld xmlns:a="http://schemas.openxmlformats.org/drawingml/2006/main" xmlns:r="http://schemas.openxmlformats.org/officeDocument/2006/relationships" xmlns:p="http://schemas.openxmlformats.org/presentationml/2006/main">
+  <p:cSld>
+    <p:spTree>
+      <p:nvGrpSpPr>
+        <p:cNvPr id="1" name=""/>
+        <p:cNvGrpSpPr/>
+        <p:nvPr/>
+      </p:nvGrpSpPr>
+      <p:grpSpPr>
+        <a:xfrm>
+          <a:off x="0" y="0"/>
+          <a:ext cx="0" cy="0"/>
+          <a:chOff x="0" y="0"/>
+          <a:chExt cx="0" cy="0"/>
+        </a:xfrm>
+      </p:grpSpPr>
+      <p:sp>
+        <p:nvSpPr>
+          <p:cNvPr id="2" name="Title 1">
+            <a:extLst>
+              <a:ext uri="{FF2B5EF4-FFF2-40B4-BE49-F238E27FC236}">
+                <a16:creationId xmlns:a16="http://schemas.microsoft.com/office/drawing/2014/main" id="{9F0A4C3A-80AE-E3A6-471D-A74E63C90618}"/>
+              </a:ext>
+            </a:extLst>
+          </p:cNvPr>
+          <p:cNvSpPr>
+            <a:spLocks noGrp="1"/>
+          </p:cNvSpPr>
+          <p:nvPr>
+            <p:ph type="title"/>
+          </p:nvPr>
+        </p:nvSpPr>
+        <p:spPr/>
+        <p:txBody>
+          <a:bodyPr/>
+          <a:lstStyle/>
+          <a:p>
+            <a:r>
+              <a:rPr lang="en-US" dirty="0"/>
+              <a:t>Functional programming (FP)</a:t>
+            </a:r>
+            <a:br>
+              <a:rPr lang="en-US" dirty="0"/>
+            </a:br>
+            <a:r>
+              <a:rPr lang="en-US" dirty="0"/>
+              <a:t>Pattern matching</a:t>
+            </a:r>
+          </a:p>
+        </p:txBody>
+      </p:sp>
+      <p:sp>
+        <p:nvSpPr>
+          <p:cNvPr id="3" name="Content Placeholder 2">
+            <a:extLst>
+              <a:ext uri="{FF2B5EF4-FFF2-40B4-BE49-F238E27FC236}">
+                <a16:creationId xmlns:a16="http://schemas.microsoft.com/office/drawing/2014/main" id="{519D56E3-2B90-2A3B-E384-D45FBDF93A21}"/>
+              </a:ext>
+            </a:extLst>
+          </p:cNvPr>
+          <p:cNvSpPr>
+            <a:spLocks noGrp="1"/>
+          </p:cNvSpPr>
+          <p:nvPr>
+            <p:ph idx="1"/>
+          </p:nvPr>
+        </p:nvSpPr>
+        <p:spPr/>
+        <p:txBody>
+          <a:bodyPr/>
+          <a:lstStyle/>
+          <a:p>
+            <a:endParaRPr lang="en-US" dirty="0"/>
+          </a:p>
+        </p:txBody>
+      </p:sp>
+    </p:spTree>
+    <p:extLst>
+      <p:ext uri="{BB962C8B-B14F-4D97-AF65-F5344CB8AC3E}">
+        <p14:creationId xmlns:p14="http://schemas.microsoft.com/office/powerpoint/2010/main" val="2815264430"/>
+      </p:ext>
+    </p:extLst>
+  </p:cSld>
+  <p:clrMapOvr>
+    <a:masterClrMapping/>
+  </p:clrMapOvr>
+</p:sld>
+</file>
+
+<file path=ppt/slides/slide19.xml><?xml version="1.0" encoding="utf-8"?>
+<p:sld xmlns:a="http://schemas.openxmlformats.org/drawingml/2006/main" xmlns:r="http://schemas.openxmlformats.org/officeDocument/2006/relationships" xmlns:p="http://schemas.openxmlformats.org/presentationml/2006/main">
+  <p:cSld>
+    <p:spTree>
+      <p:nvGrpSpPr>
+        <p:cNvPr id="1" name=""/>
+        <p:cNvGrpSpPr/>
+        <p:nvPr/>
+      </p:nvGrpSpPr>
+      <p:grpSpPr>
+        <a:xfrm>
+          <a:off x="0" y="0"/>
+          <a:ext cx="0" cy="0"/>
+          <a:chOff x="0" y="0"/>
+          <a:chExt cx="0" cy="0"/>
+        </a:xfrm>
+      </p:grpSpPr>
+      <p:sp>
+        <p:nvSpPr>
+          <p:cNvPr id="2" name="Title 1">
+            <a:extLst>
+              <a:ext uri="{FF2B5EF4-FFF2-40B4-BE49-F238E27FC236}">
+                <a16:creationId xmlns:a16="http://schemas.microsoft.com/office/drawing/2014/main" id="{7306C212-B3B4-8E92-B9B3-B626EF37EBA4}"/>
+              </a:ext>
+            </a:extLst>
+          </p:cNvPr>
+          <p:cNvSpPr txBox="1">
+            <a:spLocks noGrp="1"/>
+          </p:cNvSpPr>
+          <p:nvPr>
+            <p:ph type="title" idx="4294967295"/>
+          </p:nvPr>
+        </p:nvSpPr>
+        <p:spPr>
+          <a:xfrm>
+            <a:off x="1061794" y="2828836"/>
+            <a:ext cx="10068412" cy="1200329"/>
+          </a:xfrm>
+          <a:prstGeom prst="rect">
+            <a:avLst/>
+          </a:prstGeom>
+          <a:noFill/>
+          <a:ln>
+            <a:noFill/>
+            <a:prstDash/>
+          </a:ln>
+          <a:effectLst/>
+        </p:spPr>
+        <p:txBody>
+          <a:bodyPr rot="0" spcFirstLastPara="0" vertOverflow="overflow" horzOverflow="overflow" vert="horz" wrap="square" lIns="91440" tIns="45720" rIns="91440" bIns="45720" numCol="1" spcCol="0" rtlCol="0" fromWordArt="0" anchor="t" anchorCtr="0" forceAA="0" compatLnSpc="1">
+            <a:prstTxWarp prst="textNoShape">
+              <a:avLst/>
+            </a:prstTxWarp>
+            <a:spAutoFit/>
+          </a:bodyPr>
+          <a:lstStyle/>
+          <a:p>
+            <a:pPr marL="0" marR="0" lvl="0" indent="0" algn="ctr" defTabSz="457200" rtl="0" eaLnBrk="1" fontAlgn="auto" latinLnBrk="0" hangingPunct="1">
+              <a:lnSpc>
+                <a:spcPct val="100000"/>
+              </a:lnSpc>
+              <a:spcBef>
+                <a:spcPts val="0"/>
+              </a:spcBef>
+              <a:spcAft>
+                <a:spcPts val="0"/>
+              </a:spcAft>
+              <a:buClrTx/>
+              <a:buSzTx/>
+              <a:buFontTx/>
+              <a:buNone/>
+              <a:tabLst/>
+              <a:defRPr/>
+            </a:pPr>
+            <a:r>
+              <a:rPr kumimoji="0" lang="en-US" sz="7200" b="0" i="0" u="none" strike="noStrike" kern="1200" cap="none" spc="0" normalizeH="0" baseline="0" noProof="0" dirty="0">
+                <a:ln>
+                  <a:noFill/>
+                </a:ln>
+                <a:solidFill>
+                  <a:schemeClr val="tx1"/>
+                </a:solidFill>
+                <a:effectLst/>
+                <a:uLnTx/>
+                <a:uFillTx/>
+                <a:latin typeface="+mn-lt"/>
+                <a:ea typeface="+mn-ea"/>
+                <a:cs typeface="+mn-cs"/>
+              </a:rPr>
+              <a:t>Closures</a:t>
+            </a:r>
+          </a:p>
+        </p:txBody>
+      </p:sp>
+    </p:spTree>
+    <p:extLst>
+      <p:ext uri="{BB962C8B-B14F-4D97-AF65-F5344CB8AC3E}">
+        <p14:creationId xmlns:p14="http://schemas.microsoft.com/office/powerpoint/2010/main" val="2815984157"/>
+      </p:ext>
+    </p:extLst>
+  </p:cSld>
+  <p:clrMapOvr>
+    <a:masterClrMapping/>
+  </p:clrMapOvr>
+</p:sld>
+</file>
+
+<file path=ppt/slides/slide2.xml><?xml version="1.0" encoding="utf-8"?>
+<p:sld xmlns:a="http://schemas.openxmlformats.org/drawingml/2006/main" xmlns:r="http://schemas.openxmlformats.org/officeDocument/2006/relationships" xmlns:p="http://schemas.openxmlformats.org/presentationml/2006/main">
+  <p:cSld>
+    <p:spTree>
+      <p:nvGrpSpPr>
+        <p:cNvPr id="1" name=""/>
+        <p:cNvGrpSpPr/>
+        <p:nvPr/>
+      </p:nvGrpSpPr>
+      <p:grpSpPr>
+        <a:xfrm>
+          <a:off x="0" y="0"/>
+          <a:ext cx="0" cy="0"/>
+          <a:chOff x="0" y="0"/>
+          <a:chExt cx="0" cy="0"/>
+        </a:xfrm>
+      </p:grpSpPr>
+      <p:sp>
+        <p:nvSpPr>
+          <p:cNvPr id="2" name="Title 1">
+            <a:extLst>
+              <a:ext uri="{FF2B5EF4-FFF2-40B4-BE49-F238E27FC236}">
+                <a16:creationId xmlns:a16="http://schemas.microsoft.com/office/drawing/2014/main" id="{B5AB5A65-FBAA-DC24-398C-2298A2AF58C3}"/>
+              </a:ext>
+            </a:extLst>
+          </p:cNvPr>
+          <p:cNvSpPr>
+            <a:spLocks noGrp="1"/>
+          </p:cNvSpPr>
+          <p:nvPr>
+            <p:ph type="title"/>
+          </p:nvPr>
+        </p:nvSpPr>
+        <p:spPr/>
+        <p:txBody>
+          <a:bodyPr/>
+          <a:lstStyle/>
+          <a:p>
+            <a:r>
+              <a:rPr lang="en-US" dirty="0"/>
+              <a:t>Overview</a:t>
+            </a:r>
+          </a:p>
+        </p:txBody>
+      </p:sp>
+      <p:sp>
+        <p:nvSpPr>
+          <p:cNvPr id="3" name="Content Placeholder 2">
+            <a:extLst>
+              <a:ext uri="{FF2B5EF4-FFF2-40B4-BE49-F238E27FC236}">
+                <a16:creationId xmlns:a16="http://schemas.microsoft.com/office/drawing/2014/main" id="{0123CA19-329D-0F80-C469-2825866C6CA4}"/>
+              </a:ext>
+            </a:extLst>
+          </p:cNvPr>
+          <p:cNvSpPr>
+            <a:spLocks noGrp="1"/>
+          </p:cNvSpPr>
+          <p:nvPr>
+            <p:ph idx="1"/>
+          </p:nvPr>
+        </p:nvSpPr>
+        <p:spPr/>
+        <p:txBody>
+          <a:bodyPr/>
+          <a:lstStyle/>
+          <a:p>
+            <a:r>
+              <a:rPr lang="en-US" dirty="0"/>
+              <a:t>Orders of functions</a:t>
+            </a:r>
+          </a:p>
+          <a:p>
+            <a:r>
+              <a:rPr lang="en-US" dirty="0"/>
+              <a:t>Pure functions</a:t>
+            </a:r>
+          </a:p>
+          <a:p>
+            <a:r>
+              <a:rPr lang="en-US" dirty="0"/>
+              <a:t>Functional programming (FP)</a:t>
+            </a:r>
+          </a:p>
+          <a:p>
+            <a:r>
+              <a:rPr lang="en-US" dirty="0"/>
+              <a:t>Closures</a:t>
+            </a:r>
+          </a:p>
+          <a:p>
+            <a:r>
+              <a:rPr lang="en-US" dirty="0"/>
+              <a:t>Examples</a:t>
+            </a:r>
+          </a:p>
+          <a:p>
+            <a:r>
+              <a:rPr lang="en-US" dirty="0"/>
+              <a:t>Next steps and further resources</a:t>
+            </a:r>
+          </a:p>
+        </p:txBody>
+      </p:sp>
+    </p:spTree>
+    <p:extLst>
+      <p:ext uri="{BB962C8B-B14F-4D97-AF65-F5344CB8AC3E}">
+        <p14:creationId xmlns:p14="http://schemas.microsoft.com/office/powerpoint/2010/main" val="1836417717"/>
+      </p:ext>
+    </p:extLst>
+  </p:cSld>
+  <p:clrMapOvr>
+    <a:masterClrMapping/>
+  </p:clrMapOvr>
+</p:sld>
+</file>
+
+<file path=ppt/slides/slide20.xml><?xml version="1.0" encoding="utf-8"?>
+<p:sld xmlns:a="http://schemas.openxmlformats.org/drawingml/2006/main" xmlns:r="http://schemas.openxmlformats.org/officeDocument/2006/relationships" xmlns:p="http://schemas.openxmlformats.org/presentationml/2006/main">
+  <p:cSld>
+    <p:spTree>
+      <p:nvGrpSpPr>
+        <p:cNvPr id="1" name=""/>
+        <p:cNvGrpSpPr/>
+        <p:nvPr/>
+      </p:nvGrpSpPr>
+      <p:grpSpPr>
+        <a:xfrm>
+          <a:off x="0" y="0"/>
+          <a:ext cx="0" cy="0"/>
+          <a:chOff x="0" y="0"/>
+          <a:chExt cx="0" cy="0"/>
+        </a:xfrm>
+      </p:grpSpPr>
+      <p:sp>
+        <p:nvSpPr>
+          <p:cNvPr id="2" name="Title 1">
+            <a:extLst>
+              <a:ext uri="{FF2B5EF4-FFF2-40B4-BE49-F238E27FC236}">
+                <a16:creationId xmlns:a16="http://schemas.microsoft.com/office/drawing/2014/main" id="{B6AA4B89-B939-C909-64A3-42C62FB09C80}"/>
+              </a:ext>
+            </a:extLst>
+          </p:cNvPr>
+          <p:cNvSpPr>
+            <a:spLocks noGrp="1"/>
+          </p:cNvSpPr>
+          <p:nvPr>
+            <p:ph type="title"/>
+          </p:nvPr>
+        </p:nvSpPr>
+        <p:spPr/>
+        <p:txBody>
+          <a:bodyPr/>
+          <a:lstStyle/>
+          <a:p>
+            <a:r>
+              <a:rPr lang="de-DE" dirty="0" err="1"/>
+              <a:t>Closures</a:t>
+            </a:r>
+            <a:br>
+              <a:rPr lang="de-DE" dirty="0"/>
+            </a:br>
+            <a:r>
+              <a:rPr lang="de-DE" dirty="0"/>
+              <a:t>Partial </a:t>
+            </a:r>
+            <a:r>
+              <a:rPr lang="de-DE" dirty="0" err="1"/>
+              <a:t>application</a:t>
+            </a:r>
+            <a:endParaRPr lang="en-US" dirty="0"/>
+          </a:p>
+        </p:txBody>
+      </p:sp>
+      <p:sp>
+        <p:nvSpPr>
+          <p:cNvPr id="3" name="Content Placeholder 2">
+            <a:extLst>
+              <a:ext uri="{FF2B5EF4-FFF2-40B4-BE49-F238E27FC236}">
+                <a16:creationId xmlns:a16="http://schemas.microsoft.com/office/drawing/2014/main" id="{51797AC1-F4D1-0A0B-773E-D2CB043B37A1}"/>
+              </a:ext>
+            </a:extLst>
+          </p:cNvPr>
+          <p:cNvSpPr>
+            <a:spLocks noGrp="1"/>
+          </p:cNvSpPr>
+          <p:nvPr>
+            <p:ph idx="1"/>
+          </p:nvPr>
+        </p:nvSpPr>
+        <p:spPr/>
+        <p:txBody>
+          <a:bodyPr/>
+          <a:lstStyle/>
+          <a:p>
+            <a:endParaRPr lang="en-US"/>
+          </a:p>
+        </p:txBody>
+      </p:sp>
+    </p:spTree>
+    <p:extLst>
+      <p:ext uri="{BB962C8B-B14F-4D97-AF65-F5344CB8AC3E}">
+        <p14:creationId xmlns:p14="http://schemas.microsoft.com/office/powerpoint/2010/main" val="3067413002"/>
       </p:ext>
     </p:extLst>
   </p:cSld>
@@ -8308,7 +8345,7 @@
                 <a:ea typeface="+mn-ea"/>
                 <a:cs typeface="+mn-cs"/>
               </a:rPr>
-              <a:t>Next steps</a:t>
+              <a:t>Examples</a:t>
             </a:r>
           </a:p>
         </p:txBody>
@@ -8316,7 +8353,7 @@
     </p:spTree>
     <p:extLst>
       <p:ext uri="{BB962C8B-B14F-4D97-AF65-F5344CB8AC3E}">
-        <p14:creationId xmlns:p14="http://schemas.microsoft.com/office/powerpoint/2010/main" val="1448221693"/>
+        <p14:creationId xmlns:p14="http://schemas.microsoft.com/office/powerpoint/2010/main" val="2146797957"/>
       </p:ext>
     </p:extLst>
   </p:cSld>
@@ -8348,7 +8385,7 @@
           <p:cNvPr id="2" name="Title 1">
             <a:extLst>
               <a:ext uri="{FF2B5EF4-FFF2-40B4-BE49-F238E27FC236}">
-                <a16:creationId xmlns:a16="http://schemas.microsoft.com/office/drawing/2014/main" id="{9F0A4C3A-80AE-E3A6-471D-A74E63C90618}"/>
+                <a16:creationId xmlns:a16="http://schemas.microsoft.com/office/drawing/2014/main" id="{BAEA4039-AD4C-CCEC-5481-F6211383D7FE}"/>
               </a:ext>
             </a:extLst>
           </p:cNvPr>
@@ -8366,14 +8403,14 @@
           <a:p>
             <a:r>
               <a:rPr lang="en-US" dirty="0"/>
-              <a:t>Next steps and further resource</a:t>
+              <a:t>Sidebar</a:t>
             </a:r>
             <a:br>
               <a:rPr lang="en-US" dirty="0"/>
             </a:br>
             <a:r>
               <a:rPr lang="en-US" dirty="0"/>
-              <a:t>More FP with C#</a:t>
+              <a:t>The “problem” with FP</a:t>
             </a:r>
           </a:p>
         </p:txBody>
@@ -8383,7 +8420,7 @@
           <p:cNvPr id="3" name="Content Placeholder 2">
             <a:extLst>
               <a:ext uri="{FF2B5EF4-FFF2-40B4-BE49-F238E27FC236}">
-                <a16:creationId xmlns:a16="http://schemas.microsoft.com/office/drawing/2014/main" id="{519D56E3-2B90-2A3B-E384-D45FBDF93A21}"/>
+                <a16:creationId xmlns:a16="http://schemas.microsoft.com/office/drawing/2014/main" id="{36CB3168-5E46-1D81-2669-2929B58D54B5}"/>
               </a:ext>
             </a:extLst>
           </p:cNvPr>
@@ -8403,10 +8440,62 @@
           </a:p>
         </p:txBody>
       </p:sp>
+      <p:sp>
+        <p:nvSpPr>
+          <p:cNvPr id="4" name="Rectangle 3">
+            <a:extLst>
+              <a:ext uri="{FF2B5EF4-FFF2-40B4-BE49-F238E27FC236}">
+                <a16:creationId xmlns:a16="http://schemas.microsoft.com/office/drawing/2014/main" id="{AD0F4012-83B9-697A-AE32-EE5606D6A6FC}"/>
+              </a:ext>
+            </a:extLst>
+          </p:cNvPr>
+          <p:cNvSpPr/>
+          <p:nvPr/>
+        </p:nvSpPr>
+        <p:spPr>
+          <a:xfrm>
+            <a:off x="0" y="0"/>
+            <a:ext cx="228600" cy="6858000"/>
+          </a:xfrm>
+          <a:prstGeom prst="rect">
+            <a:avLst/>
+          </a:prstGeom>
+          <a:solidFill>
+            <a:schemeClr val="tx2"/>
+          </a:solidFill>
+          <a:ln>
+            <a:noFill/>
+          </a:ln>
+        </p:spPr>
+        <p:style>
+          <a:lnRef idx="2">
+            <a:schemeClr val="accent1">
+              <a:shade val="15000"/>
+            </a:schemeClr>
+          </a:lnRef>
+          <a:fillRef idx="1">
+            <a:schemeClr val="accent1"/>
+          </a:fillRef>
+          <a:effectRef idx="0">
+            <a:schemeClr val="accent1"/>
+          </a:effectRef>
+          <a:fontRef idx="minor">
+            <a:schemeClr val="lt1"/>
+          </a:fontRef>
+        </p:style>
+        <p:txBody>
+          <a:bodyPr rtlCol="0" anchor="ctr"/>
+          <a:lstStyle/>
+          <a:p>
+            <a:pPr algn="ctr"/>
+            <a:endParaRPr lang="en-US" dirty="0"/>
+          </a:p>
+        </p:txBody>
+      </p:sp>
     </p:spTree>
     <p:extLst>
       <p:ext uri="{BB962C8B-B14F-4D97-AF65-F5344CB8AC3E}">
-        <p14:creationId xmlns:p14="http://schemas.microsoft.com/office/powerpoint/2010/main" val="874669026"/>
+        <p14:creationId xmlns:p14="http://schemas.microsoft.com/office/powerpoint/2010/main" val="839160025"/>
       </p:ext>
     </p:extLst>
   </p:cSld>
@@ -8438,65 +8527,82 @@
           <p:cNvPr id="2" name="Title 1">
             <a:extLst>
               <a:ext uri="{FF2B5EF4-FFF2-40B4-BE49-F238E27FC236}">
-                <a16:creationId xmlns:a16="http://schemas.microsoft.com/office/drawing/2014/main" id="{9F0A4C3A-80AE-E3A6-471D-A74E63C90618}"/>
+                <a16:creationId xmlns:a16="http://schemas.microsoft.com/office/drawing/2014/main" id="{7306C212-B3B4-8E92-B9B3-B626EF37EBA4}"/>
               </a:ext>
             </a:extLst>
           </p:cNvPr>
-          <p:cNvSpPr>
-            <a:spLocks noGrp="1"/>
-          </p:cNvSpPr>
-          <p:nvPr>
-            <p:ph type="title"/>
-          </p:nvPr>
-        </p:nvSpPr>
-        <p:spPr/>
-        <p:txBody>
-          <a:bodyPr/>
+          <p:cNvSpPr txBox="1">
+            <a:spLocks noGrp="1"/>
+          </p:cNvSpPr>
+          <p:nvPr>
+            <p:ph type="title" idx="4294967295"/>
+          </p:nvPr>
+        </p:nvSpPr>
+        <p:spPr>
+          <a:xfrm>
+            <a:off x="1061794" y="2274838"/>
+            <a:ext cx="10068412" cy="2308324"/>
+          </a:xfrm>
+          <a:prstGeom prst="rect">
+            <a:avLst/>
+          </a:prstGeom>
+          <a:noFill/>
+          <a:ln>
+            <a:noFill/>
+            <a:prstDash/>
+          </a:ln>
+          <a:effectLst/>
+        </p:spPr>
+        <p:txBody>
+          <a:bodyPr rot="0" spcFirstLastPara="0" vertOverflow="overflow" horzOverflow="overflow" vert="horz" wrap="square" lIns="91440" tIns="45720" rIns="91440" bIns="45720" numCol="1" spcCol="0" rtlCol="0" fromWordArt="0" anchor="t" anchorCtr="0" forceAA="0" compatLnSpc="1">
+            <a:prstTxWarp prst="textNoShape">
+              <a:avLst/>
+            </a:prstTxWarp>
+            <a:spAutoFit/>
+          </a:bodyPr>
           <a:lstStyle/>
           <a:p>
-            <a:r>
-              <a:rPr lang="en-US" dirty="0"/>
-              <a:t>Next steps and further resource</a:t>
-            </a:r>
-            <a:br>
-              <a:rPr lang="en-US" dirty="0"/>
-            </a:br>
-            <a:r>
-              <a:rPr lang="en-US" dirty="0"/>
-              <a:t>Functional(-first) languages</a:t>
-            </a:r>
-          </a:p>
-        </p:txBody>
-      </p:sp>
-      <p:sp>
-        <p:nvSpPr>
-          <p:cNvPr id="3" name="Content Placeholder 2">
-            <a:extLst>
-              <a:ext uri="{FF2B5EF4-FFF2-40B4-BE49-F238E27FC236}">
-                <a16:creationId xmlns:a16="http://schemas.microsoft.com/office/drawing/2014/main" id="{519D56E3-2B90-2A3B-E384-D45FBDF93A21}"/>
-              </a:ext>
-            </a:extLst>
-          </p:cNvPr>
-          <p:cNvSpPr>
-            <a:spLocks noGrp="1"/>
-          </p:cNvSpPr>
-          <p:nvPr>
-            <p:ph idx="1"/>
-          </p:nvPr>
-        </p:nvSpPr>
-        <p:spPr/>
-        <p:txBody>
-          <a:bodyPr/>
-          <a:lstStyle/>
-          <a:p>
-            <a:endParaRPr lang="en-US" dirty="0"/>
+            <a:pPr marL="0" marR="0" lvl="0" indent="0" algn="ctr" defTabSz="457200" rtl="0" eaLnBrk="1" fontAlgn="auto" latinLnBrk="0" hangingPunct="1">
+              <a:lnSpc>
+                <a:spcPct val="100000"/>
+              </a:lnSpc>
+              <a:spcBef>
+                <a:spcPts val="0"/>
+              </a:spcBef>
+              <a:spcAft>
+                <a:spcPts val="0"/>
+              </a:spcAft>
+              <a:buClrTx/>
+              <a:buSzTx/>
+              <a:buFontTx/>
+              <a:buNone/>
+              <a:tabLst/>
+              <a:defRPr/>
+            </a:pPr>
+            <a:r>
+              <a:rPr kumimoji="0" lang="en-US" sz="7200" b="0" i="0" u="none" strike="noStrike" kern="1200" cap="none" spc="0" normalizeH="0" baseline="0" noProof="0" dirty="0">
+                <a:ln>
+                  <a:noFill/>
+                </a:ln>
+                <a:solidFill>
+                  <a:schemeClr val="tx1"/>
+                </a:solidFill>
+                <a:effectLst/>
+                <a:uLnTx/>
+                <a:uFillTx/>
+                <a:latin typeface="+mn-lt"/>
+                <a:ea typeface="+mn-ea"/>
+                <a:cs typeface="+mn-cs"/>
+              </a:rPr>
+              <a:t>Next steps and further resources</a:t>
+            </a:r>
           </a:p>
         </p:txBody>
       </p:sp>
     </p:spTree>
     <p:extLst>
       <p:ext uri="{BB962C8B-B14F-4D97-AF65-F5344CB8AC3E}">
-        <p14:creationId xmlns:p14="http://schemas.microsoft.com/office/powerpoint/2010/main" val="73239858"/>
+        <p14:creationId xmlns:p14="http://schemas.microsoft.com/office/powerpoint/2010/main" val="1448221693"/>
       </p:ext>
     </p:extLst>
   </p:cSld>
@@ -8546,7 +8652,187 @@
           <a:p>
             <a:r>
               <a:rPr lang="en-US" dirty="0"/>
-              <a:t>Next steps and further resource</a:t>
+              <a:t>Next steps and further resources</a:t>
+            </a:r>
+            <a:br>
+              <a:rPr lang="en-US" dirty="0"/>
+            </a:br>
+            <a:r>
+              <a:rPr lang="en-US" dirty="0"/>
+              <a:t>More FP with C#</a:t>
+            </a:r>
+          </a:p>
+        </p:txBody>
+      </p:sp>
+      <p:sp>
+        <p:nvSpPr>
+          <p:cNvPr id="3" name="Content Placeholder 2">
+            <a:extLst>
+              <a:ext uri="{FF2B5EF4-FFF2-40B4-BE49-F238E27FC236}">
+                <a16:creationId xmlns:a16="http://schemas.microsoft.com/office/drawing/2014/main" id="{519D56E3-2B90-2A3B-E384-D45FBDF93A21}"/>
+              </a:ext>
+            </a:extLst>
+          </p:cNvPr>
+          <p:cNvSpPr>
+            <a:spLocks noGrp="1"/>
+          </p:cNvSpPr>
+          <p:nvPr>
+            <p:ph idx="1"/>
+          </p:nvPr>
+        </p:nvSpPr>
+        <p:spPr/>
+        <p:txBody>
+          <a:bodyPr/>
+          <a:lstStyle/>
+          <a:p>
+            <a:endParaRPr lang="en-US" dirty="0"/>
+          </a:p>
+        </p:txBody>
+      </p:sp>
+    </p:spTree>
+    <p:extLst>
+      <p:ext uri="{BB962C8B-B14F-4D97-AF65-F5344CB8AC3E}">
+        <p14:creationId xmlns:p14="http://schemas.microsoft.com/office/powerpoint/2010/main" val="874669026"/>
+      </p:ext>
+    </p:extLst>
+  </p:cSld>
+  <p:clrMapOvr>
+    <a:masterClrMapping/>
+  </p:clrMapOvr>
+</p:sld>
+</file>
+
+<file path=ppt/slides/slide25.xml><?xml version="1.0" encoding="utf-8"?>
+<p:sld xmlns:a="http://schemas.openxmlformats.org/drawingml/2006/main" xmlns:r="http://schemas.openxmlformats.org/officeDocument/2006/relationships" xmlns:p="http://schemas.openxmlformats.org/presentationml/2006/main">
+  <p:cSld>
+    <p:spTree>
+      <p:nvGrpSpPr>
+        <p:cNvPr id="1" name=""/>
+        <p:cNvGrpSpPr/>
+        <p:nvPr/>
+      </p:nvGrpSpPr>
+      <p:grpSpPr>
+        <a:xfrm>
+          <a:off x="0" y="0"/>
+          <a:ext cx="0" cy="0"/>
+          <a:chOff x="0" y="0"/>
+          <a:chExt cx="0" cy="0"/>
+        </a:xfrm>
+      </p:grpSpPr>
+      <p:sp>
+        <p:nvSpPr>
+          <p:cNvPr id="2" name="Title 1">
+            <a:extLst>
+              <a:ext uri="{FF2B5EF4-FFF2-40B4-BE49-F238E27FC236}">
+                <a16:creationId xmlns:a16="http://schemas.microsoft.com/office/drawing/2014/main" id="{9F0A4C3A-80AE-E3A6-471D-A74E63C90618}"/>
+              </a:ext>
+            </a:extLst>
+          </p:cNvPr>
+          <p:cNvSpPr>
+            <a:spLocks noGrp="1"/>
+          </p:cNvSpPr>
+          <p:nvPr>
+            <p:ph type="title"/>
+          </p:nvPr>
+        </p:nvSpPr>
+        <p:spPr/>
+        <p:txBody>
+          <a:bodyPr/>
+          <a:lstStyle/>
+          <a:p>
+            <a:r>
+              <a:rPr lang="en-US" dirty="0"/>
+              <a:t>Next steps and further resources</a:t>
+            </a:r>
+            <a:br>
+              <a:rPr lang="en-US" dirty="0"/>
+            </a:br>
+            <a:r>
+              <a:rPr lang="en-US" dirty="0"/>
+              <a:t>Functional(-first) languages</a:t>
+            </a:r>
+          </a:p>
+        </p:txBody>
+      </p:sp>
+      <p:sp>
+        <p:nvSpPr>
+          <p:cNvPr id="3" name="Content Placeholder 2">
+            <a:extLst>
+              <a:ext uri="{FF2B5EF4-FFF2-40B4-BE49-F238E27FC236}">
+                <a16:creationId xmlns:a16="http://schemas.microsoft.com/office/drawing/2014/main" id="{519D56E3-2B90-2A3B-E384-D45FBDF93A21}"/>
+              </a:ext>
+            </a:extLst>
+          </p:cNvPr>
+          <p:cNvSpPr>
+            <a:spLocks noGrp="1"/>
+          </p:cNvSpPr>
+          <p:nvPr>
+            <p:ph idx="1"/>
+          </p:nvPr>
+        </p:nvSpPr>
+        <p:spPr/>
+        <p:txBody>
+          <a:bodyPr/>
+          <a:lstStyle/>
+          <a:p>
+            <a:endParaRPr lang="en-US" dirty="0"/>
+          </a:p>
+        </p:txBody>
+      </p:sp>
+    </p:spTree>
+    <p:extLst>
+      <p:ext uri="{BB962C8B-B14F-4D97-AF65-F5344CB8AC3E}">
+        <p14:creationId xmlns:p14="http://schemas.microsoft.com/office/powerpoint/2010/main" val="73239858"/>
+      </p:ext>
+    </p:extLst>
+  </p:cSld>
+  <p:clrMapOvr>
+    <a:masterClrMapping/>
+  </p:clrMapOvr>
+</p:sld>
+</file>
+
+<file path=ppt/slides/slide26.xml><?xml version="1.0" encoding="utf-8"?>
+<p:sld xmlns:a="http://schemas.openxmlformats.org/drawingml/2006/main" xmlns:r="http://schemas.openxmlformats.org/officeDocument/2006/relationships" xmlns:p="http://schemas.openxmlformats.org/presentationml/2006/main">
+  <p:cSld>
+    <p:spTree>
+      <p:nvGrpSpPr>
+        <p:cNvPr id="1" name=""/>
+        <p:cNvGrpSpPr/>
+        <p:nvPr/>
+      </p:nvGrpSpPr>
+      <p:grpSpPr>
+        <a:xfrm>
+          <a:off x="0" y="0"/>
+          <a:ext cx="0" cy="0"/>
+          <a:chOff x="0" y="0"/>
+          <a:chExt cx="0" cy="0"/>
+        </a:xfrm>
+      </p:grpSpPr>
+      <p:sp>
+        <p:nvSpPr>
+          <p:cNvPr id="2" name="Title 1">
+            <a:extLst>
+              <a:ext uri="{FF2B5EF4-FFF2-40B4-BE49-F238E27FC236}">
+                <a16:creationId xmlns:a16="http://schemas.microsoft.com/office/drawing/2014/main" id="{9F0A4C3A-80AE-E3A6-471D-A74E63C90618}"/>
+              </a:ext>
+            </a:extLst>
+          </p:cNvPr>
+          <p:cNvSpPr>
+            <a:spLocks noGrp="1"/>
+          </p:cNvSpPr>
+          <p:nvPr>
+            <p:ph type="title"/>
+          </p:nvPr>
+        </p:nvSpPr>
+        <p:spPr/>
+        <p:txBody>
+          <a:bodyPr/>
+          <a:lstStyle/>
+          <a:p>
+            <a:r>
+              <a:rPr lang="en-US" dirty="0"/>
+              <a:t>Next steps and further resources</a:t>
             </a:r>
             <a:br>
               <a:rPr lang="en-US" dirty="0"/>
@@ -8596,7 +8882,7 @@
 </p:sld>
 </file>
 
-<file path=ppt/slides/slide25.xml><?xml version="1.0" encoding="utf-8"?>
+<file path=ppt/slides/slide27.xml><?xml version="1.0" encoding="utf-8"?>
 <p:sld xmlns:a="http://schemas.openxmlformats.org/drawingml/2006/main" xmlns:r="http://schemas.openxmlformats.org/officeDocument/2006/relationships" xmlns:p="http://schemas.openxmlformats.org/presentationml/2006/main">
   <p:cSld>
     <p:spTree>
@@ -8921,7 +9207,7 @@
 </p:sld>
 </file>
 
-<file path=ppt/slides/slide26.xml><?xml version="1.0" encoding="utf-8"?>
+<file path=ppt/slides/slide28.xml><?xml version="1.0" encoding="utf-8"?>
 <p:sld xmlns:a="http://schemas.openxmlformats.org/drawingml/2006/main" xmlns:r="http://schemas.openxmlformats.org/officeDocument/2006/relationships" xmlns:p="http://schemas.openxmlformats.org/presentationml/2006/main">
   <p:cSld>
     <p:spTree>

</xml_diff>